<commit_message>
Updated readme and update presentation slides
</commit_message>
<xml_diff>
--- a/doc/ARXDev4.pptx
+++ b/doc/ARXDev4.pptx
@@ -5,13 +5,14 @@
     <p:sldMasterId id="2147483648" r:id="rId1"/>
   </p:sldMasterIdLst>
   <p:notesMasterIdLst>
-    <p:notesMasterId r:id="rId6"/>
+    <p:notesMasterId r:id="rId7"/>
   </p:notesMasterIdLst>
   <p:sldIdLst>
     <p:sldId id="256" r:id="rId2"/>
     <p:sldId id="257" r:id="rId3"/>
     <p:sldId id="264" r:id="rId4"/>
     <p:sldId id="261" r:id="rId5"/>
+    <p:sldId id="265" r:id="rId6"/>
   </p:sldIdLst>
   <p:sldSz cx="9144000" cy="5143500" type="screen16x9"/>
   <p:notesSz cx="6858000" cy="9144000"/>
@@ -212,7 +213,7 @@
             <a:fld id="{00C895A6-56DD-4B18-B404-54899C94D855}" type="datetimeFigureOut">
               <a:rPr lang="it-IT" smtClean="0"/>
               <a:pPr/>
-              <a:t>19/03/2019</a:t>
+              <a:t>25/05/2020</a:t>
             </a:fld>
             <a:endParaRPr lang="it-IT"/>
           </a:p>
@@ -278,35 +279,35 @@
           <a:p>
             <a:pPr lvl="0"/>
             <a:r>
-              <a:rPr lang="en-US" smtClean="0"/>
+              <a:rPr lang="en-US"/>
               <a:t>Click to edit Master text styles</a:t>
             </a:r>
           </a:p>
           <a:p>
             <a:pPr lvl="1"/>
             <a:r>
-              <a:rPr lang="en-US" smtClean="0"/>
+              <a:rPr lang="en-US"/>
               <a:t>Second level</a:t>
             </a:r>
           </a:p>
           <a:p>
             <a:pPr lvl="2"/>
             <a:r>
-              <a:rPr lang="en-US" smtClean="0"/>
+              <a:rPr lang="en-US"/>
               <a:t>Third level</a:t>
             </a:r>
           </a:p>
           <a:p>
             <a:pPr lvl="3"/>
             <a:r>
-              <a:rPr lang="en-US" smtClean="0"/>
+              <a:rPr lang="en-US"/>
               <a:t>Fourth level</a:t>
             </a:r>
           </a:p>
           <a:p>
             <a:pPr lvl="4"/>
             <a:r>
-              <a:rPr lang="en-US" smtClean="0"/>
+              <a:rPr lang="en-US"/>
               <a:t>Fifth level</a:t>
             </a:r>
             <a:endParaRPr lang="it-IT"/>
@@ -568,6 +569,91 @@
 </p:notes>
 </file>
 
+<file path=ppt/notesSlides/notesSlide2.xml><?xml version="1.0" encoding="utf-8"?>
+<p:notes xmlns:a="http://schemas.openxmlformats.org/drawingml/2006/main" xmlns:r="http://schemas.openxmlformats.org/officeDocument/2006/relationships" xmlns:p="http://schemas.openxmlformats.org/presentationml/2006/main">
+  <p:cSld>
+    <p:spTree>
+      <p:nvGrpSpPr>
+        <p:cNvPr id="1" name=""/>
+        <p:cNvGrpSpPr/>
+        <p:nvPr/>
+      </p:nvGrpSpPr>
+      <p:grpSpPr>
+        <a:xfrm>
+          <a:off x="0" y="0"/>
+          <a:ext cx="0" cy="0"/>
+          <a:chOff x="0" y="0"/>
+          <a:chExt cx="0" cy="0"/>
+        </a:xfrm>
+      </p:grpSpPr>
+      <p:sp>
+        <p:nvSpPr>
+          <p:cNvPr id="2" name="Slide Image Placeholder 1"/>
+          <p:cNvSpPr>
+            <a:spLocks noGrp="1" noRot="1" noChangeAspect="1"/>
+          </p:cNvSpPr>
+          <p:nvPr>
+            <p:ph type="sldImg"/>
+          </p:nvPr>
+        </p:nvSpPr>
+        <p:spPr/>
+      </p:sp>
+      <p:sp>
+        <p:nvSpPr>
+          <p:cNvPr id="3" name="Notes Placeholder 2"/>
+          <p:cNvSpPr>
+            <a:spLocks noGrp="1"/>
+          </p:cNvSpPr>
+          <p:nvPr>
+            <p:ph type="body" idx="1"/>
+          </p:nvPr>
+        </p:nvSpPr>
+        <p:spPr/>
+        <p:txBody>
+          <a:bodyPr/>
+          <a:lstStyle/>
+          <a:p>
+            <a:endParaRPr lang="it-IT" dirty="0"/>
+          </a:p>
+        </p:txBody>
+      </p:sp>
+      <p:sp>
+        <p:nvSpPr>
+          <p:cNvPr id="4" name="Slide Number Placeholder 3"/>
+          <p:cNvSpPr>
+            <a:spLocks noGrp="1"/>
+          </p:cNvSpPr>
+          <p:nvPr>
+            <p:ph type="sldNum" sz="quarter" idx="10"/>
+          </p:nvPr>
+        </p:nvSpPr>
+        <p:spPr/>
+        <p:txBody>
+          <a:bodyPr/>
+          <a:lstStyle/>
+          <a:p>
+            <a:fld id="{3CF3775E-9C01-4A92-BB01-B68E47CD8D8D}" type="slidenum">
+              <a:rPr lang="it-IT" smtClean="0"/>
+              <a:pPr/>
+              <a:t>5</a:t>
+            </a:fld>
+            <a:endParaRPr lang="it-IT"/>
+          </a:p>
+        </p:txBody>
+      </p:sp>
+    </p:spTree>
+    <p:extLst>
+      <p:ext uri="{BB962C8B-B14F-4D97-AF65-F5344CB8AC3E}">
+        <p14:creationId xmlns:p14="http://schemas.microsoft.com/office/powerpoint/2010/main" val="1821194524"/>
+      </p:ext>
+    </p:extLst>
+  </p:cSld>
+  <p:clrMapOvr>
+    <a:masterClrMapping/>
+  </p:clrMapOvr>
+</p:notes>
+</file>
+
 <file path=ppt/slideLayouts/slideLayout1.xml><?xml version="1.0" encoding="utf-8"?>
 <p:sldLayout xmlns:a="http://schemas.openxmlformats.org/drawingml/2006/main" xmlns:r="http://schemas.openxmlformats.org/officeDocument/2006/relationships" xmlns:p="http://schemas.openxmlformats.org/presentationml/2006/main" type="title" preserve="1">
   <p:cSld name="Title Slide">
@@ -606,7 +692,7 @@
           <a:lstStyle/>
           <a:p>
             <a:r>
-              <a:rPr lang="en-US" smtClean="0"/>
+              <a:rPr lang="en-US"/>
               <a:t>Click to edit Master title style</a:t>
             </a:r>
             <a:endParaRPr lang="it-IT"/>
@@ -725,7 +811,7 @@
           </a:lstStyle>
           <a:p>
             <a:r>
-              <a:rPr lang="en-US" smtClean="0"/>
+              <a:rPr lang="en-US"/>
               <a:t>Click to edit Master subtitle style</a:t>
             </a:r>
             <a:endParaRPr lang="it-IT" dirty="0"/>
@@ -750,7 +836,7 @@
             <a:fld id="{4633ECFB-6927-4181-8532-1ECC482329AC}" type="datetimeFigureOut">
               <a:rPr lang="it-IT" smtClean="0"/>
               <a:pPr/>
-              <a:t>19/03/2019</a:t>
+              <a:t>25/05/2020</a:t>
             </a:fld>
             <a:endParaRPr lang="it-IT"/>
           </a:p>
@@ -840,7 +926,7 @@
           <a:lstStyle/>
           <a:p>
             <a:r>
-              <a:rPr lang="en-US" smtClean="0"/>
+              <a:rPr lang="en-US"/>
               <a:t>Click to edit Master title style</a:t>
             </a:r>
             <a:endParaRPr lang="it-IT"/>
@@ -864,35 +950,35 @@
           <a:p>
             <a:pPr lvl="0"/>
             <a:r>
-              <a:rPr lang="en-US" smtClean="0"/>
+              <a:rPr lang="en-US"/>
               <a:t>Click to edit Master text styles</a:t>
             </a:r>
           </a:p>
           <a:p>
             <a:pPr lvl="1"/>
             <a:r>
-              <a:rPr lang="en-US" smtClean="0"/>
+              <a:rPr lang="en-US"/>
               <a:t>Second level</a:t>
             </a:r>
           </a:p>
           <a:p>
             <a:pPr lvl="2"/>
             <a:r>
-              <a:rPr lang="en-US" smtClean="0"/>
+              <a:rPr lang="en-US"/>
               <a:t>Third level</a:t>
             </a:r>
           </a:p>
           <a:p>
             <a:pPr lvl="3"/>
             <a:r>
-              <a:rPr lang="en-US" smtClean="0"/>
+              <a:rPr lang="en-US"/>
               <a:t>Fourth level</a:t>
             </a:r>
           </a:p>
           <a:p>
             <a:pPr lvl="4"/>
             <a:r>
-              <a:rPr lang="en-US" smtClean="0"/>
+              <a:rPr lang="en-US"/>
               <a:t>Fifth level</a:t>
             </a:r>
             <a:endParaRPr lang="it-IT"/>
@@ -917,7 +1003,7 @@
             <a:fld id="{4633ECFB-6927-4181-8532-1ECC482329AC}" type="datetimeFigureOut">
               <a:rPr lang="it-IT" smtClean="0"/>
               <a:pPr/>
-              <a:t>19/03/2019</a:t>
+              <a:t>25/05/2020</a:t>
             </a:fld>
             <a:endParaRPr lang="it-IT"/>
           </a:p>
@@ -1012,7 +1098,7 @@
           <a:lstStyle/>
           <a:p>
             <a:r>
-              <a:rPr lang="en-US" smtClean="0"/>
+              <a:rPr lang="en-US"/>
               <a:t>Click to edit Master title style</a:t>
             </a:r>
             <a:endParaRPr lang="it-IT"/>
@@ -1041,35 +1127,35 @@
           <a:p>
             <a:pPr lvl="0"/>
             <a:r>
-              <a:rPr lang="en-US" smtClean="0"/>
+              <a:rPr lang="en-US"/>
               <a:t>Click to edit Master text styles</a:t>
             </a:r>
           </a:p>
           <a:p>
             <a:pPr lvl="1"/>
             <a:r>
-              <a:rPr lang="en-US" smtClean="0"/>
+              <a:rPr lang="en-US"/>
               <a:t>Second level</a:t>
             </a:r>
           </a:p>
           <a:p>
             <a:pPr lvl="2"/>
             <a:r>
-              <a:rPr lang="en-US" smtClean="0"/>
+              <a:rPr lang="en-US"/>
               <a:t>Third level</a:t>
             </a:r>
           </a:p>
           <a:p>
             <a:pPr lvl="3"/>
             <a:r>
-              <a:rPr lang="en-US" smtClean="0"/>
+              <a:rPr lang="en-US"/>
               <a:t>Fourth level</a:t>
             </a:r>
           </a:p>
           <a:p>
             <a:pPr lvl="4"/>
             <a:r>
-              <a:rPr lang="en-US" smtClean="0"/>
+              <a:rPr lang="en-US"/>
               <a:t>Fifth level</a:t>
             </a:r>
             <a:endParaRPr lang="it-IT" dirty="0"/>
@@ -1094,7 +1180,7 @@
             <a:fld id="{4633ECFB-6927-4181-8532-1ECC482329AC}" type="datetimeFigureOut">
               <a:rPr lang="it-IT" smtClean="0"/>
               <a:pPr/>
-              <a:t>19/03/2019</a:t>
+              <a:t>25/05/2020</a:t>
             </a:fld>
             <a:endParaRPr lang="it-IT"/>
           </a:p>
@@ -1184,7 +1270,7 @@
           <a:lstStyle/>
           <a:p>
             <a:r>
-              <a:rPr lang="en-US" smtClean="0"/>
+              <a:rPr lang="en-US"/>
               <a:t>Click to edit Master title style</a:t>
             </a:r>
             <a:endParaRPr lang="it-IT"/>
@@ -1208,35 +1294,35 @@
           <a:p>
             <a:pPr lvl="0"/>
             <a:r>
-              <a:rPr lang="en-US" smtClean="0"/>
+              <a:rPr lang="en-US"/>
               <a:t>Click to edit Master text styles</a:t>
             </a:r>
           </a:p>
           <a:p>
             <a:pPr lvl="1"/>
             <a:r>
-              <a:rPr lang="en-US" smtClean="0"/>
+              <a:rPr lang="en-US"/>
               <a:t>Second level</a:t>
             </a:r>
           </a:p>
           <a:p>
             <a:pPr lvl="2"/>
             <a:r>
-              <a:rPr lang="en-US" smtClean="0"/>
+              <a:rPr lang="en-US"/>
               <a:t>Third level</a:t>
             </a:r>
           </a:p>
           <a:p>
             <a:pPr lvl="3"/>
             <a:r>
-              <a:rPr lang="en-US" smtClean="0"/>
+              <a:rPr lang="en-US"/>
               <a:t>Fourth level</a:t>
             </a:r>
           </a:p>
           <a:p>
             <a:pPr lvl="4"/>
             <a:r>
-              <a:rPr lang="en-US" smtClean="0"/>
+              <a:rPr lang="en-US"/>
               <a:t>Fifth level</a:t>
             </a:r>
             <a:endParaRPr lang="it-IT"/>
@@ -1261,7 +1347,7 @@
             <a:fld id="{4633ECFB-6927-4181-8532-1ECC482329AC}" type="datetimeFigureOut">
               <a:rPr lang="it-IT" smtClean="0"/>
               <a:pPr/>
-              <a:t>19/03/2019</a:t>
+              <a:t>25/05/2020</a:t>
             </a:fld>
             <a:endParaRPr lang="it-IT"/>
           </a:p>
@@ -1360,7 +1446,7 @@
           </a:lstStyle>
           <a:p>
             <a:r>
-              <a:rPr lang="en-US" smtClean="0"/>
+              <a:rPr lang="en-US"/>
               <a:t>Click to edit Master title style</a:t>
             </a:r>
             <a:endParaRPr lang="it-IT"/>
@@ -1480,7 +1566,7 @@
           <a:p>
             <a:pPr lvl="0"/>
             <a:r>
-              <a:rPr lang="en-US" smtClean="0"/>
+              <a:rPr lang="en-US"/>
               <a:t>Click to edit Master text styles</a:t>
             </a:r>
           </a:p>
@@ -1504,7 +1590,7 @@
             <a:fld id="{4633ECFB-6927-4181-8532-1ECC482329AC}" type="datetimeFigureOut">
               <a:rPr lang="it-IT" smtClean="0"/>
               <a:pPr/>
-              <a:t>19/03/2019</a:t>
+              <a:t>25/05/2020</a:t>
             </a:fld>
             <a:endParaRPr lang="it-IT"/>
           </a:p>
@@ -1594,7 +1680,7 @@
           <a:lstStyle/>
           <a:p>
             <a:r>
-              <a:rPr lang="en-US" smtClean="0"/>
+              <a:rPr lang="en-US"/>
               <a:t>Click to edit Master title style</a:t>
             </a:r>
             <a:endParaRPr lang="it-IT"/>
@@ -1651,35 +1737,35 @@
           <a:p>
             <a:pPr lvl="0"/>
             <a:r>
-              <a:rPr lang="en-US" smtClean="0"/>
+              <a:rPr lang="en-US"/>
               <a:t>Click to edit Master text styles</a:t>
             </a:r>
           </a:p>
           <a:p>
             <a:pPr lvl="1"/>
             <a:r>
-              <a:rPr lang="en-US" smtClean="0"/>
+              <a:rPr lang="en-US"/>
               <a:t>Second level</a:t>
             </a:r>
           </a:p>
           <a:p>
             <a:pPr lvl="2"/>
             <a:r>
-              <a:rPr lang="en-US" smtClean="0"/>
+              <a:rPr lang="en-US"/>
               <a:t>Third level</a:t>
             </a:r>
           </a:p>
           <a:p>
             <a:pPr lvl="3"/>
             <a:r>
-              <a:rPr lang="en-US" smtClean="0"/>
+              <a:rPr lang="en-US"/>
               <a:t>Fourth level</a:t>
             </a:r>
           </a:p>
           <a:p>
             <a:pPr lvl="4"/>
             <a:r>
-              <a:rPr lang="en-US" smtClean="0"/>
+              <a:rPr lang="en-US"/>
               <a:t>Fifth level</a:t>
             </a:r>
             <a:endParaRPr lang="it-IT"/>
@@ -1736,35 +1822,35 @@
           <a:p>
             <a:pPr lvl="0"/>
             <a:r>
-              <a:rPr lang="en-US" smtClean="0"/>
+              <a:rPr lang="en-US"/>
               <a:t>Click to edit Master text styles</a:t>
             </a:r>
           </a:p>
           <a:p>
             <a:pPr lvl="1"/>
             <a:r>
-              <a:rPr lang="en-US" smtClean="0"/>
+              <a:rPr lang="en-US"/>
               <a:t>Second level</a:t>
             </a:r>
           </a:p>
           <a:p>
             <a:pPr lvl="2"/>
             <a:r>
-              <a:rPr lang="en-US" smtClean="0"/>
+              <a:rPr lang="en-US"/>
               <a:t>Third level</a:t>
             </a:r>
           </a:p>
           <a:p>
             <a:pPr lvl="3"/>
             <a:r>
-              <a:rPr lang="en-US" smtClean="0"/>
+              <a:rPr lang="en-US"/>
               <a:t>Fourth level</a:t>
             </a:r>
           </a:p>
           <a:p>
             <a:pPr lvl="4"/>
             <a:r>
-              <a:rPr lang="en-US" smtClean="0"/>
+              <a:rPr lang="en-US"/>
               <a:t>Fifth level</a:t>
             </a:r>
             <a:endParaRPr lang="it-IT"/>
@@ -1789,7 +1875,7 @@
             <a:fld id="{4633ECFB-6927-4181-8532-1ECC482329AC}" type="datetimeFigureOut">
               <a:rPr lang="it-IT" smtClean="0"/>
               <a:pPr/>
-              <a:t>19/03/2019</a:t>
+              <a:t>25/05/2020</a:t>
             </a:fld>
             <a:endParaRPr lang="it-IT"/>
           </a:p>
@@ -1883,7 +1969,7 @@
           </a:lstStyle>
           <a:p>
             <a:r>
-              <a:rPr lang="en-US" smtClean="0"/>
+              <a:rPr lang="en-US"/>
               <a:t>Click to edit Master title style</a:t>
             </a:r>
             <a:endParaRPr lang="it-IT"/>
@@ -1949,7 +2035,7 @@
           <a:p>
             <a:pPr lvl="0"/>
             <a:r>
-              <a:rPr lang="en-US" smtClean="0"/>
+              <a:rPr lang="en-US"/>
               <a:t>Click to edit Master text styles</a:t>
             </a:r>
           </a:p>
@@ -2005,35 +2091,35 @@
           <a:p>
             <a:pPr lvl="0"/>
             <a:r>
-              <a:rPr lang="en-US" smtClean="0"/>
+              <a:rPr lang="en-US"/>
               <a:t>Click to edit Master text styles</a:t>
             </a:r>
           </a:p>
           <a:p>
             <a:pPr lvl="1"/>
             <a:r>
-              <a:rPr lang="en-US" smtClean="0"/>
+              <a:rPr lang="en-US"/>
               <a:t>Second level</a:t>
             </a:r>
           </a:p>
           <a:p>
             <a:pPr lvl="2"/>
             <a:r>
-              <a:rPr lang="en-US" smtClean="0"/>
+              <a:rPr lang="en-US"/>
               <a:t>Third level</a:t>
             </a:r>
           </a:p>
           <a:p>
             <a:pPr lvl="3"/>
             <a:r>
-              <a:rPr lang="en-US" smtClean="0"/>
+              <a:rPr lang="en-US"/>
               <a:t>Fourth level</a:t>
             </a:r>
           </a:p>
           <a:p>
             <a:pPr lvl="4"/>
             <a:r>
-              <a:rPr lang="en-US" smtClean="0"/>
+              <a:rPr lang="en-US"/>
               <a:t>Fifth level</a:t>
             </a:r>
             <a:endParaRPr lang="it-IT"/>
@@ -2099,7 +2185,7 @@
           <a:p>
             <a:pPr lvl="0"/>
             <a:r>
-              <a:rPr lang="en-US" smtClean="0"/>
+              <a:rPr lang="en-US"/>
               <a:t>Click to edit Master text styles</a:t>
             </a:r>
           </a:p>
@@ -2155,35 +2241,35 @@
           <a:p>
             <a:pPr lvl="0"/>
             <a:r>
-              <a:rPr lang="en-US" smtClean="0"/>
+              <a:rPr lang="en-US"/>
               <a:t>Click to edit Master text styles</a:t>
             </a:r>
           </a:p>
           <a:p>
             <a:pPr lvl="1"/>
             <a:r>
-              <a:rPr lang="en-US" smtClean="0"/>
+              <a:rPr lang="en-US"/>
               <a:t>Second level</a:t>
             </a:r>
           </a:p>
           <a:p>
             <a:pPr lvl="2"/>
             <a:r>
-              <a:rPr lang="en-US" smtClean="0"/>
+              <a:rPr lang="en-US"/>
               <a:t>Third level</a:t>
             </a:r>
           </a:p>
           <a:p>
             <a:pPr lvl="3"/>
             <a:r>
-              <a:rPr lang="en-US" smtClean="0"/>
+              <a:rPr lang="en-US"/>
               <a:t>Fourth level</a:t>
             </a:r>
           </a:p>
           <a:p>
             <a:pPr lvl="4"/>
             <a:r>
-              <a:rPr lang="en-US" smtClean="0"/>
+              <a:rPr lang="en-US"/>
               <a:t>Fifth level</a:t>
             </a:r>
             <a:endParaRPr lang="it-IT"/>
@@ -2208,7 +2294,7 @@
             <a:fld id="{4633ECFB-6927-4181-8532-1ECC482329AC}" type="datetimeFigureOut">
               <a:rPr lang="it-IT" smtClean="0"/>
               <a:pPr/>
-              <a:t>19/03/2019</a:t>
+              <a:t>25/05/2020</a:t>
             </a:fld>
             <a:endParaRPr lang="it-IT"/>
           </a:p>
@@ -2298,7 +2384,7 @@
           <a:lstStyle/>
           <a:p>
             <a:r>
-              <a:rPr lang="en-US" smtClean="0"/>
+              <a:rPr lang="en-US"/>
               <a:t>Click to edit Master title style</a:t>
             </a:r>
             <a:endParaRPr lang="it-IT"/>
@@ -2323,7 +2409,7 @@
             <a:fld id="{4633ECFB-6927-4181-8532-1ECC482329AC}" type="datetimeFigureOut">
               <a:rPr lang="it-IT" smtClean="0"/>
               <a:pPr/>
-              <a:t>19/03/2019</a:t>
+              <a:t>25/05/2020</a:t>
             </a:fld>
             <a:endParaRPr lang="it-IT"/>
           </a:p>
@@ -2415,7 +2501,7 @@
             <a:fld id="{4633ECFB-6927-4181-8532-1ECC482329AC}" type="datetimeFigureOut">
               <a:rPr lang="it-IT" smtClean="0"/>
               <a:pPr/>
-              <a:t>19/03/2019</a:t>
+              <a:t>25/05/2020</a:t>
             </a:fld>
             <a:endParaRPr lang="it-IT"/>
           </a:p>
@@ -2514,7 +2600,7 @@
           </a:lstStyle>
           <a:p>
             <a:r>
-              <a:rPr lang="en-US" smtClean="0"/>
+              <a:rPr lang="en-US"/>
               <a:t>Click to edit Master title style</a:t>
             </a:r>
             <a:endParaRPr lang="it-IT" dirty="0"/>
@@ -2571,35 +2657,35 @@
           <a:p>
             <a:pPr lvl="0"/>
             <a:r>
-              <a:rPr lang="en-US" smtClean="0"/>
+              <a:rPr lang="en-US"/>
               <a:t>Click to edit Master text styles</a:t>
             </a:r>
           </a:p>
           <a:p>
             <a:pPr lvl="1"/>
             <a:r>
-              <a:rPr lang="en-US" smtClean="0"/>
+              <a:rPr lang="en-US"/>
               <a:t>Second level</a:t>
             </a:r>
           </a:p>
           <a:p>
             <a:pPr lvl="2"/>
             <a:r>
-              <a:rPr lang="en-US" smtClean="0"/>
+              <a:rPr lang="en-US"/>
               <a:t>Third level</a:t>
             </a:r>
           </a:p>
           <a:p>
             <a:pPr lvl="3"/>
             <a:r>
-              <a:rPr lang="en-US" smtClean="0"/>
+              <a:rPr lang="en-US"/>
               <a:t>Fourth level</a:t>
             </a:r>
           </a:p>
           <a:p>
             <a:pPr lvl="4"/>
             <a:r>
-              <a:rPr lang="en-US" smtClean="0"/>
+              <a:rPr lang="en-US"/>
               <a:t>Fifth level</a:t>
             </a:r>
             <a:endParaRPr lang="it-IT"/>
@@ -2665,7 +2751,7 @@
           <a:p>
             <a:pPr lvl="0"/>
             <a:r>
-              <a:rPr lang="en-US" smtClean="0"/>
+              <a:rPr lang="en-US"/>
               <a:t>Click to edit Master text styles</a:t>
             </a:r>
           </a:p>
@@ -2689,7 +2775,7 @@
             <a:fld id="{4633ECFB-6927-4181-8532-1ECC482329AC}" type="datetimeFigureOut">
               <a:rPr lang="it-IT" smtClean="0"/>
               <a:pPr/>
-              <a:t>19/03/2019</a:t>
+              <a:t>25/05/2020</a:t>
             </a:fld>
             <a:endParaRPr lang="it-IT"/>
           </a:p>
@@ -2788,7 +2874,7 @@
           </a:lstStyle>
           <a:p>
             <a:r>
-              <a:rPr lang="en-US" smtClean="0"/>
+              <a:rPr lang="en-US"/>
               <a:t>Click to edit Master title style</a:t>
             </a:r>
             <a:endParaRPr lang="it-IT"/>
@@ -2853,7 +2939,7 @@
           </a:lstStyle>
           <a:p>
             <a:r>
-              <a:rPr lang="en-US" smtClean="0"/>
+              <a:rPr lang="en-US"/>
               <a:t>Click icon to add picture</a:t>
             </a:r>
             <a:endParaRPr lang="it-IT"/>
@@ -2919,7 +3005,7 @@
           <a:p>
             <a:pPr lvl="0"/>
             <a:r>
-              <a:rPr lang="en-US" smtClean="0"/>
+              <a:rPr lang="en-US"/>
               <a:t>Click to edit Master text styles</a:t>
             </a:r>
           </a:p>
@@ -2943,7 +3029,7 @@
             <a:fld id="{4633ECFB-6927-4181-8532-1ECC482329AC}" type="datetimeFigureOut">
               <a:rPr lang="it-IT" smtClean="0"/>
               <a:pPr/>
-              <a:t>19/03/2019</a:t>
+              <a:t>25/05/2020</a:t>
             </a:fld>
             <a:endParaRPr lang="it-IT"/>
           </a:p>
@@ -3134,7 +3220,7 @@
           <a:lstStyle/>
           <a:p>
             <a:r>
-              <a:rPr lang="en-US" smtClean="0"/>
+              <a:rPr lang="en-US"/>
               <a:t>Click to edit Master title style</a:t>
             </a:r>
             <a:endParaRPr lang="it-IT"/>
@@ -3168,35 +3254,35 @@
           <a:p>
             <a:pPr lvl="0"/>
             <a:r>
-              <a:rPr lang="en-US" smtClean="0"/>
+              <a:rPr lang="en-US"/>
               <a:t>Click to edit Master text styles</a:t>
             </a:r>
           </a:p>
           <a:p>
             <a:pPr lvl="1"/>
             <a:r>
-              <a:rPr lang="en-US" smtClean="0"/>
+              <a:rPr lang="en-US"/>
               <a:t>Second level</a:t>
             </a:r>
           </a:p>
           <a:p>
             <a:pPr lvl="2"/>
             <a:r>
-              <a:rPr lang="en-US" smtClean="0"/>
+              <a:rPr lang="en-US"/>
               <a:t>Third level</a:t>
             </a:r>
           </a:p>
           <a:p>
             <a:pPr lvl="3"/>
             <a:r>
-              <a:rPr lang="en-US" smtClean="0"/>
+              <a:rPr lang="en-US"/>
               <a:t>Fourth level</a:t>
             </a:r>
           </a:p>
           <a:p>
             <a:pPr lvl="4"/>
             <a:r>
-              <a:rPr lang="en-US" smtClean="0"/>
+              <a:rPr lang="en-US"/>
               <a:t>Fifth level</a:t>
             </a:r>
             <a:endParaRPr lang="it-IT" dirty="0"/>
@@ -3239,7 +3325,7 @@
             <a:fld id="{4633ECFB-6927-4181-8532-1ECC482329AC}" type="datetimeFigureOut">
               <a:rPr lang="it-IT" smtClean="0"/>
               <a:pPr/>
-              <a:t>19/03/2019</a:t>
+              <a:t>25/05/2020</a:t>
             </a:fld>
             <a:endParaRPr lang="it-IT" dirty="0"/>
           </a:p>
@@ -3373,7 +3459,7 @@
           <a:lstStyle/>
           <a:p>
             <a:r>
-              <a:rPr lang="it-IT" sz="3600" b="1" dirty="0" smtClean="0">
+              <a:rPr lang="it-IT" sz="3600" b="1" dirty="0">
                 <a:solidFill>
                   <a:schemeClr val="bg1"/>
                 </a:solidFill>
@@ -3381,12 +3467,6 @@
               </a:rPr>
               <a:t>GIM</a:t>
             </a:r>
-            <a:endParaRPr lang="it-IT" sz="3600" b="1" dirty="0">
-              <a:solidFill>
-                <a:schemeClr val="bg1"/>
-              </a:solidFill>
-              <a:latin typeface="Myriad Pro" pitchFamily="34" charset="0"/>
-            </a:endParaRPr>
           </a:p>
         </p:txBody>
       </p:sp>
@@ -3413,7 +3493,7 @@
           <a:lstStyle/>
           <a:p>
             <a:r>
-              <a:rPr lang="it-IT" sz="2400" dirty="0" smtClean="0">
+              <a:rPr lang="it-IT" sz="2400" dirty="0">
                 <a:solidFill>
                   <a:schemeClr val="bg1"/>
                 </a:solidFill>
@@ -3421,12 +3501,6 @@
               </a:rPr>
               <a:t>Global</a:t>
             </a:r>
-            <a:endParaRPr lang="it-IT" sz="2400" dirty="0">
-              <a:solidFill>
-                <a:schemeClr val="bg1"/>
-              </a:solidFill>
-              <a:latin typeface="Myriad Pro" pitchFamily="34" charset="0"/>
-            </a:endParaRPr>
           </a:p>
         </p:txBody>
       </p:sp>
@@ -3547,7 +3621,7 @@
           </a:lstStyle>
           <a:p>
             <a:r>
-              <a:rPr lang="it-IT" sz="2400" dirty="0" smtClean="0">
+              <a:rPr lang="it-IT" sz="2400" dirty="0">
                 <a:solidFill>
                   <a:schemeClr val="bg1"/>
                 </a:solidFill>
@@ -3555,12 +3629,6 @@
               </a:rPr>
               <a:t>Information</a:t>
             </a:r>
-            <a:endParaRPr lang="it-IT" sz="2400" dirty="0">
-              <a:solidFill>
-                <a:schemeClr val="bg1"/>
-              </a:solidFill>
-              <a:latin typeface="Myriad Pro" pitchFamily="34" charset="0"/>
-            </a:endParaRPr>
           </a:p>
         </p:txBody>
       </p:sp>
@@ -3681,7 +3749,7 @@
           </a:lstStyle>
           <a:p>
             <a:r>
-              <a:rPr lang="it-IT" sz="2400" dirty="0" smtClean="0">
+              <a:rPr lang="it-IT" sz="2400" dirty="0">
                 <a:solidFill>
                   <a:schemeClr val="bg1"/>
                 </a:solidFill>
@@ -3689,12 +3757,6 @@
               </a:rPr>
               <a:t>Management</a:t>
             </a:r>
-            <a:endParaRPr lang="it-IT" sz="2400" dirty="0">
-              <a:solidFill>
-                <a:schemeClr val="bg1"/>
-              </a:solidFill>
-              <a:latin typeface="Myriad Pro" pitchFamily="34" charset="0"/>
-            </a:endParaRPr>
           </a:p>
         </p:txBody>
       </p:sp>
@@ -4014,14 +4076,16 @@
         </p:spPr>
         <p:txBody>
           <a:bodyPr>
-            <a:normAutofit fontScale="90000"/>
+            <a:normAutofit/>
           </a:bodyPr>
           <a:lstStyle/>
           <a:p>
             <a:r>
-              <a:rPr lang="it-IT" sz="12200" u="sng" dirty="0" smtClean="0">
+              <a:rPr lang="it-IT" sz="6000" u="sng" dirty="0" err="1">
                 <a:solidFill>
-                  <a:srgbClr val="FFC000"/>
+                  <a:schemeClr val="accent2">
+                    <a:lumMod val="75000"/>
+                  </a:schemeClr>
                 </a:solidFill>
                 <a:effectLst>
                   <a:outerShdw blurRad="38100" dist="38100" dir="2700000" algn="tl">
@@ -4034,7 +4098,7 @@
               <a:t>ARX</a:t>
             </a:r>
             <a:r>
-              <a:rPr lang="it-IT" sz="12200" u="sng" dirty="0" smtClean="0">
+              <a:rPr lang="it-IT" sz="6000" u="sng" dirty="0" err="1">
                 <a:effectLst>
                   <a:outerShdw blurRad="38100" dist="38100" dir="2700000" algn="tl">
                     <a:srgbClr val="000000">
@@ -4043,56 +4107,45 @@
                   </a:outerShdw>
                 </a:effectLst>
               </a:rPr>
-              <a:t>Dev</a:t>
-            </a:r>
-            <a:r>
-              <a:rPr lang="it-IT" sz="12200" dirty="0" smtClean="0"/>
+              <a:t>ivar</a:t>
+            </a:r>
+            <a:r>
+              <a:rPr lang="it-IT" sz="6000" u="sng" dirty="0">
+                <a:effectLst>
+                  <a:outerShdw blurRad="38100" dist="38100" dir="2700000" algn="tl">
+                    <a:srgbClr val="000000">
+                      <a:alpha val="43137"/>
+                    </a:srgbClr>
+                  </a:outerShdw>
+                </a:effectLst>
+              </a:rPr>
               <a:t> </a:t>
             </a:r>
-            <a:br>
-              <a:rPr lang="it-IT" sz="12200" dirty="0" smtClean="0"/>
-            </a:br>
-            <a:r>
-              <a:rPr lang="it-IT" sz="1200" dirty="0"/>
-              <a:t>Guida tecnica allo sviluppo di </a:t>
-            </a:r>
-            <a:r>
-              <a:rPr lang="it-IT" sz="1200" dirty="0" err="1"/>
-              <a:t>plugin</a:t>
-            </a:r>
-            <a:r>
-              <a:rPr lang="it-IT" sz="1200" dirty="0"/>
-              <a:t> WCF e </a:t>
-            </a:r>
-            <a:r>
-              <a:rPr lang="it-IT" sz="1200" dirty="0" err="1"/>
-              <a:t>plugin</a:t>
-            </a:r>
-            <a:r>
-              <a:rPr lang="it-IT" sz="1200" dirty="0"/>
-              <a:t> </a:t>
-            </a:r>
-            <a:r>
-              <a:rPr lang="it-IT" sz="1200" dirty="0" err="1"/>
-              <a:t>Workflow</a:t>
-            </a:r>
-            <a:r>
-              <a:rPr lang="it-IT" sz="1200" dirty="0"/>
-              <a:t> per </a:t>
-            </a:r>
-            <a:r>
-              <a:rPr lang="it-IT" sz="1200" dirty="0" err="1"/>
-              <a:t>ARXivar</a:t>
-            </a:r>
-            <a:r>
-              <a:rPr lang="it-IT" sz="1200" dirty="0"/>
-              <a:t> </a:t>
-            </a:r>
-            <a:r>
-              <a:rPr lang="it-IT" sz="1200" dirty="0" err="1"/>
+            <a:r>
+              <a:rPr lang="it-IT" sz="6000" i="1" u="sng" dirty="0">
+                <a:effectLst>
+                  <a:outerShdw blurRad="38100" dist="38100" dir="2700000" algn="tl">
+                    <a:srgbClr val="000000">
+                      <a:alpha val="43137"/>
+                    </a:srgbClr>
+                  </a:outerShdw>
+                </a:effectLst>
+              </a:rPr>
               <a:t>Next</a:t>
             </a:r>
-            <a:endParaRPr lang="it-IT" sz="1400" i="1" dirty="0">
+            <a:r>
+              <a:rPr lang="it-IT" sz="6000" u="sng" dirty="0">
+                <a:effectLst>
+                  <a:outerShdw blurRad="38100" dist="38100" dir="2700000" algn="tl">
+                    <a:srgbClr val="000000">
+                      <a:alpha val="43137"/>
+                    </a:srgbClr>
+                  </a:outerShdw>
+                </a:effectLst>
+              </a:rPr>
+              <a:t> Dev 4</a:t>
+            </a:r>
+            <a:endParaRPr lang="it-IT" sz="6000" i="1" dirty="0">
               <a:effectLst>
                 <a:outerShdw blurRad="38100" dist="38100" dir="2700000" algn="tl">
                   <a:srgbClr val="000000">
@@ -4120,7 +4173,7 @@
           <a:lstStyle/>
           <a:p>
             <a:r>
-              <a:rPr lang="it-IT" i="1" dirty="0" smtClean="0"/>
+              <a:rPr lang="it-IT" i="1" dirty="0"/>
               <a:t>Yari Melzani</a:t>
             </a:r>
           </a:p>
@@ -4134,13 +4187,6 @@
   <p:clrMapOvr>
     <a:masterClrMapping/>
   </p:clrMapOvr>
-  <p:timing>
-    <p:tnLst>
-      <p:par>
-        <p:cTn id="1" dur="indefinite" restart="never" nodeType="tmRoot"/>
-      </p:par>
-    </p:tnLst>
-  </p:timing>
 </p:sld>
 </file>
 
@@ -4184,7 +4230,7 @@
           <a:lstStyle/>
           <a:p>
             <a:r>
-              <a:rPr lang="it-IT" dirty="0" smtClean="0">
+              <a:rPr lang="it-IT" dirty="0">
                 <a:solidFill>
                   <a:srgbClr val="FFC000"/>
                 </a:solidFill>
@@ -4198,18 +4244,6 @@
               </a:rPr>
               <a:t>Programma della giornata</a:t>
             </a:r>
-            <a:endParaRPr lang="it-IT" dirty="0">
-              <a:solidFill>
-                <a:srgbClr val="FFC000"/>
-              </a:solidFill>
-              <a:effectLst>
-                <a:outerShdw blurRad="38100" dist="38100" dir="2700000" algn="tl">
-                  <a:srgbClr val="000000">
-                    <a:alpha val="43137"/>
-                  </a:srgbClr>
-                </a:outerShdw>
-              </a:effectLst>
-            </a:endParaRPr>
           </a:p>
         </p:txBody>
       </p:sp>
@@ -4236,18 +4270,14 @@
           <a:lstStyle/>
           <a:p>
             <a:r>
-              <a:rPr lang="it-IT" sz="1600" b="1" dirty="0" smtClean="0"/>
-              <a:t>Prefazione architettura orientata ai servizi</a:t>
-            </a:r>
-          </a:p>
-          <a:p>
-            <a:r>
-              <a:rPr lang="it-IT" sz="1600" b="1" dirty="0" smtClean="0"/>
-              <a:t>Manuale </a:t>
-            </a:r>
-            <a:r>
-              <a:rPr lang="it-IT" sz="1600" b="1" dirty="0" smtClean="0"/>
-              <a:t>online</a:t>
+              <a:rPr lang="it-IT" sz="1600" b="1" dirty="0"/>
+              <a:t>Architettura orientata ai servizi</a:t>
+            </a:r>
+          </a:p>
+          <a:p>
+            <a:r>
+              <a:rPr lang="it-IT" sz="1600" b="1" dirty="0"/>
+              <a:t>Manuale online</a:t>
             </a:r>
           </a:p>
           <a:p>
@@ -4256,28 +4286,18 @@
               <a:rPr lang="it-IT" sz="1200" b="1" dirty="0">
                 <a:hlinkClick r:id="rId2"/>
               </a:rPr>
-              <a:t>http://</a:t>
-            </a:r>
-            <a:r>
-              <a:rPr lang="it-IT" sz="1200" b="1" dirty="0" smtClean="0">
-                <a:hlinkClick r:id="rId2"/>
-              </a:rPr>
-              <a:t>dev.arxivar.it</a:t>
-            </a:r>
-            <a:endParaRPr lang="it-IT" sz="1200" b="1" dirty="0" smtClean="0"/>
-          </a:p>
-          <a:p>
-            <a:r>
-              <a:rPr lang="it-IT" sz="1600" b="1" dirty="0" err="1" smtClean="0"/>
+              <a:t>http://dev.arxivar.it</a:t>
+            </a:r>
+            <a:endParaRPr lang="it-IT" sz="1200" b="1" dirty="0"/>
+          </a:p>
+          <a:p>
+            <a:r>
+              <a:rPr lang="it-IT" sz="1600" b="1" dirty="0" err="1"/>
               <a:t>Plugin</a:t>
             </a:r>
             <a:r>
-              <a:rPr lang="it-IT" sz="1600" b="1" dirty="0" smtClean="0"/>
-              <a:t> </a:t>
-            </a:r>
-            <a:r>
-              <a:rPr lang="it-IT" sz="1600" b="1" dirty="0" smtClean="0"/>
-              <a:t>server</a:t>
+              <a:rPr lang="it-IT" sz="1600" b="1" dirty="0"/>
+              <a:t> server</a:t>
             </a:r>
           </a:p>
           <a:p>
@@ -4295,7 +4315,7 @@
               <a:t> caricati: console servizio </a:t>
             </a:r>
             <a:r>
-              <a:rPr lang="it-IT" sz="1100" b="1" dirty="0" err="1" smtClean="0"/>
+              <a:rPr lang="it-IT" sz="1100" b="1" dirty="0" err="1"/>
               <a:t>Wcf</a:t>
             </a:r>
             <a:r>
@@ -4303,7 +4323,7 @@
               <a:t>, </a:t>
             </a:r>
             <a:r>
-              <a:rPr lang="it-IT" sz="1100" b="1" dirty="0" err="1" smtClean="0"/>
+              <a:rPr lang="it-IT" sz="1100" b="1" dirty="0" err="1"/>
               <a:t>Rest</a:t>
             </a:r>
             <a:r>
@@ -4311,18 +4331,18 @@
               <a:t>, </a:t>
             </a:r>
             <a:r>
-              <a:rPr lang="it-IT" sz="1100" b="1" dirty="0" err="1" smtClean="0"/>
+              <a:rPr lang="it-IT" sz="1100" b="1" dirty="0" err="1"/>
               <a:t>WCFConnectorManager</a:t>
             </a:r>
             <a:r>
-              <a:rPr lang="it-IT" sz="1100" b="1" dirty="0" smtClean="0"/>
+              <a:rPr lang="it-IT" sz="1100" b="1" dirty="0"/>
               <a:t>, </a:t>
             </a:r>
             <a:r>
-              <a:rPr lang="it-IT" sz="1100" b="1" dirty="0" err="1" smtClean="0"/>
+              <a:rPr lang="it-IT" sz="1100" b="1" dirty="0" err="1"/>
               <a:t>WebApi</a:t>
             </a:r>
-            <a:endParaRPr lang="it-IT" sz="1100" b="1" dirty="0" smtClean="0"/>
+            <a:endParaRPr lang="it-IT" sz="1100" b="1" dirty="0"/>
           </a:p>
           <a:p>
             <a:pPr lvl="1"/>
@@ -4354,7 +4374,6 @@
               <a:rPr lang="it-IT" sz="1100" b="1" dirty="0"/>
               <a:t>, configurazione </a:t>
             </a:r>
-            <a:endParaRPr lang="it-IT" sz="1100" b="1" dirty="0" smtClean="0"/>
           </a:p>
           <a:p>
             <a:pPr lvl="1"/>
@@ -4371,97 +4390,76 @@
               <a:t> </a:t>
             </a:r>
             <a:r>
-              <a:rPr lang="it-IT" sz="1100" b="1" dirty="0" err="1" smtClean="0"/>
+              <a:rPr lang="it-IT" sz="1100" b="1" dirty="0" err="1"/>
               <a:t>rest</a:t>
             </a:r>
-            <a:endParaRPr lang="it-IT" sz="1100" b="1" dirty="0" smtClean="0"/>
+            <a:endParaRPr lang="it-IT" sz="1100" b="1" dirty="0"/>
           </a:p>
           <a:p>
             <a:pPr lvl="1"/>
             <a:r>
-              <a:rPr lang="it-IT" sz="1100" b="1" dirty="0" smtClean="0"/>
-              <a:t>Gli eventi di </a:t>
-            </a:r>
-            <a:r>
-              <a:rPr lang="it-IT" sz="1100" b="1" dirty="0" smtClean="0"/>
-              <a:t>«</a:t>
-            </a:r>
-            <a:r>
-              <a:rPr lang="it-IT" sz="1100" b="1" dirty="0" err="1" smtClean="0"/>
+              <a:rPr lang="it-IT" sz="1100" b="1" dirty="0"/>
+              <a:t>Gli eventi di «</a:t>
+            </a:r>
+            <a:r>
+              <a:rPr lang="it-IT" sz="1100" b="1" dirty="0" err="1"/>
               <a:t>Before</a:t>
             </a:r>
             <a:r>
-              <a:rPr lang="it-IT" sz="1100" b="1" dirty="0" smtClean="0"/>
-              <a:t>» </a:t>
-            </a:r>
-            <a:r>
-              <a:rPr lang="it-IT" sz="1100" b="1" dirty="0" smtClean="0"/>
-              <a:t>e </a:t>
-            </a:r>
-            <a:r>
-              <a:rPr lang="it-IT" sz="1100" b="1" dirty="0" smtClean="0"/>
-              <a:t>«</a:t>
-            </a:r>
-            <a:r>
-              <a:rPr lang="it-IT" sz="1100" b="1" dirty="0" err="1" smtClean="0"/>
+              <a:rPr lang="it-IT" sz="1100" b="1" dirty="0"/>
+              <a:t>» e «</a:t>
+            </a:r>
+            <a:r>
+              <a:rPr lang="it-IT" sz="1100" b="1" dirty="0" err="1"/>
               <a:t>After</a:t>
             </a:r>
             <a:r>
-              <a:rPr lang="it-IT" sz="1100" b="1" dirty="0" smtClean="0"/>
+              <a:rPr lang="it-IT" sz="1100" b="1" dirty="0"/>
               <a:t>»</a:t>
             </a:r>
-            <a:endParaRPr lang="it-IT" sz="1100" b="1" dirty="0" smtClean="0"/>
           </a:p>
           <a:p>
             <a:pPr lvl="1"/>
             <a:r>
-              <a:rPr lang="it-IT" sz="1100" b="1" dirty="0" smtClean="0"/>
+              <a:rPr lang="it-IT" sz="1100" b="1" dirty="0"/>
               <a:t>Gestione della configurazione dei </a:t>
             </a:r>
             <a:r>
-              <a:rPr lang="it-IT" sz="1100" b="1" dirty="0" err="1" smtClean="0"/>
+              <a:rPr lang="it-IT" sz="1100" b="1" dirty="0" err="1"/>
               <a:t>plugin</a:t>
             </a:r>
             <a:r>
               <a:rPr lang="it-IT" sz="1100" b="1" dirty="0"/>
-              <a:t> </a:t>
-            </a:r>
-            <a:r>
-              <a:rPr lang="it-IT" sz="1100" b="1" dirty="0" smtClean="0"/>
-              <a:t>server</a:t>
+              <a:t> server</a:t>
             </a:r>
           </a:p>
           <a:p>
             <a:pPr lvl="1"/>
             <a:r>
-              <a:rPr lang="it-IT" sz="1100" b="1" dirty="0" smtClean="0"/>
-              <a:t>Deployment </a:t>
-            </a:r>
-            <a:r>
               <a:rPr lang="it-IT" sz="1100" b="1" dirty="0"/>
-              <a:t>e </a:t>
-            </a:r>
-            <a:r>
-              <a:rPr lang="it-IT" sz="1100" b="1" dirty="0" err="1" smtClean="0"/>
+              <a:t>Deployment e </a:t>
+            </a:r>
+            <a:r>
+              <a:rPr lang="it-IT" sz="1100" b="1" dirty="0" err="1"/>
               <a:t>debug</a:t>
             </a:r>
             <a:r>
-              <a:rPr lang="it-IT" sz="1100" b="1" dirty="0" smtClean="0"/>
+              <a:rPr lang="it-IT" sz="1100" b="1" dirty="0"/>
               <a:t>: </a:t>
             </a:r>
             <a:r>
-              <a:rPr lang="it-IT" sz="1100" b="1" dirty="0" err="1" smtClean="0"/>
+              <a:rPr lang="it-IT" sz="1100" b="1" dirty="0" err="1"/>
               <a:t>Wcf</a:t>
             </a:r>
             <a:r>
-              <a:rPr lang="it-IT" sz="1100" b="1" dirty="0" smtClean="0"/>
+              <a:rPr lang="it-IT" sz="1100" b="1" dirty="0"/>
               <a:t>, </a:t>
             </a:r>
             <a:r>
-              <a:rPr lang="it-IT" sz="1100" b="1" dirty="0" err="1" smtClean="0"/>
+              <a:rPr lang="it-IT" sz="1100" b="1" dirty="0" err="1"/>
               <a:t>WebApi</a:t>
             </a:r>
-            <a:endParaRPr lang="it-IT" sz="1100" b="1" dirty="0" smtClean="0"/>
+            <a:endParaRPr lang="it-IT" sz="1100" b="1" dirty="0"/>
           </a:p>
           <a:p>
             <a:pPr lvl="1"/>
@@ -4477,13 +4475,13 @@
             <a:pPr marL="457200" lvl="1" indent="0">
               <a:buNone/>
             </a:pPr>
-            <a:endParaRPr lang="it-IT" sz="600" b="1" dirty="0" smtClean="0"/>
-          </a:p>
-          <a:p>
-            <a:endParaRPr lang="it-IT" sz="1000" b="1" dirty="0" smtClean="0"/>
-          </a:p>
-          <a:p>
-            <a:endParaRPr lang="it-IT" sz="1000" b="1" dirty="0" smtClean="0"/>
+            <a:endParaRPr lang="it-IT" sz="600" b="1" dirty="0"/>
+          </a:p>
+          <a:p>
+            <a:endParaRPr lang="it-IT" sz="1000" b="1" dirty="0"/>
+          </a:p>
+          <a:p>
+            <a:endParaRPr lang="it-IT" sz="1000" b="1" dirty="0"/>
           </a:p>
         </p:txBody>
       </p:sp>
@@ -4497,13 +4495,6 @@
   <p:clrMapOvr>
     <a:masterClrMapping/>
   </p:clrMapOvr>
-  <p:timing>
-    <p:tnLst>
-      <p:par>
-        <p:cTn id="1" dur="indefinite" restart="never" nodeType="tmRoot"/>
-      </p:par>
-    </p:tnLst>
-  </p:timing>
 </p:sld>
 </file>
 
@@ -4547,7 +4538,7 @@
           <a:lstStyle/>
           <a:p>
             <a:r>
-              <a:rPr lang="it-IT" dirty="0" smtClean="0">
+              <a:rPr lang="it-IT" dirty="0">
                 <a:solidFill>
                   <a:srgbClr val="FFC000"/>
                 </a:solidFill>
@@ -4561,18 +4552,6 @@
               </a:rPr>
               <a:t>Programma della giornata</a:t>
             </a:r>
-            <a:endParaRPr lang="it-IT" dirty="0">
-              <a:solidFill>
-                <a:srgbClr val="FFC000"/>
-              </a:solidFill>
-              <a:effectLst>
-                <a:outerShdw blurRad="38100" dist="38100" dir="2700000" algn="tl">
-                  <a:srgbClr val="000000">
-                    <a:alpha val="43137"/>
-                  </a:srgbClr>
-                </a:outerShdw>
-              </a:effectLst>
-            </a:endParaRPr>
           </a:p>
         </p:txBody>
       </p:sp>
@@ -4601,101 +4580,50 @@
             <a:pPr marL="457200" lvl="1" indent="0">
               <a:buNone/>
             </a:pPr>
-            <a:endParaRPr lang="it-IT" sz="1000" b="1" dirty="0" smtClean="0"/>
-          </a:p>
-          <a:p>
-            <a:r>
-              <a:rPr lang="it-IT" sz="1600" b="1" dirty="0" err="1" smtClean="0"/>
+            <a:endParaRPr lang="it-IT" sz="1000" b="1" dirty="0"/>
+          </a:p>
+          <a:p>
+            <a:r>
+              <a:rPr lang="it-IT" sz="1600" b="1" dirty="0" err="1"/>
               <a:t>Plugin</a:t>
             </a:r>
             <a:r>
-              <a:rPr lang="it-IT" sz="1600" b="1" dirty="0" smtClean="0"/>
+              <a:rPr lang="it-IT" sz="1600" b="1" dirty="0"/>
               <a:t> client</a:t>
             </a:r>
-            <a:endParaRPr lang="it-IT" sz="1050" b="1" dirty="0" smtClean="0"/>
+            <a:endParaRPr lang="it-IT" sz="1050" b="1" dirty="0"/>
           </a:p>
           <a:p>
             <a:pPr lvl="1"/>
             <a:r>
-              <a:rPr lang="it-IT" sz="1100" b="1" dirty="0" err="1" smtClean="0"/>
-              <a:t>Ribbon</a:t>
-            </a:r>
-            <a:r>
-              <a:rPr lang="it-IT" sz="1100" b="1" dirty="0" smtClean="0"/>
-              <a:t> </a:t>
+              <a:rPr lang="it-IT" sz="1100" b="1" dirty="0"/>
+              <a:t>Ribbon </a:t>
             </a:r>
             <a:r>
               <a:rPr lang="it-IT" sz="1100" b="1" dirty="0" err="1"/>
               <a:t>main</a:t>
             </a:r>
+            <a:endParaRPr lang="it-IT" sz="1100" b="1" dirty="0"/>
+          </a:p>
+          <a:p>
+            <a:pPr lvl="1"/>
             <a:r>
               <a:rPr lang="it-IT" sz="1100" b="1" dirty="0"/>
-              <a:t> </a:t>
-            </a:r>
-            <a:r>
-              <a:rPr lang="it-IT" sz="1050" b="1" dirty="0"/>
-              <a:t>(</a:t>
-            </a:r>
-            <a:r>
-              <a:rPr lang="it-IT" sz="1050" b="1" i="1" dirty="0" err="1"/>
-              <a:t>Abletech.Arxivar.Client.PlugIn.AbstractPluginRibbonMain</a:t>
-            </a:r>
-            <a:r>
-              <a:rPr lang="it-IT" sz="1050" b="1" dirty="0"/>
-              <a:t>)</a:t>
+              <a:t>Archiviazione</a:t>
             </a:r>
           </a:p>
           <a:p>
             <a:pPr lvl="1"/>
             <a:r>
               <a:rPr lang="it-IT" sz="1100" b="1" dirty="0"/>
-              <a:t>Archiviazione </a:t>
-            </a:r>
-            <a:r>
-              <a:rPr lang="it-IT" sz="1100" b="1" dirty="0" smtClean="0"/>
-              <a:t>(</a:t>
-            </a:r>
-            <a:r>
-              <a:rPr lang="it-IT" sz="1050" b="1" i="1" dirty="0"/>
-              <a:t>Abletech.Arxivar.Client.PlugIn.AbstractPluginRibbonArchiviazione</a:t>
-            </a:r>
-            <a:r>
-              <a:rPr lang="it-IT" sz="1100" b="1" dirty="0" smtClean="0"/>
-              <a:t>)</a:t>
+              <a:t>Comandi profili</a:t>
             </a:r>
           </a:p>
           <a:p>
             <a:pPr lvl="1"/>
             <a:r>
-              <a:rPr lang="it-IT" sz="1100" b="1" dirty="0" smtClean="0"/>
-              <a:t>Comandi profili (</a:t>
-            </a:r>
-            <a:r>
-              <a:rPr lang="it-IT" sz="1050" b="1" i="1" dirty="0" err="1"/>
-              <a:t>Abletech.Arxivar.Client.PlugIn.AbstractPluginTaskPanelDocuments</a:t>
-            </a:r>
-            <a:r>
-              <a:rPr lang="it-IT" sz="1100" b="1" dirty="0" smtClean="0"/>
-              <a:t>)</a:t>
-            </a:r>
-          </a:p>
-          <a:p>
-            <a:pPr lvl="1"/>
-            <a:r>
-              <a:rPr lang="it-IT" sz="1100" b="1" dirty="0" smtClean="0"/>
-              <a:t>Comandi </a:t>
-            </a:r>
-            <a:r>
               <a:rPr lang="it-IT" sz="1100" b="1" dirty="0"/>
-              <a:t>fascicoli (</a:t>
-            </a:r>
-            <a:r>
-              <a:rPr lang="it-IT" sz="1050" b="1" i="1" dirty="0" err="1"/>
-              <a:t>Abletech.Arxivar.Client.PlugIn.AbstractPluginTaskPanelFolders</a:t>
-            </a:r>
-            <a:r>
-              <a:rPr lang="it-IT" sz="1100" b="1" dirty="0"/>
-              <a:t>)</a:t>
+              <a:t>Comandi fascicoli</a:t>
             </a:r>
           </a:p>
           <a:p>
@@ -4710,76 +4638,55 @@
             </a:r>
             <a:r>
               <a:rPr lang="it-IT" sz="1100" b="1" dirty="0"/>
-              <a:t>/modelli (</a:t>
-            </a:r>
-            <a:r>
-              <a:rPr lang="it-IT" sz="1050" b="1" i="1" dirty="0" err="1"/>
-              <a:t>Abletech.Arxivar.Client.PlugIn.AbstractPluginEvents</a:t>
-            </a:r>
+              <a:t>/modelli</a:t>
+            </a:r>
+          </a:p>
+          <a:p>
+            <a:pPr lvl="1"/>
             <a:r>
               <a:rPr lang="it-IT" sz="1100" b="1" dirty="0"/>
-              <a:t>)</a:t>
+              <a:t>Deployment manuale di un plugin</a:t>
             </a:r>
           </a:p>
           <a:p>
             <a:pPr lvl="1"/>
             <a:r>
-              <a:rPr lang="it-IT" sz="1100" b="1" dirty="0" smtClean="0"/>
-              <a:t>Deployment manuale di un </a:t>
-            </a:r>
-            <a:r>
-              <a:rPr lang="it-IT" sz="1100" b="1" dirty="0" err="1" smtClean="0"/>
+              <a:rPr lang="it-IT" sz="1100" b="1" dirty="0"/>
+              <a:t>Deployment automatico tramite </a:t>
+            </a:r>
+            <a:r>
+              <a:rPr lang="it-IT" sz="1100" b="1" dirty="0" err="1"/>
+              <a:t>ARXivar</a:t>
+            </a:r>
+            <a:r>
+              <a:rPr lang="it-IT" sz="1100" b="1" dirty="0"/>
+              <a:t> Server</a:t>
+            </a:r>
+          </a:p>
+          <a:p>
+            <a:pPr lvl="1"/>
+            <a:r>
+              <a:rPr lang="it-IT" sz="1100" b="1" dirty="0" err="1"/>
+              <a:t>Debug</a:t>
+            </a:r>
+            <a:r>
+              <a:rPr lang="it-IT" sz="1100" b="1" dirty="0"/>
+              <a:t> di un </a:t>
+            </a:r>
+            <a:r>
+              <a:rPr lang="it-IT" sz="1100" b="1" dirty="0" err="1"/>
               <a:t>plugin</a:t>
             </a:r>
-            <a:endParaRPr lang="it-IT" sz="1100" b="1" dirty="0" smtClean="0"/>
-          </a:p>
-          <a:p>
-            <a:pPr lvl="1"/>
-            <a:r>
-              <a:rPr lang="it-IT" sz="1100" b="1" dirty="0" smtClean="0"/>
-              <a:t>Deployment automatico tramite </a:t>
-            </a:r>
-            <a:r>
-              <a:rPr lang="it-IT" sz="1100" b="1" dirty="0" err="1" smtClean="0"/>
-              <a:t>ARXivar</a:t>
-            </a:r>
-            <a:r>
-              <a:rPr lang="it-IT" sz="1100" b="1" dirty="0" smtClean="0"/>
-              <a:t> Server</a:t>
-            </a:r>
-          </a:p>
-          <a:p>
-            <a:pPr lvl="1"/>
-            <a:r>
-              <a:rPr lang="it-IT" sz="1100" b="1" dirty="0" err="1" smtClean="0"/>
-              <a:t>Debug</a:t>
-            </a:r>
             <a:r>
               <a:rPr lang="it-IT" sz="1100" b="1" dirty="0"/>
-              <a:t> </a:t>
-            </a:r>
-            <a:r>
-              <a:rPr lang="it-IT" sz="1100" b="1" dirty="0" smtClean="0"/>
-              <a:t>di un </a:t>
-            </a:r>
-            <a:r>
-              <a:rPr lang="it-IT" sz="1100" b="1" dirty="0" err="1" smtClean="0"/>
-              <a:t>plugin</a:t>
-            </a:r>
-            <a:r>
-              <a:rPr lang="it-IT" sz="1100" b="1" dirty="0" smtClean="0"/>
-              <a:t> </a:t>
-            </a:r>
-            <a:r>
-              <a:rPr lang="it-IT" sz="1100" b="1" dirty="0" smtClean="0"/>
-              <a:t>client</a:t>
+              <a:t> client</a:t>
             </a:r>
           </a:p>
           <a:p>
             <a:pPr marL="457200" lvl="1" indent="0">
               <a:buNone/>
             </a:pPr>
-            <a:endParaRPr lang="it-IT" sz="1100" b="1" dirty="0" smtClean="0"/>
+            <a:endParaRPr lang="it-IT" sz="1100" b="1" dirty="0"/>
           </a:p>
           <a:p>
             <a:r>
@@ -4800,83 +4707,22 @@
             <a:pPr lvl="1"/>
             <a:r>
               <a:rPr lang="it-IT" sz="1200" b="1" dirty="0"/>
-              <a:t>Task </a:t>
-            </a:r>
-            <a:r>
-              <a:rPr lang="it-IT" sz="1200" b="1" dirty="0" err="1"/>
-              <a:t>workflow</a:t>
-            </a:r>
-            <a:r>
-              <a:rPr lang="it-IT" sz="1200" b="1" dirty="0"/>
-              <a:t> (</a:t>
-            </a:r>
-            <a:r>
-              <a:rPr lang="it-IT" sz="1100" b="1" i="1" dirty="0" err="1"/>
-              <a:t>Abletech.Arxivar.Client.PlugIn.AbstractPluginCmdFrmTask</a:t>
-            </a:r>
-            <a:r>
-              <a:rPr lang="it-IT" sz="1200" b="1" dirty="0" smtClean="0"/>
-              <a:t>)</a:t>
-            </a:r>
-            <a:endParaRPr lang="it-IT" sz="1100" b="1" dirty="0" smtClean="0"/>
+              <a:t>Task workflow</a:t>
+            </a:r>
           </a:p>
           <a:p>
             <a:pPr lvl="1"/>
             <a:r>
-              <a:rPr lang="it-IT" sz="1100" b="1" dirty="0" err="1" smtClean="0"/>
-              <a:t>Plugin</a:t>
-            </a:r>
-            <a:r>
-              <a:rPr lang="it-IT" sz="1100" b="1" dirty="0" smtClean="0"/>
-              <a:t> </a:t>
-            </a:r>
-            <a:r>
-              <a:rPr lang="it-IT" sz="1100" b="1" dirty="0" err="1"/>
-              <a:t>Workflow</a:t>
-            </a:r>
-            <a:r>
               <a:rPr lang="it-IT" sz="1100" b="1" dirty="0"/>
-              <a:t> Link (</a:t>
-            </a:r>
-            <a:r>
-              <a:rPr lang="it-IT" sz="1050" b="1" i="1" dirty="0"/>
-              <a:t>Abletech.Arxivar.Client.PlugIn.Workflow.AbstractPluginOperationLink</a:t>
-            </a:r>
+              <a:t>Plugin Workflow</a:t>
+            </a:r>
+          </a:p>
+          <a:p>
+            <a:pPr lvl="1"/>
             <a:r>
               <a:rPr lang="it-IT" sz="1100" b="1" dirty="0"/>
-              <a:t>)</a:t>
-            </a:r>
-          </a:p>
-          <a:p>
-            <a:pPr lvl="1"/>
-            <a:r>
-              <a:rPr lang="it-IT" sz="1100" b="1" dirty="0" err="1"/>
-              <a:t>Plugin</a:t>
-            </a:r>
-            <a:r>
-              <a:rPr lang="it-IT" sz="1100" b="1" dirty="0"/>
-              <a:t> </a:t>
-            </a:r>
-            <a:r>
-              <a:rPr lang="it-IT" sz="1100" b="1" dirty="0" err="1"/>
-              <a:t>Workflow</a:t>
-            </a:r>
-            <a:r>
-              <a:rPr lang="it-IT" sz="1100" b="1" dirty="0"/>
-              <a:t> Task (</a:t>
-            </a:r>
-            <a:r>
-              <a:rPr lang="it-IT" sz="1050" b="1" i="1" dirty="0"/>
-              <a:t>Abletech.Arxivar.Client.PlugIn.Workflow.AbstractPluginOperationTask</a:t>
-            </a:r>
-            <a:r>
-              <a:rPr lang="it-IT" sz="1100" b="1" dirty="0" smtClean="0"/>
-              <a:t>)</a:t>
-            </a:r>
-          </a:p>
-          <a:p>
-            <a:pPr lvl="1"/>
-            <a:endParaRPr lang="it-IT" sz="1100" b="1" dirty="0" smtClean="0"/>
+              <a:t>Plugin Workflow</a:t>
+            </a:r>
           </a:p>
           <a:p>
             <a:pPr marL="457200" lvl="1" indent="0">
@@ -4886,13 +4732,13 @@
           </a:p>
           <a:p>
             <a:pPr lvl="1"/>
-            <a:endParaRPr lang="it-IT" sz="200" b="1" dirty="0" smtClean="0"/>
-          </a:p>
-          <a:p>
-            <a:endParaRPr lang="it-IT" sz="1000" b="1" dirty="0" smtClean="0"/>
-          </a:p>
-          <a:p>
-            <a:endParaRPr lang="it-IT" sz="1000" b="1" dirty="0" smtClean="0"/>
+            <a:endParaRPr lang="it-IT" sz="200" b="1" dirty="0"/>
+          </a:p>
+          <a:p>
+            <a:endParaRPr lang="it-IT" sz="1000" b="1" dirty="0"/>
+          </a:p>
+          <a:p>
+            <a:endParaRPr lang="it-IT" sz="1000" b="1" dirty="0"/>
           </a:p>
         </p:txBody>
       </p:sp>
@@ -4906,13 +4752,6 @@
   <p:clrMapOvr>
     <a:masterClrMapping/>
   </p:clrMapOvr>
-  <p:timing>
-    <p:tnLst>
-      <p:par>
-        <p:cTn id="1" dur="indefinite" restart="never" nodeType="tmRoot"/>
-      </p:par>
-    </p:tnLst>
-  </p:timing>
 </p:sld>
 </file>
 
@@ -4964,7 +4803,7 @@
           <a:lstStyle/>
           <a:p>
             <a:r>
-              <a:rPr lang="it-IT" sz="4000" dirty="0" smtClean="0">
+              <a:rPr lang="it-IT" sz="4000" dirty="0">
                 <a:ln w="10541" cmpd="sng">
                   <a:noFill/>
                   <a:prstDash val="solid"/>
@@ -4984,7 +4823,7 @@
               <a:t>Architettura </a:t>
             </a:r>
             <a:r>
-              <a:rPr lang="it-IT" sz="4000" dirty="0" err="1" smtClean="0">
+              <a:rPr lang="it-IT" sz="4000" dirty="0" err="1">
                 <a:ln w="10541" cmpd="sng">
                   <a:noFill/>
                   <a:prstDash val="solid"/>
@@ -5057,13 +4896,715 @@
   <p:clrMapOvr>
     <a:masterClrMapping/>
   </p:clrMapOvr>
-  <p:timing>
-    <p:tnLst>
-      <p:par>
-        <p:cTn id="1" dur="indefinite" restart="never" nodeType="tmRoot"/>
-      </p:par>
-    </p:tnLst>
-  </p:timing>
+</p:sld>
+</file>
+
+<file path=ppt/slides/slide5.xml><?xml version="1.0" encoding="utf-8"?>
+<p:sld xmlns:a="http://schemas.openxmlformats.org/drawingml/2006/main" xmlns:r="http://schemas.openxmlformats.org/officeDocument/2006/relationships" xmlns:p="http://schemas.openxmlformats.org/presentationml/2006/main">
+  <p:cSld>
+    <p:bg>
+      <p:bgPr>
+        <a:solidFill>
+          <a:schemeClr val="bg1"/>
+        </a:solidFill>
+        <a:effectLst/>
+      </p:bgPr>
+    </p:bg>
+    <p:spTree>
+      <p:nvGrpSpPr>
+        <p:cNvPr id="1" name=""/>
+        <p:cNvGrpSpPr/>
+        <p:nvPr/>
+      </p:nvGrpSpPr>
+      <p:grpSpPr>
+        <a:xfrm>
+          <a:off x="0" y="0"/>
+          <a:ext cx="0" cy="0"/>
+          <a:chOff x="0" y="0"/>
+          <a:chExt cx="0" cy="0"/>
+        </a:xfrm>
+      </p:grpSpPr>
+      <p:sp>
+        <p:nvSpPr>
+          <p:cNvPr id="2" name="Titolo 1"/>
+          <p:cNvSpPr>
+            <a:spLocks noGrp="1"/>
+          </p:cNvSpPr>
+          <p:nvPr>
+            <p:ph type="title"/>
+          </p:nvPr>
+        </p:nvSpPr>
+        <p:spPr>
+          <a:xfrm>
+            <a:off x="467544" y="195486"/>
+            <a:ext cx="6131024" cy="864096"/>
+          </a:xfrm>
+        </p:spPr>
+        <p:txBody>
+          <a:bodyPr>
+            <a:normAutofit/>
+          </a:bodyPr>
+          <a:lstStyle/>
+          <a:p>
+            <a:r>
+              <a:rPr lang="it-IT" sz="2400" dirty="0">
+                <a:ln w="10541" cmpd="sng">
+                  <a:noFill/>
+                  <a:prstDash val="solid"/>
+                </a:ln>
+                <a:solidFill>
+                  <a:srgbClr val="FFC000"/>
+                </a:solidFill>
+                <a:effectLst>
+                  <a:outerShdw blurRad="50800" dist="38100" dir="2700000" algn="tl" rotWithShape="0">
+                    <a:prstClr val="black">
+                      <a:alpha val="40000"/>
+                    </a:prstClr>
+                  </a:outerShdw>
+                </a:effectLst>
+                <a:latin typeface="+mn-lt"/>
+              </a:rPr>
+              <a:t>Esempio flusso eventi plugin server</a:t>
+            </a:r>
+          </a:p>
+        </p:txBody>
+      </p:sp>
+      <p:sp>
+        <p:nvSpPr>
+          <p:cNvPr id="3" name="Rettangolo con angoli arrotondati 2">
+            <a:extLst>
+              <a:ext uri="{FF2B5EF4-FFF2-40B4-BE49-F238E27FC236}">
+                <a16:creationId xmlns:a16="http://schemas.microsoft.com/office/drawing/2014/main" id="{4A573111-F929-44F5-A41A-778569661B3D}"/>
+              </a:ext>
+            </a:extLst>
+          </p:cNvPr>
+          <p:cNvSpPr/>
+          <p:nvPr/>
+        </p:nvSpPr>
+        <p:spPr>
+          <a:xfrm>
+            <a:off x="894899" y="1213966"/>
+            <a:ext cx="3600400" cy="360040"/>
+          </a:xfrm>
+          <a:prstGeom prst="roundRect">
+            <a:avLst/>
+          </a:prstGeom>
+        </p:spPr>
+        <p:style>
+          <a:lnRef idx="2">
+            <a:schemeClr val="accent1">
+              <a:shade val="50000"/>
+            </a:schemeClr>
+          </a:lnRef>
+          <a:fillRef idx="1">
+            <a:schemeClr val="accent1"/>
+          </a:fillRef>
+          <a:effectRef idx="0">
+            <a:schemeClr val="accent1"/>
+          </a:effectRef>
+          <a:fontRef idx="minor">
+            <a:schemeClr val="lt1"/>
+          </a:fontRef>
+        </p:style>
+        <p:txBody>
+          <a:bodyPr rtlCol="0" anchor="ctr"/>
+          <a:lstStyle/>
+          <a:p>
+            <a:pPr algn="ctr"/>
+            <a:r>
+              <a:rPr lang="it-IT" dirty="0" err="1"/>
+              <a:t>On_Invoke_Dm_Profile_Update</a:t>
+            </a:r>
+            <a:endParaRPr lang="it-IT" dirty="0"/>
+          </a:p>
+        </p:txBody>
+      </p:sp>
+      <p:sp>
+        <p:nvSpPr>
+          <p:cNvPr id="5" name="Rettangolo con angoli arrotondati 4">
+            <a:extLst>
+              <a:ext uri="{FF2B5EF4-FFF2-40B4-BE49-F238E27FC236}">
+                <a16:creationId xmlns:a16="http://schemas.microsoft.com/office/drawing/2014/main" id="{FFACDE9D-3291-4AF1-B263-752BD9331C62}"/>
+              </a:ext>
+            </a:extLst>
+          </p:cNvPr>
+          <p:cNvSpPr/>
+          <p:nvPr/>
+        </p:nvSpPr>
+        <p:spPr>
+          <a:xfrm>
+            <a:off x="894899" y="2673085"/>
+            <a:ext cx="3600400" cy="360040"/>
+          </a:xfrm>
+          <a:prstGeom prst="roundRect">
+            <a:avLst/>
+          </a:prstGeom>
+        </p:spPr>
+        <p:style>
+          <a:lnRef idx="2">
+            <a:schemeClr val="accent1">
+              <a:shade val="50000"/>
+            </a:schemeClr>
+          </a:lnRef>
+          <a:fillRef idx="1">
+            <a:schemeClr val="accent1"/>
+          </a:fillRef>
+          <a:effectRef idx="0">
+            <a:schemeClr val="accent1"/>
+          </a:effectRef>
+          <a:fontRef idx="minor">
+            <a:schemeClr val="lt1"/>
+          </a:fontRef>
+        </p:style>
+        <p:txBody>
+          <a:bodyPr rtlCol="0" anchor="ctr"/>
+          <a:lstStyle/>
+          <a:p>
+            <a:pPr algn="ctr"/>
+            <a:r>
+              <a:rPr lang="it-IT" dirty="0" err="1"/>
+              <a:t>On_Before_Dm_Profile_Update</a:t>
+            </a:r>
+            <a:endParaRPr lang="it-IT" dirty="0"/>
+          </a:p>
+        </p:txBody>
+      </p:sp>
+      <p:sp>
+        <p:nvSpPr>
+          <p:cNvPr id="6" name="Rettangolo con angoli arrotondati 5">
+            <a:extLst>
+              <a:ext uri="{FF2B5EF4-FFF2-40B4-BE49-F238E27FC236}">
+                <a16:creationId xmlns:a16="http://schemas.microsoft.com/office/drawing/2014/main" id="{C8774B01-958C-4AF9-80AD-880ADBF506D5}"/>
+              </a:ext>
+            </a:extLst>
+          </p:cNvPr>
+          <p:cNvSpPr/>
+          <p:nvPr/>
+        </p:nvSpPr>
+        <p:spPr>
+          <a:xfrm>
+            <a:off x="894899" y="4075812"/>
+            <a:ext cx="3600400" cy="360040"/>
+          </a:xfrm>
+          <a:prstGeom prst="roundRect">
+            <a:avLst/>
+          </a:prstGeom>
+        </p:spPr>
+        <p:style>
+          <a:lnRef idx="2">
+            <a:schemeClr val="accent1">
+              <a:shade val="50000"/>
+            </a:schemeClr>
+          </a:lnRef>
+          <a:fillRef idx="1">
+            <a:schemeClr val="accent1"/>
+          </a:fillRef>
+          <a:effectRef idx="0">
+            <a:schemeClr val="accent1"/>
+          </a:effectRef>
+          <a:fontRef idx="minor">
+            <a:schemeClr val="lt1"/>
+          </a:fontRef>
+        </p:style>
+        <p:txBody>
+          <a:bodyPr rtlCol="0" anchor="ctr"/>
+          <a:lstStyle/>
+          <a:p>
+            <a:pPr algn="ctr"/>
+            <a:r>
+              <a:rPr lang="en-US" dirty="0" err="1"/>
+              <a:t>On_After_Dm_Profile_Update</a:t>
+            </a:r>
+            <a:endParaRPr lang="it-IT" dirty="0"/>
+          </a:p>
+        </p:txBody>
+      </p:sp>
+      <p:sp>
+        <p:nvSpPr>
+          <p:cNvPr id="8" name="Rettangolo con un angolo ritagliato 7">
+            <a:extLst>
+              <a:ext uri="{FF2B5EF4-FFF2-40B4-BE49-F238E27FC236}">
+                <a16:creationId xmlns:a16="http://schemas.microsoft.com/office/drawing/2014/main" id="{1C90C993-71F6-4F98-857D-CCCEBE813272}"/>
+              </a:ext>
+            </a:extLst>
+          </p:cNvPr>
+          <p:cNvSpPr/>
+          <p:nvPr/>
+        </p:nvSpPr>
+        <p:spPr>
+          <a:xfrm>
+            <a:off x="1403648" y="2303806"/>
+            <a:ext cx="2808312" cy="288032"/>
+          </a:xfrm>
+          <a:prstGeom prst="snip1Rect">
+            <a:avLst/>
+          </a:prstGeom>
+          <a:solidFill>
+            <a:srgbClr val="00B0F0"/>
+          </a:solidFill>
+        </p:spPr>
+        <p:style>
+          <a:lnRef idx="2">
+            <a:schemeClr val="accent1">
+              <a:shade val="50000"/>
+            </a:schemeClr>
+          </a:lnRef>
+          <a:fillRef idx="1">
+            <a:schemeClr val="accent1"/>
+          </a:fillRef>
+          <a:effectRef idx="0">
+            <a:schemeClr val="accent1"/>
+          </a:effectRef>
+          <a:fontRef idx="minor">
+            <a:schemeClr val="lt1"/>
+          </a:fontRef>
+        </p:style>
+        <p:txBody>
+          <a:bodyPr rtlCol="0" anchor="ctr"/>
+          <a:lstStyle/>
+          <a:p>
+            <a:pPr algn="ctr"/>
+            <a:r>
+              <a:rPr lang="it-IT" dirty="0" err="1"/>
+              <a:t>BeginTransaction</a:t>
+            </a:r>
+            <a:endParaRPr lang="it-IT" dirty="0"/>
+          </a:p>
+        </p:txBody>
+      </p:sp>
+      <p:sp>
+        <p:nvSpPr>
+          <p:cNvPr id="9" name="Rettangolo con un angolo ritagliato 8">
+            <a:extLst>
+              <a:ext uri="{FF2B5EF4-FFF2-40B4-BE49-F238E27FC236}">
+                <a16:creationId xmlns:a16="http://schemas.microsoft.com/office/drawing/2014/main" id="{784519E2-5A51-4391-AA7A-0768C5D1C063}"/>
+              </a:ext>
+            </a:extLst>
+          </p:cNvPr>
+          <p:cNvSpPr/>
+          <p:nvPr/>
+        </p:nvSpPr>
+        <p:spPr>
+          <a:xfrm>
+            <a:off x="1403648" y="3719670"/>
+            <a:ext cx="2808312" cy="288032"/>
+          </a:xfrm>
+          <a:prstGeom prst="snip1Rect">
+            <a:avLst/>
+          </a:prstGeom>
+          <a:solidFill>
+            <a:srgbClr val="00B0F0"/>
+          </a:solidFill>
+        </p:spPr>
+        <p:style>
+          <a:lnRef idx="2">
+            <a:schemeClr val="accent1">
+              <a:shade val="50000"/>
+            </a:schemeClr>
+          </a:lnRef>
+          <a:fillRef idx="1">
+            <a:schemeClr val="accent1"/>
+          </a:fillRef>
+          <a:effectRef idx="0">
+            <a:schemeClr val="accent1"/>
+          </a:effectRef>
+          <a:fontRef idx="minor">
+            <a:schemeClr val="lt1"/>
+          </a:fontRef>
+        </p:style>
+        <p:txBody>
+          <a:bodyPr rtlCol="0" anchor="ctr"/>
+          <a:lstStyle/>
+          <a:p>
+            <a:pPr algn="ctr"/>
+            <a:r>
+              <a:rPr lang="it-IT" dirty="0" err="1"/>
+              <a:t>Transaction</a:t>
+            </a:r>
+            <a:r>
+              <a:rPr lang="it-IT" dirty="0"/>
+              <a:t> </a:t>
+            </a:r>
+            <a:r>
+              <a:rPr lang="it-IT" dirty="0" err="1"/>
+              <a:t>commit</a:t>
+            </a:r>
+            <a:endParaRPr lang="it-IT" dirty="0"/>
+          </a:p>
+        </p:txBody>
+      </p:sp>
+      <p:sp>
+        <p:nvSpPr>
+          <p:cNvPr id="10" name="Rettangolo 9">
+            <a:extLst>
+              <a:ext uri="{FF2B5EF4-FFF2-40B4-BE49-F238E27FC236}">
+                <a16:creationId xmlns:a16="http://schemas.microsoft.com/office/drawing/2014/main" id="{066D6BC2-1186-439F-BF27-5E179E48BAC5}"/>
+              </a:ext>
+            </a:extLst>
+          </p:cNvPr>
+          <p:cNvSpPr/>
+          <p:nvPr/>
+        </p:nvSpPr>
+        <p:spPr>
+          <a:xfrm>
+            <a:off x="992716" y="1659632"/>
+            <a:ext cx="3312368" cy="576064"/>
+          </a:xfrm>
+          <a:prstGeom prst="rect">
+            <a:avLst/>
+          </a:prstGeom>
+        </p:spPr>
+        <p:style>
+          <a:lnRef idx="2">
+            <a:schemeClr val="accent3"/>
+          </a:lnRef>
+          <a:fillRef idx="1">
+            <a:schemeClr val="lt1"/>
+          </a:fillRef>
+          <a:effectRef idx="0">
+            <a:schemeClr val="accent3"/>
+          </a:effectRef>
+          <a:fontRef idx="minor">
+            <a:schemeClr val="dk1"/>
+          </a:fontRef>
+        </p:style>
+        <p:txBody>
+          <a:bodyPr rtlCol="0" anchor="ctr"/>
+          <a:lstStyle/>
+          <a:p>
+            <a:pPr marL="285750" indent="-285750">
+              <a:buFont typeface="Arial" panose="020B0604020202020204" pitchFamily="34" charset="0"/>
+              <a:buChar char="•"/>
+            </a:pPr>
+            <a:r>
+              <a:rPr lang="it-IT" sz="1400" dirty="0"/>
+              <a:t>Validazione argomenti</a:t>
+            </a:r>
+          </a:p>
+          <a:p>
+            <a:pPr marL="285750" indent="-285750">
+              <a:buFont typeface="Arial" panose="020B0604020202020204" pitchFamily="34" charset="0"/>
+              <a:buChar char="•"/>
+            </a:pPr>
+            <a:r>
+              <a:rPr lang="it-IT" sz="1400" dirty="0"/>
+              <a:t>Preparazione contesto della chiamata</a:t>
+            </a:r>
+          </a:p>
+        </p:txBody>
+      </p:sp>
+      <p:sp>
+        <p:nvSpPr>
+          <p:cNvPr id="11" name="Rettangolo con un angolo ritagliato 10">
+            <a:extLst>
+              <a:ext uri="{FF2B5EF4-FFF2-40B4-BE49-F238E27FC236}">
+                <a16:creationId xmlns:a16="http://schemas.microsoft.com/office/drawing/2014/main" id="{92001107-4108-4038-906C-1F83371A55B1}"/>
+              </a:ext>
+            </a:extLst>
+          </p:cNvPr>
+          <p:cNvSpPr/>
+          <p:nvPr/>
+        </p:nvSpPr>
+        <p:spPr>
+          <a:xfrm>
+            <a:off x="4994638" y="3077147"/>
+            <a:ext cx="2802398" cy="288032"/>
+          </a:xfrm>
+          <a:prstGeom prst="snip1Rect">
+            <a:avLst/>
+          </a:prstGeom>
+          <a:solidFill>
+            <a:srgbClr val="FF0000"/>
+          </a:solidFill>
+        </p:spPr>
+        <p:style>
+          <a:lnRef idx="2">
+            <a:schemeClr val="accent1">
+              <a:shade val="50000"/>
+            </a:schemeClr>
+          </a:lnRef>
+          <a:fillRef idx="1">
+            <a:schemeClr val="accent1"/>
+          </a:fillRef>
+          <a:effectRef idx="0">
+            <a:schemeClr val="accent1"/>
+          </a:effectRef>
+          <a:fontRef idx="minor">
+            <a:schemeClr val="lt1"/>
+          </a:fontRef>
+        </p:style>
+        <p:txBody>
+          <a:bodyPr rtlCol="0" anchor="ctr"/>
+          <a:lstStyle/>
+          <a:p>
+            <a:pPr algn="ctr"/>
+            <a:r>
+              <a:rPr lang="it-IT" dirty="0" err="1"/>
+              <a:t>Transaction</a:t>
+            </a:r>
+            <a:r>
+              <a:rPr lang="it-IT" dirty="0"/>
+              <a:t> </a:t>
+            </a:r>
+            <a:r>
+              <a:rPr lang="it-IT" dirty="0" err="1"/>
+              <a:t>Rollback</a:t>
+            </a:r>
+            <a:endParaRPr lang="it-IT" dirty="0"/>
+          </a:p>
+        </p:txBody>
+      </p:sp>
+      <p:sp>
+        <p:nvSpPr>
+          <p:cNvPr id="12" name="Rettangolo 11">
+            <a:extLst>
+              <a:ext uri="{FF2B5EF4-FFF2-40B4-BE49-F238E27FC236}">
+                <a16:creationId xmlns:a16="http://schemas.microsoft.com/office/drawing/2014/main" id="{84EB5C18-0F41-446F-B432-3BF194A6842B}"/>
+              </a:ext>
+            </a:extLst>
+          </p:cNvPr>
+          <p:cNvSpPr/>
+          <p:nvPr/>
+        </p:nvSpPr>
+        <p:spPr>
+          <a:xfrm>
+            <a:off x="993145" y="3107816"/>
+            <a:ext cx="3312368" cy="226695"/>
+          </a:xfrm>
+          <a:prstGeom prst="rect">
+            <a:avLst/>
+          </a:prstGeom>
+        </p:spPr>
+        <p:style>
+          <a:lnRef idx="2">
+            <a:schemeClr val="accent3"/>
+          </a:lnRef>
+          <a:fillRef idx="1">
+            <a:schemeClr val="lt1"/>
+          </a:fillRef>
+          <a:effectRef idx="0">
+            <a:schemeClr val="accent3"/>
+          </a:effectRef>
+          <a:fontRef idx="minor">
+            <a:schemeClr val="dk1"/>
+          </a:fontRef>
+        </p:style>
+        <p:txBody>
+          <a:bodyPr rtlCol="0" anchor="ctr"/>
+          <a:lstStyle/>
+          <a:p>
+            <a:pPr marL="285750" indent="-285750">
+              <a:buFont typeface="Arial" panose="020B0604020202020204" pitchFamily="34" charset="0"/>
+              <a:buChar char="•"/>
+            </a:pPr>
+            <a:r>
+              <a:rPr lang="it-IT" sz="1400" dirty="0"/>
+              <a:t>Annullamento operazione</a:t>
+            </a:r>
+          </a:p>
+        </p:txBody>
+      </p:sp>
+      <p:cxnSp>
+        <p:nvCxnSpPr>
+          <p:cNvPr id="14" name="Connettore 2 13">
+            <a:extLst>
+              <a:ext uri="{FF2B5EF4-FFF2-40B4-BE49-F238E27FC236}">
+                <a16:creationId xmlns:a16="http://schemas.microsoft.com/office/drawing/2014/main" id="{B8EC52A0-7C2F-4152-B25A-EAB6DFFE07D1}"/>
+              </a:ext>
+            </a:extLst>
+          </p:cNvPr>
+          <p:cNvCxnSpPr>
+            <a:stCxn id="12" idx="3"/>
+          </p:cNvCxnSpPr>
+          <p:nvPr/>
+        </p:nvCxnSpPr>
+        <p:spPr>
+          <a:xfrm flipV="1">
+            <a:off x="4305513" y="3221163"/>
+            <a:ext cx="532976" cy="1"/>
+          </a:xfrm>
+          <a:prstGeom prst="straightConnector1">
+            <a:avLst/>
+          </a:prstGeom>
+          <a:ln>
+            <a:tailEnd type="triangle"/>
+          </a:ln>
+        </p:spPr>
+        <p:style>
+          <a:lnRef idx="1">
+            <a:schemeClr val="accent1"/>
+          </a:lnRef>
+          <a:fillRef idx="0">
+            <a:schemeClr val="accent1"/>
+          </a:fillRef>
+          <a:effectRef idx="0">
+            <a:schemeClr val="accent1"/>
+          </a:effectRef>
+          <a:fontRef idx="minor">
+            <a:schemeClr val="tx1"/>
+          </a:fontRef>
+        </p:style>
+      </p:cxnSp>
+      <p:sp>
+        <p:nvSpPr>
+          <p:cNvPr id="15" name="Rettangolo 14">
+            <a:extLst>
+              <a:ext uri="{FF2B5EF4-FFF2-40B4-BE49-F238E27FC236}">
+                <a16:creationId xmlns:a16="http://schemas.microsoft.com/office/drawing/2014/main" id="{1EADF53D-EA0E-4ED0-87A3-3B03D2B327D4}"/>
+              </a:ext>
+            </a:extLst>
+          </p:cNvPr>
+          <p:cNvSpPr/>
+          <p:nvPr/>
+        </p:nvSpPr>
+        <p:spPr>
+          <a:xfrm>
+            <a:off x="992716" y="3412465"/>
+            <a:ext cx="3312368" cy="226695"/>
+          </a:xfrm>
+          <a:prstGeom prst="rect">
+            <a:avLst/>
+          </a:prstGeom>
+        </p:spPr>
+        <p:style>
+          <a:lnRef idx="2">
+            <a:schemeClr val="accent3"/>
+          </a:lnRef>
+          <a:fillRef idx="1">
+            <a:schemeClr val="lt1"/>
+          </a:fillRef>
+          <a:effectRef idx="0">
+            <a:schemeClr val="accent3"/>
+          </a:effectRef>
+          <a:fontRef idx="minor">
+            <a:schemeClr val="dk1"/>
+          </a:fontRef>
+        </p:style>
+        <p:txBody>
+          <a:bodyPr rtlCol="0" anchor="ctr"/>
+          <a:lstStyle/>
+          <a:p>
+            <a:pPr marL="285750" indent="-285750">
+              <a:buFont typeface="Arial" panose="020B0604020202020204" pitchFamily="34" charset="0"/>
+              <a:buChar char="•"/>
+            </a:pPr>
+            <a:r>
+              <a:rPr lang="it-IT" sz="1400" dirty="0"/>
+              <a:t>Modifica profilo</a:t>
+            </a:r>
+          </a:p>
+        </p:txBody>
+      </p:sp>
+      <p:sp>
+        <p:nvSpPr>
+          <p:cNvPr id="16" name="Rettangolo 15">
+            <a:extLst>
+              <a:ext uri="{FF2B5EF4-FFF2-40B4-BE49-F238E27FC236}">
+                <a16:creationId xmlns:a16="http://schemas.microsoft.com/office/drawing/2014/main" id="{24B031BE-D756-4EE8-BCBD-704FB6628C9B}"/>
+              </a:ext>
+            </a:extLst>
+          </p:cNvPr>
+          <p:cNvSpPr/>
+          <p:nvPr/>
+        </p:nvSpPr>
+        <p:spPr>
+          <a:xfrm>
+            <a:off x="992716" y="4499873"/>
+            <a:ext cx="3312368" cy="226695"/>
+          </a:xfrm>
+          <a:prstGeom prst="rect">
+            <a:avLst/>
+          </a:prstGeom>
+        </p:spPr>
+        <p:style>
+          <a:lnRef idx="2">
+            <a:schemeClr val="accent3"/>
+          </a:lnRef>
+          <a:fillRef idx="1">
+            <a:schemeClr val="lt1"/>
+          </a:fillRef>
+          <a:effectRef idx="0">
+            <a:schemeClr val="accent3"/>
+          </a:effectRef>
+          <a:fontRef idx="minor">
+            <a:schemeClr val="dk1"/>
+          </a:fontRef>
+        </p:style>
+        <p:txBody>
+          <a:bodyPr rtlCol="0" anchor="ctr"/>
+          <a:lstStyle/>
+          <a:p>
+            <a:pPr marL="285750" indent="-285750">
+              <a:buFont typeface="Arial" panose="020B0604020202020204" pitchFamily="34" charset="0"/>
+              <a:buChar char="•"/>
+            </a:pPr>
+            <a:r>
+              <a:rPr lang="it-IT" sz="1400" dirty="0"/>
+              <a:t>Profilo persistito</a:t>
+            </a:r>
+          </a:p>
+        </p:txBody>
+      </p:sp>
+      <p:sp>
+        <p:nvSpPr>
+          <p:cNvPr id="17" name="Rettangolo 16">
+            <a:extLst>
+              <a:ext uri="{FF2B5EF4-FFF2-40B4-BE49-F238E27FC236}">
+                <a16:creationId xmlns:a16="http://schemas.microsoft.com/office/drawing/2014/main" id="{D82F090C-1D49-4613-9453-92852C087995}"/>
+              </a:ext>
+            </a:extLst>
+          </p:cNvPr>
+          <p:cNvSpPr/>
+          <p:nvPr/>
+        </p:nvSpPr>
+        <p:spPr>
+          <a:xfrm>
+            <a:off x="4994638" y="3447955"/>
+            <a:ext cx="2952326" cy="226695"/>
+          </a:xfrm>
+          <a:prstGeom prst="rect">
+            <a:avLst/>
+          </a:prstGeom>
+        </p:spPr>
+        <p:style>
+          <a:lnRef idx="2">
+            <a:schemeClr val="accent3"/>
+          </a:lnRef>
+          <a:fillRef idx="1">
+            <a:schemeClr val="lt1"/>
+          </a:fillRef>
+          <a:effectRef idx="0">
+            <a:schemeClr val="accent3"/>
+          </a:effectRef>
+          <a:fontRef idx="minor">
+            <a:schemeClr val="dk1"/>
+          </a:fontRef>
+        </p:style>
+        <p:txBody>
+          <a:bodyPr rtlCol="0" anchor="ctr"/>
+          <a:lstStyle/>
+          <a:p>
+            <a:pPr marL="285750" indent="-285750">
+              <a:buFont typeface="Arial" panose="020B0604020202020204" pitchFamily="34" charset="0"/>
+              <a:buChar char="•"/>
+            </a:pPr>
+            <a:r>
+              <a:rPr lang="it-IT" sz="1400" dirty="0"/>
+              <a:t>Eccezione con messaggio di errore</a:t>
+            </a:r>
+          </a:p>
+        </p:txBody>
+      </p:sp>
+    </p:spTree>
+    <p:extLst>
+      <p:ext uri="{BB962C8B-B14F-4D97-AF65-F5344CB8AC3E}">
+        <p14:creationId xmlns:p14="http://schemas.microsoft.com/office/powerpoint/2010/main" val="3522730347"/>
+      </p:ext>
+    </p:extLst>
+  </p:cSld>
+  <p:clrMapOvr>
+    <a:masterClrMapping/>
+  </p:clrMapOvr>
 </p:sld>
 </file>
 

</xml_diff>

<commit_message>
Updated documentation presentation 2
</commit_message>
<xml_diff>
--- a/doc/ARXDev4.pptx
+++ b/doc/ARXDev4.pptx
@@ -4169,21 +4169,111 @@
             <p:ph type="subTitle" idx="1"/>
           </p:nvPr>
         </p:nvSpPr>
-        <p:spPr/>
-        <p:txBody>
-          <a:bodyPr/>
+        <p:spPr>
+          <a:xfrm>
+            <a:off x="1371600" y="2914650"/>
+            <a:ext cx="4784576" cy="521196"/>
+          </a:xfrm>
+        </p:spPr>
+        <p:txBody>
+          <a:bodyPr>
+            <a:normAutofit fontScale="92500" lnSpcReduction="10000"/>
+          </a:bodyPr>
           <a:lstStyle/>
           <a:p>
             <a:r>
               <a:rPr lang="it-IT" i="1" dirty="0"/>
               <a:t>Yari Melzani</a:t>
             </a:r>
-          </a:p>
-          <a:p>
             <a:endParaRPr lang="it-IT" dirty="0"/>
           </a:p>
         </p:txBody>
       </p:sp>
+      <p:sp>
+        <p:nvSpPr>
+          <p:cNvPr id="3" name="CasellaDiTesto 2">
+            <a:extLst>
+              <a:ext uri="{FF2B5EF4-FFF2-40B4-BE49-F238E27FC236}">
+                <a16:creationId xmlns:a16="http://schemas.microsoft.com/office/drawing/2014/main" id="{80AFCFF8-DAFC-4B93-8F97-654961ED5DC6}"/>
+              </a:ext>
+            </a:extLst>
+          </p:cNvPr>
+          <p:cNvSpPr txBox="1"/>
+          <p:nvPr/>
+        </p:nvSpPr>
+        <p:spPr>
+          <a:xfrm>
+            <a:off x="1565428" y="4360393"/>
+            <a:ext cx="4572983" cy="369332"/>
+          </a:xfrm>
+          <a:prstGeom prst="rect">
+            <a:avLst/>
+          </a:prstGeom>
+          <a:noFill/>
+        </p:spPr>
+        <p:txBody>
+          <a:bodyPr wrap="none" rtlCol="0">
+            <a:spAutoFit/>
+          </a:bodyPr>
+          <a:lstStyle/>
+          <a:p>
+            <a:r>
+              <a:rPr lang="it-IT" dirty="0">
+                <a:hlinkClick r:id="rId2"/>
+              </a:rPr>
+              <a:t>https://github.com/Arxivar/Arxivar-Next-Dev-4</a:t>
+            </a:r>
+            <a:endParaRPr lang="it-IT" dirty="0"/>
+          </a:p>
+        </p:txBody>
+      </p:sp>
+      <p:pic>
+        <p:nvPicPr>
+          <p:cNvPr id="4098" name="Picture 2" descr="GitHub Logos and Usage · GitHub">
+            <a:extLst>
+              <a:ext uri="{FF2B5EF4-FFF2-40B4-BE49-F238E27FC236}">
+                <a16:creationId xmlns:a16="http://schemas.microsoft.com/office/drawing/2014/main" id="{8E487BEB-23F3-4C0B-A508-4A96BB56412A}"/>
+              </a:ext>
+            </a:extLst>
+          </p:cNvPr>
+          <p:cNvPicPr>
+            <a:picLocks noChangeAspect="1" noChangeArrowheads="1"/>
+          </p:cNvPicPr>
+          <p:nvPr/>
+        </p:nvPicPr>
+        <p:blipFill>
+          <a:blip r:embed="rId3" cstate="print">
+            <a:extLst>
+              <a:ext uri="{28A0092B-C50C-407E-A947-70E740481C1C}">
+                <a14:useLocalDpi xmlns:a14="http://schemas.microsoft.com/office/drawing/2010/main" val="0"/>
+              </a:ext>
+            </a:extLst>
+          </a:blip>
+          <a:srcRect/>
+          <a:stretch>
+            <a:fillRect/>
+          </a:stretch>
+        </p:blipFill>
+        <p:spPr bwMode="auto">
+          <a:xfrm>
+            <a:off x="936749" y="4192968"/>
+            <a:ext cx="645765" cy="536757"/>
+          </a:xfrm>
+          <a:prstGeom prst="rect">
+            <a:avLst/>
+          </a:prstGeom>
+          <a:noFill/>
+          <a:extLst>
+            <a:ext uri="{909E8E84-426E-40DD-AFC4-6F175D3DCCD1}">
+              <a14:hiddenFill xmlns:a14="http://schemas.microsoft.com/office/drawing/2010/main">
+                <a:solidFill>
+                  <a:srgbClr val="FFFFFF"/>
+                </a:solidFill>
+              </a14:hiddenFill>
+            </a:ext>
+          </a:extLst>
+        </p:spPr>
+      </p:pic>
     </p:spTree>
   </p:cSld>
   <p:clrMapOvr>
@@ -6267,10 +6357,26 @@
             <a:pPr indent="-285750"/>
             <a:r>
               <a:rPr lang="it-IT" sz="1400" b="1" dirty="0"/>
-              <a:t>Sulla base di code + </a:t>
-            </a:r>
-            <a:r>
-              <a:rPr lang="it-IT" sz="1400" b="1" dirty="0" err="1"/>
+              <a:t>Sulla base di </a:t>
+            </a:r>
+            <a:r>
+              <a:rPr lang="it-IT" sz="1400" b="1" dirty="0">
+                <a:solidFill>
+                  <a:schemeClr val="bg1">
+                    <a:lumMod val="50000"/>
+                  </a:schemeClr>
+                </a:solidFill>
+              </a:rPr>
+              <a:t>code + </a:t>
+            </a:r>
+            <a:r>
+              <a:rPr lang="it-IT" sz="1400" b="1" dirty="0" err="1">
+                <a:solidFill>
+                  <a:schemeClr val="bg1">
+                    <a:lumMod val="50000"/>
+                  </a:schemeClr>
+                </a:solidFill>
+              </a:rPr>
               <a:t>token_id</a:t>
             </a:r>
             <a:r>
@@ -6282,7 +6388,7 @@
             <a:pPr indent="-285750"/>
             <a:r>
               <a:rPr lang="it-IT" sz="1400" b="1" dirty="0"/>
-              <a:t>Il processo di autorizzazione termina atterrando sul Web Portal con il </a:t>
+              <a:t>Il processo di autorizzazione termina sul Web Portal con il </a:t>
             </a:r>
             <a:r>
               <a:rPr lang="it-IT" sz="1400" b="1" dirty="0" err="1"/>

</xml_diff>

<commit_message>
Updated documentation presentation 3
</commit_message>
<xml_diff>
--- a/doc/ARXDev4.pptx
+++ b/doc/ARXDev4.pptx
@@ -5,7 +5,7 @@
     <p:sldMasterId id="2147483648" r:id="rId1"/>
   </p:sldMasterIdLst>
   <p:notesMasterIdLst>
-    <p:notesMasterId r:id="rId9"/>
+    <p:notesMasterId r:id="rId10"/>
   </p:notesMasterIdLst>
   <p:sldIdLst>
     <p:sldId id="256" r:id="rId2"/>
@@ -15,6 +15,7 @@
     <p:sldId id="265" r:id="rId6"/>
     <p:sldId id="267" r:id="rId7"/>
     <p:sldId id="268" r:id="rId8"/>
+    <p:sldId id="269" r:id="rId9"/>
   </p:sldIdLst>
   <p:sldSz cx="9144000" cy="5143500" type="screen16x9"/>
   <p:notesSz cx="6858000" cy="9144000"/>
@@ -4681,8 +4682,16 @@
               <a:t>Viene loggato l’utente </a:t>
             </a:r>
             <a:r>
+              <a:rPr lang="it-IT" sz="1400" b="1" dirty="0" err="1">
+                <a:solidFill>
+                  <a:schemeClr val="accent1"/>
+                </a:solidFill>
+              </a:rPr>
+              <a:t>ARX</a:t>
+            </a:r>
+            <a:r>
               <a:rPr lang="it-IT" sz="1400" b="1" dirty="0" err="1"/>
-              <a:t>ARXivar</a:t>
+              <a:t>ivar</a:t>
             </a:r>
             <a:r>
               <a:rPr lang="it-IT" sz="1400" b="1" dirty="0"/>
@@ -4696,15 +4705,71 @@
           <a:p>
             <a:r>
               <a:rPr lang="it-IT" sz="1800" b="1" dirty="0"/>
-              <a:t>Logon Provider Single </a:t>
+              <a:t>Logon Provider </a:t>
+            </a:r>
+            <a:r>
+              <a:rPr lang="it-IT" sz="1800" b="1" dirty="0">
+                <a:solidFill>
+                  <a:schemeClr val="tx1">
+                    <a:lumMod val="50000"/>
+                    <a:lumOff val="50000"/>
+                  </a:schemeClr>
+                </a:solidFill>
+              </a:rPr>
+              <a:t>S</a:t>
+            </a:r>
+            <a:r>
+              <a:rPr lang="it-IT" sz="1800" b="1" dirty="0"/>
+              <a:t>ingle </a:t>
+            </a:r>
+            <a:r>
+              <a:rPr lang="it-IT" sz="1800" b="1" dirty="0" err="1">
+                <a:solidFill>
+                  <a:schemeClr val="tx1">
+                    <a:lumMod val="50000"/>
+                    <a:lumOff val="50000"/>
+                  </a:schemeClr>
+                </a:solidFill>
+              </a:rPr>
+              <a:t>S</a:t>
             </a:r>
             <a:r>
               <a:rPr lang="it-IT" sz="1800" b="1" dirty="0" err="1"/>
-              <a:t>Sign</a:t>
+              <a:t>ign</a:t>
             </a:r>
             <a:r>
               <a:rPr lang="it-IT" sz="1800" b="1" dirty="0"/>
-              <a:t>-On (SSO) </a:t>
+              <a:t>-</a:t>
+            </a:r>
+            <a:r>
+              <a:rPr lang="it-IT" sz="1800" b="1" dirty="0">
+                <a:solidFill>
+                  <a:schemeClr val="tx1">
+                    <a:lumMod val="50000"/>
+                    <a:lumOff val="50000"/>
+                  </a:schemeClr>
+                </a:solidFill>
+              </a:rPr>
+              <a:t>O</a:t>
+            </a:r>
+            <a:r>
+              <a:rPr lang="it-IT" sz="1800" b="1" dirty="0"/>
+              <a:t>n (</a:t>
+            </a:r>
+            <a:r>
+              <a:rPr lang="it-IT" sz="1800" b="1" dirty="0">
+                <a:solidFill>
+                  <a:schemeClr val="tx1">
+                    <a:lumMod val="50000"/>
+                    <a:lumOff val="50000"/>
+                  </a:schemeClr>
+                </a:solidFill>
+              </a:rPr>
+              <a:t>SSO</a:t>
+            </a:r>
+            <a:r>
+              <a:rPr lang="it-IT" sz="1800" b="1" dirty="0"/>
+              <a:t>) </a:t>
             </a:r>
           </a:p>
           <a:p>
@@ -4718,7 +4783,7 @@
             <a:pPr lvl="1"/>
             <a:r>
               <a:rPr lang="it-IT" sz="1400" b="1" dirty="0"/>
-              <a:t>Vengono utilizzati dei flussi di autorizzazione che fanno parte di standard:</a:t>
+              <a:t>Vengono utilizzati flussi di autenticazione e autorizzazione che fanno parte di standard:</a:t>
             </a:r>
           </a:p>
           <a:p>
@@ -4774,21 +4839,21 @@
               <a:t>Viene loggato l’utente </a:t>
             </a:r>
             <a:r>
+              <a:rPr lang="it-IT" sz="1400" b="1" dirty="0" err="1">
+                <a:solidFill>
+                  <a:srgbClr val="F18D2C"/>
+                </a:solidFill>
+              </a:rPr>
+              <a:t>ARX</a:t>
+            </a:r>
+            <a:r>
               <a:rPr lang="it-IT" sz="1400" b="1" dirty="0" err="1"/>
-              <a:t>ARXivar</a:t>
+              <a:t>ivar</a:t>
             </a:r>
             <a:r>
               <a:rPr lang="it-IT" sz="1400" b="1" dirty="0"/>
-              <a:t> associato allo username specificato </a:t>
-            </a:r>
-          </a:p>
-          <a:p>
-            <a:pPr marL="457200" lvl="1" indent="0">
-              <a:buNone/>
-            </a:pPr>
-            <a:endParaRPr lang="it-IT" sz="800" b="1" dirty="0"/>
-          </a:p>
-          <a:p>
+              <a:t> associato allo username specificato</a:t>
+            </a:r>
             <a:endParaRPr lang="it-IT" sz="1100" b="1" dirty="0"/>
           </a:p>
         </p:txBody>
@@ -4822,7 +4887,7 @@
         </p:blipFill>
         <p:spPr bwMode="auto">
           <a:xfrm>
-            <a:off x="4139952" y="3075806"/>
+            <a:off x="4211960" y="3291830"/>
             <a:ext cx="576064" cy="230426"/>
           </a:xfrm>
           <a:prstGeom prst="rect">
@@ -4869,7 +4934,7 @@
         </p:blipFill>
         <p:spPr bwMode="auto">
           <a:xfrm>
-            <a:off x="6516216" y="2845380"/>
+            <a:off x="6516216" y="3061404"/>
             <a:ext cx="230426" cy="230426"/>
           </a:xfrm>
           <a:prstGeom prst="rect">
@@ -6151,7 +6216,7 @@
         <p:spPr>
           <a:xfrm>
             <a:off x="323528" y="931492"/>
-            <a:ext cx="6696744" cy="3607048"/>
+            <a:ext cx="6696744" cy="3872506"/>
           </a:xfrm>
         </p:spPr>
         <p:txBody>
@@ -6162,7 +6227,7 @@
           <a:p>
             <a:r>
               <a:rPr lang="it-IT" sz="1400" b="1" dirty="0"/>
-              <a:t>Autenticazione demandata a Identity Server</a:t>
+              <a:t>Autenticazione è demandata a Identity Server.</a:t>
             </a:r>
             <a:br>
               <a:rPr lang="it-IT" sz="1400" b="1" dirty="0"/>
@@ -6180,8 +6245,16 @@
               <a:t>: </a:t>
             </a:r>
             <a:r>
+              <a:rPr lang="it-IT" sz="1400" b="1" dirty="0" err="1">
+                <a:solidFill>
+                  <a:schemeClr val="accent1"/>
+                </a:solidFill>
+              </a:rPr>
+              <a:t>ARX</a:t>
+            </a:r>
+            <a:r>
               <a:rPr lang="it-IT" sz="1400" b="1" dirty="0" err="1"/>
-              <a:t>ARXivar</a:t>
+              <a:t>ivar</a:t>
             </a:r>
             <a:r>
               <a:rPr lang="it-IT" sz="1400" b="1" dirty="0"/>
@@ -6197,19 +6270,19 @@
           <a:p>
             <a:r>
               <a:rPr lang="it-IT" sz="1400" b="1" dirty="0"/>
-              <a:t>Il flusso autorizzativo continua redirigendo l’utente verso il servizio </a:t>
+              <a:t>Il flusso autorizzativo continua redirigendo l’utente verso il servizio Authentication di </a:t>
+            </a:r>
+            <a:r>
+              <a:rPr lang="it-IT" sz="1400" b="1" dirty="0" err="1">
+                <a:solidFill>
+                  <a:schemeClr val="accent1"/>
+                </a:solidFill>
+              </a:rPr>
+              <a:t>ARX</a:t>
             </a:r>
             <a:r>
               <a:rPr lang="it-IT" sz="1400" b="1" dirty="0" err="1"/>
-              <a:t>Auth</a:t>
-            </a:r>
-            <a:r>
-              <a:rPr lang="it-IT" sz="1400" b="1" dirty="0"/>
-              <a:t> di </a:t>
-            </a:r>
-            <a:r>
-              <a:rPr lang="it-IT" sz="1400" b="1" dirty="0" err="1"/>
-              <a:t>ARXivar</a:t>
+              <a:t>ivar</a:t>
             </a:r>
             <a:r>
               <a:rPr lang="it-IT" sz="1400" b="1" dirty="0"/>
@@ -6246,11 +6319,11 @@
               <a:t> </a:t>
             </a:r>
             <a:r>
-              <a:rPr lang="it-IT" sz="1200" b="1" i="1" dirty="0"/>
+              <a:rPr lang="it-IT" sz="900" b="1" i="1" dirty="0"/>
               <a:t>(</a:t>
             </a:r>
             <a:r>
-              <a:rPr lang="it-IT" sz="1200" b="1" i="1" dirty="0">
+              <a:rPr lang="it-IT" sz="900" b="1" i="1" dirty="0">
                 <a:solidFill>
                   <a:schemeClr val="bg1">
                     <a:lumMod val="50000"/>
@@ -6261,7 +6334,7 @@
               <a:t>https://openid.net/specs/openid-connect-core-1_0.html#code-id_tokenExample</a:t>
             </a:r>
             <a:r>
-              <a:rPr lang="it-IT" sz="1200" b="1" i="1" dirty="0">
+              <a:rPr lang="it-IT" sz="900" b="1" i="1" dirty="0">
                 <a:solidFill>
                   <a:schemeClr val="bg1">
                     <a:lumMod val="50000"/>
@@ -6271,7 +6344,7 @@
               <a:t>, </a:t>
             </a:r>
             <a:r>
-              <a:rPr lang="it-IT" sz="1200" b="1" i="1" dirty="0">
+              <a:rPr lang="it-IT" sz="900" b="1" i="1" dirty="0">
                 <a:solidFill>
                   <a:schemeClr val="bg1">
                     <a:lumMod val="50000"/>
@@ -6282,7 +6355,7 @@
               <a:t>http://www.bubblecode.net/en/2016/01/22/understanding-oauth2/#Authorization_Code_Grant</a:t>
             </a:r>
             <a:r>
-              <a:rPr lang="it-IT" sz="1200" b="1" i="1" dirty="0"/>
+              <a:rPr lang="it-IT" sz="900" b="1" i="1" dirty="0"/>
               <a:t>)</a:t>
             </a:r>
           </a:p>
@@ -6304,8 +6377,23 @@
             </a:r>
             <a:r>
               <a:rPr lang="it-IT" sz="1200" b="1" dirty="0"/>
-              <a:t> token che contiene le autorizzazioni approvate dall’utente. </a:t>
-            </a:r>
+              <a:t> token che contiene le autorizzazioni approvate dall’utente </a:t>
+            </a:r>
+            <a:r>
+              <a:rPr lang="it-IT" sz="1000" b="1" dirty="0"/>
+              <a:t>(</a:t>
+            </a:r>
+            <a:r>
+              <a:rPr lang="it-IT" sz="1000" b="1" dirty="0">
+                <a:hlinkClick r:id="rId4"/>
+              </a:rPr>
+              <a:t>https://www.oauth.com/oauth2-servers/access-tokens/authorization-code-request/</a:t>
+            </a:r>
+            <a:r>
+              <a:rPr lang="it-IT" sz="1000" b="1" dirty="0"/>
+              <a:t>)</a:t>
+            </a:r>
+            <a:endParaRPr lang="it-IT" sz="1200" b="1" dirty="0"/>
           </a:p>
           <a:p>
             <a:pPr lvl="1"/>
@@ -6324,21 +6412,21 @@
             <a:r>
               <a:rPr lang="it-IT" sz="900" b="1" dirty="0"/>
               <a:t>(</a:t>
-            </a:r>
-            <a:r>
-              <a:rPr lang="it-IT" sz="900" b="1" dirty="0">
-                <a:hlinkClick r:id="rId4"/>
-              </a:rPr>
-              <a:t>https://en.wikipedia.org/wiki/JSON_Web_Token</a:t>
-            </a:r>
-            <a:r>
-              <a:rPr lang="it-IT" sz="900" b="1" dirty="0"/>
-              <a:t>, </a:t>
             </a:r>
             <a:r>
               <a:rPr lang="it-IT" sz="900" b="1" dirty="0">
                 <a:hlinkClick r:id="rId5"/>
               </a:rPr>
+              <a:t>https://en.wikipedia.org/wiki/JSON_Web_Token</a:t>
+            </a:r>
+            <a:r>
+              <a:rPr lang="it-IT" sz="900" b="1" dirty="0"/>
+              <a:t>, </a:t>
+            </a:r>
+            <a:r>
+              <a:rPr lang="it-IT" sz="900" b="1" dirty="0">
+                <a:hlinkClick r:id="rId6"/>
+              </a:rPr>
               <a:t>https://jwt.io/</a:t>
             </a:r>
             <a:r>
@@ -6381,7 +6469,7 @@
             </a:r>
             <a:r>
               <a:rPr lang="it-IT" sz="1400" b="1" dirty="0"/>
-              <a:t> il logon provider determina l’utente che deve essere autorizzato</a:t>
+              <a:t> il logon provider determina l’utente che deve essere autorizzato.</a:t>
             </a:r>
           </a:p>
           <a:p>
@@ -6399,10 +6487,21 @@
               <a:t> token di </a:t>
             </a:r>
             <a:r>
+              <a:rPr lang="it-IT" sz="1400" b="1" dirty="0" err="1">
+                <a:solidFill>
+                  <a:schemeClr val="accent1"/>
+                </a:solidFill>
+              </a:rPr>
+              <a:t>ARX</a:t>
+            </a:r>
+            <a:r>
               <a:rPr lang="it-IT" sz="1400" b="1" dirty="0" err="1"/>
-              <a:t>ARXivar</a:t>
-            </a:r>
-            <a:endParaRPr lang="it-IT" sz="1400" b="1" dirty="0"/>
+              <a:t>ivar</a:t>
+            </a:r>
+            <a:r>
+              <a:rPr lang="it-IT" sz="1400" b="1" dirty="0"/>
+              <a:t>.</a:t>
+            </a:r>
           </a:p>
         </p:txBody>
       </p:sp>
@@ -6421,7 +6520,7 @@
           <p:nvPr/>
         </p:nvPicPr>
         <p:blipFill>
-          <a:blip r:embed="rId6" cstate="print">
+          <a:blip r:embed="rId7" cstate="print">
             <a:extLst>
               <a:ext uri="{28A0092B-C50C-407E-A947-70E740481C1C}">
                 <a14:useLocalDpi xmlns:a14="http://schemas.microsoft.com/office/drawing/2010/main" val="0"/>
@@ -6457,6 +6556,622 @@
     <p:extLst>
       <p:ext uri="{BB962C8B-B14F-4D97-AF65-F5344CB8AC3E}">
         <p14:creationId xmlns:p14="http://schemas.microsoft.com/office/powerpoint/2010/main" val="3830133614"/>
+      </p:ext>
+    </p:extLst>
+  </p:cSld>
+  <p:clrMapOvr>
+    <a:masterClrMapping/>
+  </p:clrMapOvr>
+</p:sld>
+</file>
+
+<file path=ppt/slides/slide8.xml><?xml version="1.0" encoding="utf-8"?>
+<p:sld xmlns:a="http://schemas.openxmlformats.org/drawingml/2006/main" xmlns:r="http://schemas.openxmlformats.org/officeDocument/2006/relationships" xmlns:p="http://schemas.openxmlformats.org/presentationml/2006/main">
+  <p:cSld>
+    <p:spTree>
+      <p:nvGrpSpPr>
+        <p:cNvPr id="1" name=""/>
+        <p:cNvGrpSpPr/>
+        <p:nvPr/>
+      </p:nvGrpSpPr>
+      <p:grpSpPr>
+        <a:xfrm>
+          <a:off x="0" y="0"/>
+          <a:ext cx="0" cy="0"/>
+          <a:chOff x="0" y="0"/>
+          <a:chExt cx="0" cy="0"/>
+        </a:xfrm>
+      </p:grpSpPr>
+      <p:sp>
+        <p:nvSpPr>
+          <p:cNvPr id="2" name="Title 1"/>
+          <p:cNvSpPr>
+            <a:spLocks noGrp="1"/>
+          </p:cNvSpPr>
+          <p:nvPr>
+            <p:ph type="title"/>
+          </p:nvPr>
+        </p:nvSpPr>
+        <p:spPr>
+          <a:xfrm>
+            <a:off x="457200" y="205979"/>
+            <a:ext cx="6563072" cy="709587"/>
+          </a:xfrm>
+        </p:spPr>
+        <p:txBody>
+          <a:bodyPr>
+            <a:normAutofit/>
+          </a:bodyPr>
+          <a:lstStyle/>
+          <a:p>
+            <a:r>
+              <a:rPr lang="it-IT" sz="3200" dirty="0" err="1">
+                <a:solidFill>
+                  <a:srgbClr val="FFC000"/>
+                </a:solidFill>
+                <a:effectLst>
+                  <a:outerShdw blurRad="38100" dist="38100" dir="2700000" algn="tl">
+                    <a:srgbClr val="000000">
+                      <a:alpha val="43137"/>
+                    </a:srgbClr>
+                  </a:outerShdw>
+                </a:effectLst>
+              </a:rPr>
+              <a:t>Tip</a:t>
+            </a:r>
+            <a:r>
+              <a:rPr lang="it-IT" sz="3200" dirty="0">
+                <a:solidFill>
+                  <a:srgbClr val="FFC000"/>
+                </a:solidFill>
+                <a:effectLst>
+                  <a:outerShdw blurRad="38100" dist="38100" dir="2700000" algn="tl">
+                    <a:srgbClr val="000000">
+                      <a:alpha val="43137"/>
+                    </a:srgbClr>
+                  </a:outerShdw>
+                </a:effectLst>
+              </a:rPr>
+              <a:t> &amp; </a:t>
+            </a:r>
+            <a:r>
+              <a:rPr lang="it-IT" sz="3200" dirty="0" err="1">
+                <a:solidFill>
+                  <a:srgbClr val="FFC000"/>
+                </a:solidFill>
+                <a:effectLst>
+                  <a:outerShdw blurRad="38100" dist="38100" dir="2700000" algn="tl">
+                    <a:srgbClr val="000000">
+                      <a:alpha val="43137"/>
+                    </a:srgbClr>
+                  </a:outerShdw>
+                </a:effectLst>
+              </a:rPr>
+              <a:t>Tricks</a:t>
+            </a:r>
+            <a:endParaRPr lang="it-IT" sz="3200" dirty="0">
+              <a:solidFill>
+                <a:srgbClr val="FFC000"/>
+              </a:solidFill>
+              <a:effectLst>
+                <a:outerShdw blurRad="38100" dist="38100" dir="2700000" algn="tl">
+                  <a:srgbClr val="000000">
+                    <a:alpha val="43137"/>
+                  </a:srgbClr>
+                </a:outerShdw>
+              </a:effectLst>
+            </a:endParaRPr>
+          </a:p>
+        </p:txBody>
+      </p:sp>
+      <p:sp>
+        <p:nvSpPr>
+          <p:cNvPr id="3" name="Content Placeholder 2"/>
+          <p:cNvSpPr>
+            <a:spLocks noGrp="1"/>
+          </p:cNvSpPr>
+          <p:nvPr>
+            <p:ph idx="1"/>
+          </p:nvPr>
+        </p:nvSpPr>
+        <p:spPr>
+          <a:xfrm>
+            <a:off x="323528" y="931492"/>
+            <a:ext cx="6696744" cy="3607048"/>
+          </a:xfrm>
+        </p:spPr>
+        <p:txBody>
+          <a:bodyPr>
+            <a:noAutofit/>
+          </a:bodyPr>
+          <a:lstStyle/>
+          <a:p>
+            <a:r>
+              <a:rPr lang="it-IT" sz="1400" b="1" dirty="0"/>
+              <a:t>I logon provider di tipo </a:t>
+            </a:r>
+            <a:r>
+              <a:rPr lang="it-IT" sz="1400" b="1" dirty="0">
+                <a:solidFill>
+                  <a:schemeClr val="tx1">
+                    <a:lumMod val="50000"/>
+                    <a:lumOff val="50000"/>
+                  </a:schemeClr>
+                </a:solidFill>
+              </a:rPr>
+              <a:t>S</a:t>
+            </a:r>
+            <a:r>
+              <a:rPr lang="it-IT" sz="1400" b="1" dirty="0"/>
+              <a:t>ingle </a:t>
+            </a:r>
+            <a:r>
+              <a:rPr lang="it-IT" sz="1400" b="1" dirty="0" err="1">
+                <a:solidFill>
+                  <a:schemeClr val="tx1">
+                    <a:lumMod val="50000"/>
+                    <a:lumOff val="50000"/>
+                  </a:schemeClr>
+                </a:solidFill>
+              </a:rPr>
+              <a:t>S</a:t>
+            </a:r>
+            <a:r>
+              <a:rPr lang="it-IT" sz="1400" b="1" dirty="0" err="1"/>
+              <a:t>ign</a:t>
+            </a:r>
+            <a:r>
+              <a:rPr lang="it-IT" sz="1400" b="1" dirty="0"/>
+              <a:t>-</a:t>
+            </a:r>
+            <a:r>
+              <a:rPr lang="it-IT" sz="1400" b="1" dirty="0">
+                <a:solidFill>
+                  <a:schemeClr val="tx1">
+                    <a:lumMod val="50000"/>
+                    <a:lumOff val="50000"/>
+                  </a:schemeClr>
+                </a:solidFill>
+              </a:rPr>
+              <a:t>O</a:t>
+            </a:r>
+            <a:r>
+              <a:rPr lang="it-IT" sz="1400" b="1" dirty="0"/>
+              <a:t>n richiedono che tutto il flusso delle chiamate Web sia in </a:t>
+            </a:r>
+            <a:r>
+              <a:rPr lang="it-IT" sz="1400" b="1" i="1" dirty="0">
+                <a:solidFill>
+                  <a:schemeClr val="tx1">
+                    <a:lumMod val="50000"/>
+                    <a:lumOff val="50000"/>
+                  </a:schemeClr>
+                </a:solidFill>
+              </a:rPr>
+              <a:t>HTTPS</a:t>
+            </a:r>
+            <a:r>
+              <a:rPr lang="it-IT" sz="1400" b="1" dirty="0"/>
+              <a:t>. Gli attori web di </a:t>
+            </a:r>
+            <a:r>
+              <a:rPr lang="it-IT" sz="1400" b="1" dirty="0" err="1">
+                <a:solidFill>
+                  <a:srgbClr val="F18D2C"/>
+                </a:solidFill>
+              </a:rPr>
+              <a:t>ARX</a:t>
+            </a:r>
+            <a:r>
+              <a:rPr lang="it-IT" sz="1400" b="1" dirty="0" err="1"/>
+              <a:t>ivar</a:t>
+            </a:r>
+            <a:r>
+              <a:rPr lang="it-IT" sz="1400" b="1" dirty="0"/>
+              <a:t>: </a:t>
+            </a:r>
+            <a:r>
+              <a:rPr lang="it-IT" sz="1400" b="1" dirty="0" err="1"/>
+              <a:t>WebPortal</a:t>
+            </a:r>
+            <a:r>
+              <a:rPr lang="it-IT" sz="1400" b="1" dirty="0"/>
+              <a:t>, </a:t>
+            </a:r>
+            <a:r>
+              <a:rPr lang="it-IT" sz="1400" b="1" dirty="0" err="1"/>
+              <a:t>WebApi</a:t>
+            </a:r>
+            <a:r>
+              <a:rPr lang="it-IT" sz="1400" b="1" dirty="0"/>
+              <a:t>, Authentication devono avere i riferimenti in </a:t>
+            </a:r>
+            <a:r>
+              <a:rPr lang="it-IT" sz="1400" b="1" i="1" dirty="0">
+                <a:solidFill>
+                  <a:schemeClr val="tx1">
+                    <a:lumMod val="50000"/>
+                    <a:lumOff val="50000"/>
+                  </a:schemeClr>
+                </a:solidFill>
+              </a:rPr>
+              <a:t>HTTPS</a:t>
+            </a:r>
+            <a:r>
+              <a:rPr lang="it-IT" sz="1400" b="1" dirty="0"/>
+              <a:t>.</a:t>
+            </a:r>
+          </a:p>
+          <a:p>
+            <a:pPr marL="400050" lvl="1" indent="0">
+              <a:buNone/>
+            </a:pPr>
+            <a:endParaRPr lang="it-IT" sz="600" b="1" dirty="0"/>
+          </a:p>
+          <a:p>
+            <a:pPr marL="400050" lvl="1" indent="0">
+              <a:buNone/>
+            </a:pPr>
+            <a:r>
+              <a:rPr lang="it-IT" sz="1100" b="1" dirty="0"/>
+              <a:t>Per creare un contesto valido e </a:t>
+            </a:r>
+            <a:r>
+              <a:rPr lang="it-IT" sz="1100" b="1" dirty="0" err="1"/>
+              <a:t>trusted</a:t>
+            </a:r>
+            <a:r>
+              <a:rPr lang="it-IT" sz="1100" b="1" dirty="0"/>
+              <a:t> (!</a:t>
+            </a:r>
+            <a:r>
+              <a:rPr lang="it-IT" sz="1100" b="1" u="sng" dirty="0">
+                <a:solidFill>
+                  <a:srgbClr val="C00000"/>
+                </a:solidFill>
+              </a:rPr>
+              <a:t>solo eventualmente in ambiente di sviluppo</a:t>
+            </a:r>
+            <a:r>
+              <a:rPr lang="it-IT" sz="1100" b="1" u="sng" dirty="0"/>
+              <a:t>!</a:t>
+            </a:r>
+            <a:r>
+              <a:rPr lang="it-IT" sz="1100" b="1" dirty="0"/>
+              <a:t>)</a:t>
+            </a:r>
+          </a:p>
+          <a:p>
+            <a:pPr marL="400050" lvl="1" indent="0">
+              <a:buNone/>
+            </a:pPr>
+            <a:r>
+              <a:rPr lang="it-IT" sz="1100" b="1" dirty="0"/>
+              <a:t>Tool installato con IIS Express: C:\Program Files\IIS Express</a:t>
+            </a:r>
+          </a:p>
+          <a:p>
+            <a:pPr marL="400050" lvl="1" indent="0">
+              <a:buNone/>
+            </a:pPr>
+            <a:r>
+              <a:rPr lang="it-IT" sz="1100" b="1" i="1" dirty="0" err="1">
+                <a:solidFill>
+                  <a:schemeClr val="tx1">
+                    <a:lumMod val="50000"/>
+                    <a:lumOff val="50000"/>
+                  </a:schemeClr>
+                </a:solidFill>
+              </a:rPr>
+              <a:t>dotnet</a:t>
+            </a:r>
+            <a:r>
+              <a:rPr lang="it-IT" sz="1100" b="1" i="1" dirty="0">
+                <a:solidFill>
+                  <a:schemeClr val="tx1">
+                    <a:lumMod val="50000"/>
+                    <a:lumOff val="50000"/>
+                  </a:schemeClr>
+                </a:solidFill>
+              </a:rPr>
+              <a:t> </a:t>
+            </a:r>
+            <a:r>
+              <a:rPr lang="it-IT" sz="1100" b="1" i="1" dirty="0" err="1">
+                <a:solidFill>
+                  <a:schemeClr val="tx1">
+                    <a:lumMod val="50000"/>
+                    <a:lumOff val="50000"/>
+                  </a:schemeClr>
+                </a:solidFill>
+              </a:rPr>
+              <a:t>dev-certs</a:t>
+            </a:r>
+            <a:r>
+              <a:rPr lang="it-IT" sz="1100" b="1" i="1" dirty="0">
+                <a:solidFill>
+                  <a:schemeClr val="tx1">
+                    <a:lumMod val="50000"/>
+                    <a:lumOff val="50000"/>
+                  </a:schemeClr>
+                </a:solidFill>
+              </a:rPr>
+              <a:t> </a:t>
+            </a:r>
+            <a:r>
+              <a:rPr lang="it-IT" sz="1100" b="1" i="1" dirty="0" err="1">
+                <a:solidFill>
+                  <a:schemeClr val="tx1">
+                    <a:lumMod val="50000"/>
+                    <a:lumOff val="50000"/>
+                  </a:schemeClr>
+                </a:solidFill>
+              </a:rPr>
+              <a:t>https</a:t>
+            </a:r>
+            <a:r>
+              <a:rPr lang="it-IT" sz="1100" b="1" i="1" dirty="0">
+                <a:solidFill>
+                  <a:schemeClr val="tx1">
+                    <a:lumMod val="50000"/>
+                    <a:lumOff val="50000"/>
+                  </a:schemeClr>
+                </a:solidFill>
+              </a:rPr>
+              <a:t> --trust</a:t>
+            </a:r>
+          </a:p>
+          <a:p>
+            <a:pPr marL="400050" lvl="1" indent="0">
+              <a:buNone/>
+            </a:pPr>
+            <a:endParaRPr lang="it-IT" sz="1100" b="1" dirty="0"/>
+          </a:p>
+          <a:p>
+            <a:pPr marL="400050" lvl="1" indent="0">
+              <a:buNone/>
+            </a:pPr>
+            <a:r>
+              <a:rPr lang="it-IT" sz="1100" b="1" dirty="0"/>
+              <a:t>Assicurarsi che il certificato generato per </a:t>
+            </a:r>
+            <a:r>
+              <a:rPr lang="it-IT" sz="1100" b="1" dirty="0" err="1"/>
+              <a:t>localhost</a:t>
+            </a:r>
+            <a:r>
+              <a:rPr lang="it-IT" sz="1100" b="1" dirty="0"/>
+              <a:t> sia posizionato in:</a:t>
+            </a:r>
+          </a:p>
+          <a:p>
+            <a:pPr marL="400050" lvl="1" indent="0">
+              <a:buNone/>
+            </a:pPr>
+            <a:r>
+              <a:rPr lang="it-IT" sz="1100" b="1" dirty="0"/>
+              <a:t>personal + </a:t>
+            </a:r>
+            <a:r>
+              <a:rPr lang="it-IT" sz="1100" b="1" dirty="0" err="1"/>
+              <a:t>trusted</a:t>
+            </a:r>
+            <a:r>
+              <a:rPr lang="it-IT" sz="1100" b="1" dirty="0"/>
+              <a:t> root  di </a:t>
+            </a:r>
+            <a:r>
+              <a:rPr lang="it-IT" sz="1100" b="1" dirty="0" err="1"/>
+              <a:t>local</a:t>
+            </a:r>
+            <a:r>
+              <a:rPr lang="it-IT" sz="1100" b="1" dirty="0"/>
+              <a:t> user  (</a:t>
+            </a:r>
+            <a:r>
+              <a:rPr lang="it-IT" sz="1100" b="1" dirty="0" err="1"/>
+              <a:t>IdentityServer</a:t>
+            </a:r>
+            <a:r>
+              <a:rPr lang="it-IT" sz="1100" b="1" dirty="0"/>
+              <a:t>)</a:t>
+            </a:r>
+          </a:p>
+          <a:p>
+            <a:pPr marL="400050" lvl="1" indent="0">
+              <a:buNone/>
+            </a:pPr>
+            <a:r>
+              <a:rPr lang="it-IT" sz="1100" b="1" dirty="0"/>
+              <a:t>personal + </a:t>
+            </a:r>
+            <a:r>
+              <a:rPr lang="it-IT" sz="1100" b="1" dirty="0" err="1"/>
+              <a:t>trusted</a:t>
+            </a:r>
+            <a:r>
+              <a:rPr lang="it-IT" sz="1100" b="1" dirty="0"/>
+              <a:t> root  di </a:t>
+            </a:r>
+            <a:r>
+              <a:rPr lang="it-IT" sz="1100" b="1" dirty="0" err="1"/>
+              <a:t>local</a:t>
+            </a:r>
+            <a:r>
+              <a:rPr lang="it-IT" sz="1100" b="1" dirty="0"/>
+              <a:t> machine  (IIS)</a:t>
+            </a:r>
+          </a:p>
+          <a:p>
+            <a:pPr marL="0" indent="0">
+              <a:buNone/>
+            </a:pPr>
+            <a:endParaRPr lang="it-IT" sz="1400" b="1" dirty="0"/>
+          </a:p>
+          <a:p>
+            <a:r>
+              <a:rPr lang="it-IT" sz="1400" b="1" dirty="0"/>
+              <a:t>Logon automatico con un logon provider di tipo </a:t>
+            </a:r>
+            <a:r>
+              <a:rPr lang="it-IT" sz="1400" b="1" dirty="0">
+                <a:solidFill>
+                  <a:schemeClr val="tx1">
+                    <a:lumMod val="50000"/>
+                    <a:lumOff val="50000"/>
+                  </a:schemeClr>
+                </a:solidFill>
+              </a:rPr>
+              <a:t>S</a:t>
+            </a:r>
+            <a:r>
+              <a:rPr lang="it-IT" sz="1400" b="1" dirty="0"/>
+              <a:t>ingle </a:t>
+            </a:r>
+            <a:r>
+              <a:rPr lang="it-IT" sz="1400" b="1" dirty="0" err="1">
+                <a:solidFill>
+                  <a:schemeClr val="tx1">
+                    <a:lumMod val="50000"/>
+                    <a:lumOff val="50000"/>
+                  </a:schemeClr>
+                </a:solidFill>
+              </a:rPr>
+              <a:t>S</a:t>
+            </a:r>
+            <a:r>
+              <a:rPr lang="it-IT" sz="1400" b="1" dirty="0" err="1"/>
+              <a:t>ign</a:t>
+            </a:r>
+            <a:r>
+              <a:rPr lang="it-IT" sz="1400" b="1" dirty="0"/>
+              <a:t>-</a:t>
+            </a:r>
+            <a:r>
+              <a:rPr lang="it-IT" sz="1400" b="1" dirty="0">
+                <a:solidFill>
+                  <a:schemeClr val="tx1">
+                    <a:lumMod val="50000"/>
+                    <a:lumOff val="50000"/>
+                  </a:schemeClr>
+                </a:solidFill>
+              </a:rPr>
+              <a:t>O</a:t>
+            </a:r>
+            <a:r>
+              <a:rPr lang="it-IT" sz="1400" b="1" dirty="0"/>
+              <a:t>n in </a:t>
+            </a:r>
+            <a:r>
+              <a:rPr lang="it-IT" sz="1400" b="1" dirty="0" err="1">
+                <a:solidFill>
+                  <a:srgbClr val="F18D2C"/>
+                </a:solidFill>
+              </a:rPr>
+              <a:t>ARX</a:t>
+            </a:r>
+            <a:r>
+              <a:rPr lang="it-IT" sz="1400" b="1" dirty="0" err="1"/>
+              <a:t>ivar</a:t>
+            </a:r>
+            <a:r>
+              <a:rPr lang="it-IT" sz="1400" b="1" dirty="0"/>
+              <a:t> Web Portal. </a:t>
+            </a:r>
+          </a:p>
+          <a:p>
+            <a:pPr marL="457200" lvl="1" indent="0">
+              <a:buNone/>
+            </a:pPr>
+            <a:r>
+              <a:rPr lang="it-IT" sz="1000" b="1" dirty="0"/>
+              <a:t> </a:t>
+            </a:r>
+            <a:r>
+              <a:rPr lang="it-IT" sz="1000" b="1" dirty="0" err="1"/>
+              <a:t>Web.config</a:t>
+            </a:r>
+            <a:r>
+              <a:rPr lang="it-IT" sz="1000" b="1" dirty="0"/>
+              <a:t>:</a:t>
+            </a:r>
+          </a:p>
+          <a:p>
+            <a:pPr marL="0" indent="0">
+              <a:buNone/>
+            </a:pPr>
+            <a:r>
+              <a:rPr lang="it-IT" sz="1100" b="1" dirty="0"/>
+              <a:t>	&lt;</a:t>
+            </a:r>
+            <a:r>
+              <a:rPr lang="it-IT" sz="1100" b="1" dirty="0" err="1"/>
+              <a:t>add</a:t>
+            </a:r>
+            <a:r>
+              <a:rPr lang="it-IT" sz="1100" b="1" dirty="0"/>
+              <a:t> key="</a:t>
+            </a:r>
+            <a:r>
+              <a:rPr lang="it-IT" sz="1100" b="1" dirty="0" err="1"/>
+              <a:t>LogonProviderId</a:t>
+            </a:r>
+            <a:r>
+              <a:rPr lang="it-IT" sz="1100" b="1" dirty="0"/>
+              <a:t>" </a:t>
+            </a:r>
+            <a:r>
+              <a:rPr lang="it-IT" sz="1100" b="1" dirty="0" err="1"/>
+              <a:t>value</a:t>
+            </a:r>
+            <a:r>
+              <a:rPr lang="it-IT" sz="1100" b="1" dirty="0"/>
+              <a:t>="</a:t>
+            </a:r>
+            <a:r>
+              <a:rPr lang="it-IT" sz="1100" b="1" i="1" dirty="0">
+                <a:solidFill>
+                  <a:schemeClr val="tx1">
+                    <a:lumMod val="50000"/>
+                    <a:lumOff val="50000"/>
+                  </a:schemeClr>
+                </a:solidFill>
+              </a:rPr>
+              <a:t>&lt;</a:t>
+            </a:r>
+            <a:r>
+              <a:rPr lang="it-IT" sz="1100" b="1" i="1" dirty="0" err="1">
+                <a:solidFill>
+                  <a:schemeClr val="tx1">
+                    <a:lumMod val="50000"/>
+                    <a:lumOff val="50000"/>
+                  </a:schemeClr>
+                </a:solidFill>
+              </a:rPr>
+              <a:t>LogonProviderId</a:t>
+            </a:r>
+            <a:r>
+              <a:rPr lang="it-IT" sz="1100" b="1" i="1" dirty="0">
+                <a:solidFill>
+                  <a:schemeClr val="tx1">
+                    <a:lumMod val="50000"/>
+                    <a:lumOff val="50000"/>
+                  </a:schemeClr>
+                </a:solidFill>
+              </a:rPr>
+              <a:t>&gt;</a:t>
+            </a:r>
+            <a:r>
+              <a:rPr lang="it-IT" sz="1100" b="1" dirty="0"/>
+              <a:t>"/&gt;</a:t>
+            </a:r>
+          </a:p>
+        </p:txBody>
+      </p:sp>
+    </p:spTree>
+    <p:extLst>
+      <p:ext uri="{BB962C8B-B14F-4D97-AF65-F5344CB8AC3E}">
+        <p14:creationId xmlns:p14="http://schemas.microsoft.com/office/powerpoint/2010/main" val="3633445696"/>
       </p:ext>
     </p:extLst>
   </p:cSld>

</xml_diff>

<commit_message>
Updated slides with workflow v2 plugin
</commit_message>
<xml_diff>
--- a/doc/ARXDev4.pptx
+++ b/doc/ARXDev4.pptx
@@ -5,17 +5,14 @@
     <p:sldMasterId id="2147483648" r:id="rId1"/>
   </p:sldMasterIdLst>
   <p:notesMasterIdLst>
-    <p:notesMasterId r:id="rId10"/>
+    <p:notesMasterId r:id="rId7"/>
   </p:notesMasterIdLst>
   <p:sldIdLst>
     <p:sldId id="256" r:id="rId2"/>
     <p:sldId id="257" r:id="rId3"/>
     <p:sldId id="266" r:id="rId4"/>
-    <p:sldId id="261" r:id="rId5"/>
+    <p:sldId id="271" r:id="rId5"/>
     <p:sldId id="265" r:id="rId6"/>
-    <p:sldId id="267" r:id="rId7"/>
-    <p:sldId id="268" r:id="rId8"/>
-    <p:sldId id="269" r:id="rId9"/>
   </p:sldIdLst>
   <p:sldSz cx="9144000" cy="5143500" type="screen16x9"/>
   <p:notesSz cx="6858000" cy="9144000"/>
@@ -216,7 +213,7 @@
             <a:fld id="{00C895A6-56DD-4B18-B404-54899C94D855}" type="datetimeFigureOut">
               <a:rPr lang="it-IT" smtClean="0"/>
               <a:pPr/>
-              <a:t>24/05/2021</a:t>
+              <a:t>27/01/2022</a:t>
             </a:fld>
             <a:endParaRPr lang="it-IT"/>
           </a:p>
@@ -553,91 +550,6 @@
             <a:fld id="{3CF3775E-9C01-4A92-BB01-B68E47CD8D8D}" type="slidenum">
               <a:rPr lang="it-IT" smtClean="0"/>
               <a:pPr/>
-              <a:t>4</a:t>
-            </a:fld>
-            <a:endParaRPr lang="it-IT"/>
-          </a:p>
-        </p:txBody>
-      </p:sp>
-    </p:spTree>
-    <p:extLst>
-      <p:ext uri="{BB962C8B-B14F-4D97-AF65-F5344CB8AC3E}">
-        <p14:creationId xmlns:p14="http://schemas.microsoft.com/office/powerpoint/2010/main" val="147968671"/>
-      </p:ext>
-    </p:extLst>
-  </p:cSld>
-  <p:clrMapOvr>
-    <a:masterClrMapping/>
-  </p:clrMapOvr>
-</p:notes>
-</file>
-
-<file path=ppt/notesSlides/notesSlide2.xml><?xml version="1.0" encoding="utf-8"?>
-<p:notes xmlns:a="http://schemas.openxmlformats.org/drawingml/2006/main" xmlns:r="http://schemas.openxmlformats.org/officeDocument/2006/relationships" xmlns:p="http://schemas.openxmlformats.org/presentationml/2006/main">
-  <p:cSld>
-    <p:spTree>
-      <p:nvGrpSpPr>
-        <p:cNvPr id="1" name=""/>
-        <p:cNvGrpSpPr/>
-        <p:nvPr/>
-      </p:nvGrpSpPr>
-      <p:grpSpPr>
-        <a:xfrm>
-          <a:off x="0" y="0"/>
-          <a:ext cx="0" cy="0"/>
-          <a:chOff x="0" y="0"/>
-          <a:chExt cx="0" cy="0"/>
-        </a:xfrm>
-      </p:grpSpPr>
-      <p:sp>
-        <p:nvSpPr>
-          <p:cNvPr id="2" name="Slide Image Placeholder 1"/>
-          <p:cNvSpPr>
-            <a:spLocks noGrp="1" noRot="1" noChangeAspect="1"/>
-          </p:cNvSpPr>
-          <p:nvPr>
-            <p:ph type="sldImg"/>
-          </p:nvPr>
-        </p:nvSpPr>
-        <p:spPr/>
-      </p:sp>
-      <p:sp>
-        <p:nvSpPr>
-          <p:cNvPr id="3" name="Notes Placeholder 2"/>
-          <p:cNvSpPr>
-            <a:spLocks noGrp="1"/>
-          </p:cNvSpPr>
-          <p:nvPr>
-            <p:ph type="body" idx="1"/>
-          </p:nvPr>
-        </p:nvSpPr>
-        <p:spPr/>
-        <p:txBody>
-          <a:bodyPr/>
-          <a:lstStyle/>
-          <a:p>
-            <a:endParaRPr lang="it-IT" dirty="0"/>
-          </a:p>
-        </p:txBody>
-      </p:sp>
-      <p:sp>
-        <p:nvSpPr>
-          <p:cNvPr id="4" name="Slide Number Placeholder 3"/>
-          <p:cNvSpPr>
-            <a:spLocks noGrp="1"/>
-          </p:cNvSpPr>
-          <p:nvPr>
-            <p:ph type="sldNum" sz="quarter" idx="10"/>
-          </p:nvPr>
-        </p:nvSpPr>
-        <p:spPr/>
-        <p:txBody>
-          <a:bodyPr/>
-          <a:lstStyle/>
-          <a:p>
-            <a:fld id="{3CF3775E-9C01-4A92-BB01-B68E47CD8D8D}" type="slidenum">
-              <a:rPr lang="it-IT" smtClean="0"/>
-              <a:pPr/>
               <a:t>5</a:t>
             </a:fld>
             <a:endParaRPr lang="it-IT"/>
@@ -839,7 +751,7 @@
             <a:fld id="{4633ECFB-6927-4181-8532-1ECC482329AC}" type="datetimeFigureOut">
               <a:rPr lang="it-IT" smtClean="0"/>
               <a:pPr/>
-              <a:t>24/05/2021</a:t>
+              <a:t>27/01/2022</a:t>
             </a:fld>
             <a:endParaRPr lang="it-IT"/>
           </a:p>
@@ -1006,7 +918,7 @@
             <a:fld id="{4633ECFB-6927-4181-8532-1ECC482329AC}" type="datetimeFigureOut">
               <a:rPr lang="it-IT" smtClean="0"/>
               <a:pPr/>
-              <a:t>24/05/2021</a:t>
+              <a:t>27/01/2022</a:t>
             </a:fld>
             <a:endParaRPr lang="it-IT"/>
           </a:p>
@@ -1183,7 +1095,7 @@
             <a:fld id="{4633ECFB-6927-4181-8532-1ECC482329AC}" type="datetimeFigureOut">
               <a:rPr lang="it-IT" smtClean="0"/>
               <a:pPr/>
-              <a:t>24/05/2021</a:t>
+              <a:t>27/01/2022</a:t>
             </a:fld>
             <a:endParaRPr lang="it-IT"/>
           </a:p>
@@ -1350,7 +1262,7 @@
             <a:fld id="{4633ECFB-6927-4181-8532-1ECC482329AC}" type="datetimeFigureOut">
               <a:rPr lang="it-IT" smtClean="0"/>
               <a:pPr/>
-              <a:t>24/05/2021</a:t>
+              <a:t>27/01/2022</a:t>
             </a:fld>
             <a:endParaRPr lang="it-IT"/>
           </a:p>
@@ -1593,7 +1505,7 @@
             <a:fld id="{4633ECFB-6927-4181-8532-1ECC482329AC}" type="datetimeFigureOut">
               <a:rPr lang="it-IT" smtClean="0"/>
               <a:pPr/>
-              <a:t>24/05/2021</a:t>
+              <a:t>27/01/2022</a:t>
             </a:fld>
             <a:endParaRPr lang="it-IT"/>
           </a:p>
@@ -1878,7 +1790,7 @@
             <a:fld id="{4633ECFB-6927-4181-8532-1ECC482329AC}" type="datetimeFigureOut">
               <a:rPr lang="it-IT" smtClean="0"/>
               <a:pPr/>
-              <a:t>24/05/2021</a:t>
+              <a:t>27/01/2022</a:t>
             </a:fld>
             <a:endParaRPr lang="it-IT"/>
           </a:p>
@@ -2297,7 +2209,7 @@
             <a:fld id="{4633ECFB-6927-4181-8532-1ECC482329AC}" type="datetimeFigureOut">
               <a:rPr lang="it-IT" smtClean="0"/>
               <a:pPr/>
-              <a:t>24/05/2021</a:t>
+              <a:t>27/01/2022</a:t>
             </a:fld>
             <a:endParaRPr lang="it-IT"/>
           </a:p>
@@ -2412,7 +2324,7 @@
             <a:fld id="{4633ECFB-6927-4181-8532-1ECC482329AC}" type="datetimeFigureOut">
               <a:rPr lang="it-IT" smtClean="0"/>
               <a:pPr/>
-              <a:t>24/05/2021</a:t>
+              <a:t>27/01/2022</a:t>
             </a:fld>
             <a:endParaRPr lang="it-IT"/>
           </a:p>
@@ -2504,7 +2416,7 @@
             <a:fld id="{4633ECFB-6927-4181-8532-1ECC482329AC}" type="datetimeFigureOut">
               <a:rPr lang="it-IT" smtClean="0"/>
               <a:pPr/>
-              <a:t>24/05/2021</a:t>
+              <a:t>27/01/2022</a:t>
             </a:fld>
             <a:endParaRPr lang="it-IT"/>
           </a:p>
@@ -2778,7 +2690,7 @@
             <a:fld id="{4633ECFB-6927-4181-8532-1ECC482329AC}" type="datetimeFigureOut">
               <a:rPr lang="it-IT" smtClean="0"/>
               <a:pPr/>
-              <a:t>24/05/2021</a:t>
+              <a:t>27/01/2022</a:t>
             </a:fld>
             <a:endParaRPr lang="it-IT"/>
           </a:p>
@@ -3032,7 +2944,7 @@
             <a:fld id="{4633ECFB-6927-4181-8532-1ECC482329AC}" type="datetimeFigureOut">
               <a:rPr lang="it-IT" smtClean="0"/>
               <a:pPr/>
-              <a:t>24/05/2021</a:t>
+              <a:t>27/01/2022</a:t>
             </a:fld>
             <a:endParaRPr lang="it-IT"/>
           </a:p>
@@ -3328,7 +3240,7 @@
             <a:fld id="{4633ECFB-6927-4181-8532-1ECC482329AC}" type="datetimeFigureOut">
               <a:rPr lang="it-IT" smtClean="0"/>
               <a:pPr/>
-              <a:t>24/05/2021</a:t>
+              <a:t>27/01/2022</a:t>
             </a:fld>
             <a:endParaRPr lang="it-IT" dirty="0"/>
           </a:p>
@@ -4364,12 +4276,6 @@
           <a:p>
             <a:r>
               <a:rPr lang="it-IT" sz="2000" b="1" dirty="0"/>
-              <a:t>Architettura orientata ai servizi</a:t>
-            </a:r>
-          </a:p>
-          <a:p>
-            <a:r>
-              <a:rPr lang="it-IT" sz="2000" b="1" dirty="0"/>
               <a:t>Plugin server</a:t>
             </a:r>
           </a:p>
@@ -4377,7 +4283,22 @@
             <a:pPr lvl="1"/>
             <a:r>
               <a:rPr lang="it-IT" sz="1400" b="1" dirty="0"/>
-              <a:t>Come vedere i </a:t>
+              <a:t>I plugin </a:t>
+            </a:r>
+            <a:r>
+              <a:rPr lang="it-IT" sz="1400" b="1" dirty="0" err="1"/>
+              <a:t>rest</a:t>
+            </a:r>
+            <a:r>
+              <a:rPr lang="it-IT" sz="1400" b="1" dirty="0"/>
+              <a:t>: endpoint, configurazione </a:t>
+            </a:r>
+          </a:p>
+          <a:p>
+            <a:pPr lvl="1"/>
+            <a:r>
+              <a:rPr lang="it-IT" sz="1400" b="1" dirty="0"/>
+              <a:t>Scrittura di un </a:t>
             </a:r>
             <a:r>
               <a:rPr lang="it-IT" sz="1400" b="1" dirty="0" err="1"/>
@@ -4385,7 +4306,62 @@
             </a:r>
             <a:r>
               <a:rPr lang="it-IT" sz="1400" b="1" dirty="0"/>
-              <a:t> caricati: console servizio </a:t>
+              <a:t> </a:t>
+            </a:r>
+            <a:r>
+              <a:rPr lang="it-IT" sz="1400" b="1" dirty="0" err="1"/>
+              <a:t>rest</a:t>
+            </a:r>
+            <a:endParaRPr lang="it-IT" sz="1400" b="1" dirty="0"/>
+          </a:p>
+          <a:p>
+            <a:pPr lvl="1"/>
+            <a:r>
+              <a:rPr lang="it-IT" sz="1400" b="1" dirty="0"/>
+              <a:t>Gli eventi di «</a:t>
+            </a:r>
+            <a:r>
+              <a:rPr lang="it-IT" sz="1400" b="1" dirty="0" err="1"/>
+              <a:t>OnBefore</a:t>
+            </a:r>
+            <a:r>
+              <a:rPr lang="it-IT" sz="1400" b="1" dirty="0"/>
+              <a:t>» e «</a:t>
+            </a:r>
+            <a:r>
+              <a:rPr lang="it-IT" sz="1400" b="1" dirty="0" err="1"/>
+              <a:t>OnAfter</a:t>
+            </a:r>
+            <a:r>
+              <a:rPr lang="it-IT" sz="1400" b="1" dirty="0"/>
+              <a:t>»</a:t>
+            </a:r>
+          </a:p>
+          <a:p>
+            <a:pPr lvl="1"/>
+            <a:r>
+              <a:rPr lang="it-IT" sz="1400" b="1" dirty="0"/>
+              <a:t>Come raggiungere un plugin server dal </a:t>
+            </a:r>
+            <a:r>
+              <a:rPr lang="it-IT" sz="1400" b="1" i="1" dirty="0" err="1"/>
+              <a:t>WcfConnectorManager</a:t>
+            </a:r>
+            <a:r>
+              <a:rPr lang="it-IT" sz="1400" b="1" dirty="0"/>
+              <a:t>/</a:t>
+            </a:r>
+            <a:r>
+              <a:rPr lang="it-IT" sz="1400" b="1" i="1" dirty="0" err="1"/>
+              <a:t>WebApi</a:t>
+            </a:r>
+            <a:endParaRPr lang="it-IT" sz="1400" b="1" i="1" dirty="0"/>
+          </a:p>
+          <a:p>
+            <a:pPr lvl="1"/>
+            <a:r>
+              <a:rPr lang="it-IT" sz="1400" b="1" dirty="0"/>
+              <a:t>Deployment e debug: </a:t>
             </a:r>
             <a:r>
               <a:rPr lang="it-IT" sz="1400" b="1" dirty="0" err="1"/>
@@ -4397,139 +4373,6 @@
             </a:r>
             <a:r>
               <a:rPr lang="it-IT" sz="1400" b="1" dirty="0" err="1"/>
-              <a:t>Rest</a:t>
-            </a:r>
-            <a:r>
-              <a:rPr lang="it-IT" sz="1400" b="1" dirty="0"/>
-              <a:t>, </a:t>
-            </a:r>
-            <a:r>
-              <a:rPr lang="it-IT" sz="1400" b="1" dirty="0" err="1"/>
-              <a:t>WCFConnectorManager</a:t>
-            </a:r>
-            <a:r>
-              <a:rPr lang="it-IT" sz="1400" b="1" dirty="0"/>
-              <a:t>, </a:t>
-            </a:r>
-            <a:r>
-              <a:rPr lang="it-IT" sz="1400" b="1" dirty="0" err="1"/>
-              <a:t>WebApi</a:t>
-            </a:r>
-            <a:endParaRPr lang="it-IT" sz="1400" b="1" dirty="0"/>
-          </a:p>
-          <a:p>
-            <a:pPr lvl="1"/>
-            <a:r>
-              <a:rPr lang="it-IT" sz="1400" b="1" dirty="0"/>
-              <a:t>I </a:t>
-            </a:r>
-            <a:r>
-              <a:rPr lang="it-IT" sz="1400" b="1" dirty="0" err="1"/>
-              <a:t>plugin</a:t>
-            </a:r>
-            <a:r>
-              <a:rPr lang="it-IT" sz="1400" b="1" dirty="0"/>
-              <a:t> </a:t>
-            </a:r>
-            <a:r>
-              <a:rPr lang="it-IT" sz="1400" b="1" dirty="0" err="1"/>
-              <a:t>rest</a:t>
-            </a:r>
-            <a:r>
-              <a:rPr lang="it-IT" sz="1400" b="1" dirty="0"/>
-              <a:t>: </a:t>
-            </a:r>
-            <a:r>
-              <a:rPr lang="it-IT" sz="1400" b="1" dirty="0" err="1"/>
-              <a:t>endpoint</a:t>
-            </a:r>
-            <a:r>
-              <a:rPr lang="it-IT" sz="1400" b="1" dirty="0"/>
-              <a:t>, configurazione </a:t>
-            </a:r>
-          </a:p>
-          <a:p>
-            <a:pPr lvl="1"/>
-            <a:r>
-              <a:rPr lang="it-IT" sz="1400" b="1" dirty="0"/>
-              <a:t>Scrittura di un </a:t>
-            </a:r>
-            <a:r>
-              <a:rPr lang="it-IT" sz="1400" b="1" dirty="0" err="1"/>
-              <a:t>plugin</a:t>
-            </a:r>
-            <a:r>
-              <a:rPr lang="it-IT" sz="1400" b="1" dirty="0"/>
-              <a:t> </a:t>
-            </a:r>
-            <a:r>
-              <a:rPr lang="it-IT" sz="1400" b="1" dirty="0" err="1"/>
-              <a:t>rest</a:t>
-            </a:r>
-            <a:endParaRPr lang="it-IT" sz="1400" b="1" dirty="0"/>
-          </a:p>
-          <a:p>
-            <a:pPr lvl="1"/>
-            <a:r>
-              <a:rPr lang="it-IT" sz="1400" b="1" dirty="0"/>
-              <a:t>Gli eventi di «</a:t>
-            </a:r>
-            <a:r>
-              <a:rPr lang="it-IT" sz="1400" b="1" dirty="0" err="1"/>
-              <a:t>Before</a:t>
-            </a:r>
-            <a:r>
-              <a:rPr lang="it-IT" sz="1400" b="1" dirty="0"/>
-              <a:t>» e «</a:t>
-            </a:r>
-            <a:r>
-              <a:rPr lang="it-IT" sz="1400" b="1" dirty="0" err="1"/>
-              <a:t>After</a:t>
-            </a:r>
-            <a:r>
-              <a:rPr lang="it-IT" sz="1400" b="1" dirty="0"/>
-              <a:t>»</a:t>
-            </a:r>
-          </a:p>
-          <a:p>
-            <a:pPr lvl="1"/>
-            <a:r>
-              <a:rPr lang="it-IT" sz="1400" b="1" dirty="0"/>
-              <a:t>Gestione della configurazione dei </a:t>
-            </a:r>
-            <a:r>
-              <a:rPr lang="it-IT" sz="1400" b="1" dirty="0" err="1"/>
-              <a:t>plugin</a:t>
-            </a:r>
-            <a:r>
-              <a:rPr lang="it-IT" sz="1400" b="1" dirty="0"/>
-              <a:t> server</a:t>
-            </a:r>
-          </a:p>
-          <a:p>
-            <a:pPr lvl="1"/>
-            <a:r>
-              <a:rPr lang="it-IT" sz="1400" b="1" dirty="0"/>
-              <a:t>Deployment e </a:t>
-            </a:r>
-            <a:r>
-              <a:rPr lang="it-IT" sz="1400" b="1" dirty="0" err="1"/>
-              <a:t>debug</a:t>
-            </a:r>
-            <a:r>
-              <a:rPr lang="it-IT" sz="1400" b="1" dirty="0"/>
-              <a:t>: </a:t>
-            </a:r>
-            <a:r>
-              <a:rPr lang="it-IT" sz="1400" b="1" dirty="0" err="1"/>
-              <a:t>Wcf</a:t>
-            </a:r>
-            <a:r>
-              <a:rPr lang="it-IT" sz="1400" b="1" dirty="0"/>
-              <a:t>, </a:t>
-            </a:r>
-            <a:r>
-              <a:rPr lang="it-IT" sz="1400" b="1" dirty="0" err="1"/>
               <a:t>WebApi</a:t>
             </a:r>
             <a:endParaRPr lang="it-IT" sz="1400" b="1" dirty="0"/>
@@ -4550,14 +4393,22 @@
             <a:pPr lvl="1"/>
             <a:r>
               <a:rPr lang="it-IT" sz="1400" b="1" dirty="0"/>
-              <a:t>Plugin Workflow Link</a:t>
-            </a:r>
+              <a:t>Plugin Workflow  Link</a:t>
+            </a:r>
+            <a:endParaRPr lang="it-IT" sz="1000" b="1" dirty="0"/>
           </a:p>
           <a:p>
             <a:pPr lvl="1"/>
             <a:r>
               <a:rPr lang="it-IT" sz="1400" b="1" dirty="0"/>
               <a:t>Plugin Workflow Task</a:t>
+            </a:r>
+          </a:p>
+          <a:p>
+            <a:pPr lvl="1"/>
+            <a:r>
+              <a:rPr lang="it-IT" sz="1400" b="1" dirty="0"/>
+              <a:t>Deployment e Debug</a:t>
             </a:r>
             <a:endParaRPr lang="it-IT" sz="1100" b="1" dirty="0"/>
           </a:p>
@@ -4656,302 +4507,150 @@
           <a:lstStyle/>
           <a:p>
             <a:r>
+              <a:rPr lang="it-IT" sz="2000" b="1" dirty="0"/>
+              <a:t>Preparazione</a:t>
+            </a:r>
+            <a:r>
               <a:rPr lang="it-IT" sz="1800" b="1" dirty="0"/>
-              <a:t>Logon Provider «</a:t>
-            </a:r>
-            <a:r>
-              <a:rPr lang="it-IT" sz="1800" b="1" dirty="0" err="1"/>
-              <a:t>Credentials</a:t>
-            </a:r>
-            <a:r>
-              <a:rPr lang="it-IT" sz="1800" b="1" dirty="0"/>
-              <a:t>»</a:t>
+              <a:t> di un Plugin Workflow V2 link</a:t>
             </a:r>
           </a:p>
           <a:p>
             <a:pPr lvl="1"/>
             <a:r>
               <a:rPr lang="it-IT" sz="1400" b="1" dirty="0"/>
-              <a:t>Il plugin ha il compito di validare le credenziali dell’utente.</a:t>
-            </a:r>
-          </a:p>
-          <a:p>
-            <a:pPr lvl="1"/>
+              <a:t>Utilizzo di </a:t>
+            </a:r>
+            <a:r>
+              <a:rPr lang="it-IT" sz="1400" b="1" i="1" dirty="0" err="1"/>
+              <a:t>yo</a:t>
+            </a:r>
+            <a:r>
+              <a:rPr lang="it-IT" sz="1400" b="1" i="1" dirty="0"/>
+              <a:t> man </a:t>
+            </a:r>
             <a:r>
               <a:rPr lang="it-IT" sz="1400" b="1" dirty="0"/>
-              <a:t>Viene loggato l’utente </a:t>
-            </a:r>
-            <a:r>
-              <a:rPr lang="it-IT" sz="1400" b="1" dirty="0" err="1">
+              <a:t>per creare il plugin </a:t>
+            </a:r>
+          </a:p>
+          <a:p>
+            <a:pPr lvl="2"/>
+            <a:r>
+              <a:rPr lang="it-IT" sz="1000" b="1" dirty="0"/>
+              <a:t>Plugin generator: </a:t>
+            </a:r>
+            <a:r>
+              <a:rPr lang="it-IT" sz="1000" b="1" dirty="0">
+                <a:hlinkClick r:id="rId2"/>
+              </a:rPr>
+              <a:t>https://github.com/Arxivar/PluginGenerator</a:t>
+            </a:r>
+            <a:endParaRPr lang="it-IT" sz="1000" b="1" dirty="0"/>
+          </a:p>
+          <a:p>
+            <a:pPr lvl="2"/>
+            <a:r>
+              <a:rPr lang="it-IT" sz="1000" b="1" i="1" dirty="0" err="1">
                 <a:solidFill>
-                  <a:schemeClr val="accent1"/>
+                  <a:schemeClr val="accent3"/>
                 </a:solidFill>
               </a:rPr>
-              <a:t>ARX</a:t>
-            </a:r>
-            <a:r>
-              <a:rPr lang="it-IT" sz="1400" b="1" dirty="0" err="1"/>
-              <a:t>ivar</a:t>
-            </a:r>
-            <a:r>
-              <a:rPr lang="it-IT" sz="1400" b="1" dirty="0"/>
-              <a:t> associato allo username specificato</a:t>
-            </a:r>
-            <a:endParaRPr lang="it-IT" sz="800" b="1" dirty="0"/>
-          </a:p>
-          <a:p>
-            <a:endParaRPr lang="it-IT" sz="1100" b="1" dirty="0"/>
-          </a:p>
-          <a:p>
-            <a:r>
-              <a:rPr lang="it-IT" sz="1800" b="1" dirty="0"/>
-              <a:t>Logon Provider </a:t>
-            </a:r>
-            <a:r>
-              <a:rPr lang="it-IT" sz="1800" b="1" dirty="0">
+              <a:t>yo</a:t>
+            </a:r>
+            <a:r>
+              <a:rPr lang="it-IT" sz="1000" b="1" i="1" dirty="0">
                 <a:solidFill>
-                  <a:schemeClr val="tx1">
-                    <a:lumMod val="50000"/>
-                    <a:lumOff val="50000"/>
-                  </a:schemeClr>
+                  <a:schemeClr val="accent3"/>
                 </a:solidFill>
               </a:rPr>
-              <a:t>S</a:t>
-            </a:r>
-            <a:r>
-              <a:rPr lang="it-IT" sz="1800" b="1" dirty="0"/>
-              <a:t>ingle </a:t>
-            </a:r>
-            <a:r>
-              <a:rPr lang="it-IT" sz="1800" b="1" dirty="0" err="1">
-                <a:solidFill>
-                  <a:schemeClr val="tx1">
-                    <a:lumMod val="50000"/>
-                    <a:lumOff val="50000"/>
-                  </a:schemeClr>
-                </a:solidFill>
-              </a:rPr>
-              <a:t>S</a:t>
-            </a:r>
-            <a:r>
-              <a:rPr lang="it-IT" sz="1800" b="1" dirty="0" err="1"/>
-              <a:t>ign</a:t>
-            </a:r>
-            <a:r>
-              <a:rPr lang="it-IT" sz="1800" b="1" dirty="0"/>
-              <a:t>-</a:t>
-            </a:r>
-            <a:r>
-              <a:rPr lang="it-IT" sz="1800" b="1" dirty="0">
-                <a:solidFill>
-                  <a:schemeClr val="tx1">
-                    <a:lumMod val="50000"/>
-                    <a:lumOff val="50000"/>
-                  </a:schemeClr>
-                </a:solidFill>
-              </a:rPr>
-              <a:t>O</a:t>
-            </a:r>
-            <a:r>
-              <a:rPr lang="it-IT" sz="1800" b="1" dirty="0"/>
-              <a:t>n (</a:t>
-            </a:r>
-            <a:r>
-              <a:rPr lang="it-IT" sz="1800" b="1" dirty="0">
-                <a:solidFill>
-                  <a:schemeClr val="tx1">
-                    <a:lumMod val="50000"/>
-                    <a:lumOff val="50000"/>
-                  </a:schemeClr>
-                </a:solidFill>
-              </a:rPr>
-              <a:t>SSO</a:t>
-            </a:r>
-            <a:r>
-              <a:rPr lang="it-IT" sz="1800" b="1" dirty="0"/>
-              <a:t>) </a:t>
+              <a:t> arxivar-plugins:link-workflow-v2</a:t>
             </a:r>
           </a:p>
           <a:p>
             <a:pPr lvl="1"/>
             <a:r>
               <a:rPr lang="it-IT" sz="1400" b="1" dirty="0"/>
-              <a:t>La fase di autenticazione viene demandata ad un attore esterno</a:t>
+              <a:t>Parametri per il mapping con le variabili di processo</a:t>
+            </a:r>
+          </a:p>
+          <a:p>
+            <a:pPr lvl="2"/>
+            <a:r>
+              <a:rPr lang="it-IT" sz="1000" b="1" dirty="0"/>
+              <a:t>input </a:t>
+            </a:r>
+          </a:p>
+          <a:p>
+            <a:pPr lvl="2"/>
+            <a:r>
+              <a:rPr lang="it-IT" sz="1000" b="1" dirty="0"/>
+              <a:t>output</a:t>
             </a:r>
           </a:p>
           <a:p>
             <a:pPr lvl="1"/>
             <a:r>
               <a:rPr lang="it-IT" sz="1400" b="1" dirty="0"/>
-              <a:t>Vengono utilizzati flussi di autenticazione e autorizzazione che fanno parte di standard:</a:t>
+              <a:t>Iniezione dei servizi (lato server)</a:t>
+            </a:r>
+            <a:endParaRPr lang="it-IT" sz="1000" b="1" dirty="0"/>
+          </a:p>
+          <a:p>
+            <a:pPr lvl="1"/>
+            <a:r>
+              <a:rPr lang="it-IT" sz="1400" b="1" dirty="0"/>
+              <a:t>Configurazione avanzata</a:t>
             </a:r>
           </a:p>
           <a:p>
             <a:pPr lvl="2"/>
             <a:r>
-              <a:rPr lang="it-IT" sz="1100" b="1" dirty="0"/>
-              <a:t>OAUTH 2 (</a:t>
-            </a:r>
-            <a:r>
-              <a:rPr lang="it-IT" sz="1100" b="1" dirty="0">
-                <a:hlinkClick r:id="rId2"/>
-              </a:rPr>
-              <a:t>https://oauth.net/2/</a:t>
-            </a:r>
-            <a:r>
-              <a:rPr lang="it-IT" sz="1100" b="1" dirty="0"/>
-              <a:t>) RFC </a:t>
-            </a:r>
-            <a:r>
-              <a:rPr lang="it-IT" sz="1100" b="1" dirty="0">
-                <a:hlinkClick r:id="rId3"/>
-              </a:rPr>
-              <a:t>https://datatracker.ietf.org/doc/html/rfc6749</a:t>
-            </a:r>
-            <a:endParaRPr lang="it-IT" sz="1100" b="1" dirty="0"/>
+              <a:rPr lang="it-IT" sz="1000" b="1" dirty="0" err="1"/>
+              <a:t>Angular</a:t>
+            </a:r>
+            <a:r>
+              <a:rPr lang="it-IT" sz="1000" b="1" dirty="0"/>
+              <a:t> JS/ </a:t>
+            </a:r>
+            <a:r>
+              <a:rPr lang="it-IT" sz="1000" b="1" dirty="0" err="1"/>
+              <a:t>Typescript</a:t>
+            </a:r>
+            <a:endParaRPr lang="it-IT" sz="1000" b="1" dirty="0"/>
           </a:p>
           <a:p>
             <a:pPr lvl="2"/>
             <a:r>
-              <a:rPr lang="it-IT" sz="1100" b="1" dirty="0" err="1"/>
-              <a:t>OpenID</a:t>
-            </a:r>
-            <a:r>
-              <a:rPr lang="it-IT" sz="1100" b="1" dirty="0"/>
-              <a:t> Connect (</a:t>
-            </a:r>
-            <a:r>
-              <a:rPr lang="it-IT" sz="1100" b="1" dirty="0">
-                <a:hlinkClick r:id="rId4"/>
-              </a:rPr>
-              <a:t>https://openid.net/specs</a:t>
-            </a:r>
-            <a:r>
-              <a:rPr lang="it-IT" sz="1100" b="1" dirty="0"/>
-              <a:t>)</a:t>
-            </a:r>
-            <a:endParaRPr lang="it-IT" sz="700" b="1" dirty="0"/>
-          </a:p>
-          <a:p>
-            <a:pPr lvl="1"/>
-            <a:r>
-              <a:rPr lang="it-IT" sz="1400" b="1" dirty="0"/>
-              <a:t>Viene loggato l’utente </a:t>
-            </a:r>
-            <a:r>
-              <a:rPr lang="it-IT" sz="1400" b="1" dirty="0" err="1">
-                <a:solidFill>
-                  <a:srgbClr val="F18D2C"/>
-                </a:solidFill>
-              </a:rPr>
-              <a:t>ARX</a:t>
-            </a:r>
-            <a:r>
-              <a:rPr lang="it-IT" sz="1400" b="1" dirty="0" err="1"/>
-              <a:t>ivar</a:t>
-            </a:r>
-            <a:r>
-              <a:rPr lang="it-IT" sz="1400" b="1" dirty="0"/>
-              <a:t> associato allo username specificato</a:t>
-            </a:r>
-            <a:endParaRPr lang="it-IT" sz="1100" b="1" dirty="0"/>
-          </a:p>
-        </p:txBody>
-      </p:sp>
-      <p:pic>
-        <p:nvPicPr>
-          <p:cNvPr id="1030" name="Picture 6" descr="Back Home">
-            <a:extLst>
-              <a:ext uri="{FF2B5EF4-FFF2-40B4-BE49-F238E27FC236}">
-                <a16:creationId xmlns:a16="http://schemas.microsoft.com/office/drawing/2014/main" id="{CCBE0D95-8CC8-40CE-871C-12672E0CE932}"/>
-              </a:ext>
-            </a:extLst>
-          </p:cNvPr>
-          <p:cNvPicPr>
-            <a:picLocks noChangeAspect="1" noChangeArrowheads="1"/>
-          </p:cNvPicPr>
-          <p:nvPr/>
-        </p:nvPicPr>
-        <p:blipFill>
-          <a:blip r:embed="rId5" cstate="print">
-            <a:extLst>
-              <a:ext uri="{28A0092B-C50C-407E-A947-70E740481C1C}">
-                <a14:useLocalDpi xmlns:a14="http://schemas.microsoft.com/office/drawing/2010/main" val="0"/>
-              </a:ext>
-            </a:extLst>
-          </a:blip>
-          <a:srcRect/>
-          <a:stretch>
-            <a:fillRect/>
-          </a:stretch>
-        </p:blipFill>
-        <p:spPr bwMode="auto">
-          <a:xfrm>
-            <a:off x="4211960" y="3291830"/>
-            <a:ext cx="576064" cy="230426"/>
-          </a:xfrm>
-          <a:prstGeom prst="rect">
-            <a:avLst/>
-          </a:prstGeom>
-          <a:noFill/>
-          <a:extLst>
-            <a:ext uri="{909E8E84-426E-40DD-AFC4-6F175D3DCCD1}">
-              <a14:hiddenFill xmlns:a14="http://schemas.microsoft.com/office/drawing/2010/main">
-                <a:solidFill>
-                  <a:srgbClr val="FFFFFF"/>
-                </a:solidFill>
-              </a14:hiddenFill>
-            </a:ext>
-          </a:extLst>
-        </p:spPr>
-      </p:pic>
-      <p:pic>
-        <p:nvPicPr>
-          <p:cNvPr id="1032" name="Picture 8" descr="OAuth - Wikipedia">
-            <a:extLst>
-              <a:ext uri="{FF2B5EF4-FFF2-40B4-BE49-F238E27FC236}">
-                <a16:creationId xmlns:a16="http://schemas.microsoft.com/office/drawing/2014/main" id="{188DB98C-A08E-4E09-B36E-AD22862D4886}"/>
-              </a:ext>
-            </a:extLst>
-          </p:cNvPr>
-          <p:cNvPicPr>
-            <a:picLocks noChangeAspect="1" noChangeArrowheads="1"/>
-          </p:cNvPicPr>
-          <p:nvPr/>
-        </p:nvPicPr>
-        <p:blipFill>
-          <a:blip r:embed="rId6" cstate="print">
-            <a:extLst>
-              <a:ext uri="{28A0092B-C50C-407E-A947-70E740481C1C}">
-                <a14:useLocalDpi xmlns:a14="http://schemas.microsoft.com/office/drawing/2010/main" val="0"/>
-              </a:ext>
-            </a:extLst>
-          </a:blip>
-          <a:srcRect/>
-          <a:stretch>
-            <a:fillRect/>
-          </a:stretch>
-        </p:blipFill>
-        <p:spPr bwMode="auto">
-          <a:xfrm>
-            <a:off x="6516216" y="3061404"/>
-            <a:ext cx="230426" cy="230426"/>
-          </a:xfrm>
-          <a:prstGeom prst="rect">
-            <a:avLst/>
-          </a:prstGeom>
-          <a:noFill/>
-          <a:extLst>
-            <a:ext uri="{909E8E84-426E-40DD-AFC4-6F175D3DCCD1}">
-              <a14:hiddenFill xmlns:a14="http://schemas.microsoft.com/office/drawing/2010/main">
-                <a:solidFill>
-                  <a:srgbClr val="FFFFFF"/>
-                </a:solidFill>
-              </a14:hiddenFill>
-            </a:ext>
-          </a:extLst>
-        </p:spPr>
-      </p:pic>
+              <a:rPr lang="it-IT" sz="1000" b="1" dirty="0"/>
+              <a:t>Iniezione di servizi lato </a:t>
+            </a:r>
+            <a:r>
+              <a:rPr lang="it-IT" sz="1000" b="1" dirty="0" err="1"/>
+              <a:t>frontend</a:t>
+            </a:r>
+            <a:endParaRPr lang="it-IT" sz="1000" b="1" dirty="0"/>
+          </a:p>
+          <a:p>
+            <a:pPr marL="514350" lvl="1" indent="0">
+              <a:buNone/>
+            </a:pPr>
+            <a:endParaRPr lang="it-IT" sz="1400" b="1" dirty="0"/>
+          </a:p>
+          <a:p>
+            <a:pPr marL="457200" lvl="1" indent="0">
+              <a:buNone/>
+            </a:pPr>
+            <a:endParaRPr lang="it-IT" sz="1400" b="1" dirty="0"/>
+          </a:p>
+          <a:p>
+            <a:pPr marL="457200" lvl="1" indent="0">
+              <a:buNone/>
+            </a:pPr>
+            <a:endParaRPr lang="it-IT" sz="1400" b="1" dirty="0"/>
+          </a:p>
+        </p:txBody>
+      </p:sp>
     </p:spTree>
     <p:extLst>
       <p:ext uri="{BB962C8B-B14F-4D97-AF65-F5344CB8AC3E}">
@@ -4968,14 +4667,6 @@
 <file path=ppt/slides/slide4.xml><?xml version="1.0" encoding="utf-8"?>
 <p:sld xmlns:a="http://schemas.openxmlformats.org/drawingml/2006/main" xmlns:r="http://schemas.openxmlformats.org/officeDocument/2006/relationships" xmlns:p="http://schemas.openxmlformats.org/presentationml/2006/main">
   <p:cSld>
-    <p:bg>
-      <p:bgPr>
-        <a:solidFill>
-          <a:schemeClr val="bg1"/>
-        </a:solidFill>
-        <a:effectLst/>
-      </p:bgPr>
-    </p:bg>
     <p:spTree>
       <p:nvGrpSpPr>
         <p:cNvPr id="1" name=""/>
@@ -4992,7 +4683,7 @@
       </p:grpSpPr>
       <p:sp>
         <p:nvSpPr>
-          <p:cNvPr id="2" name="Titolo 1"/>
+          <p:cNvPr id="2" name="Title 1"/>
           <p:cNvSpPr>
             <a:spLocks noGrp="1"/>
           </p:cNvSpPr>
@@ -5002,8 +4693,8 @@
         </p:nvSpPr>
         <p:spPr>
           <a:xfrm>
-            <a:off x="467544" y="195486"/>
-            <a:ext cx="6131024" cy="864096"/>
+            <a:off x="457200" y="205979"/>
+            <a:ext cx="6563072" cy="709587"/>
           </a:xfrm>
         </p:spPr>
         <p:txBody>
@@ -5014,92 +4705,260 @@
           <a:p>
             <a:r>
               <a:rPr lang="it-IT" sz="3600" dirty="0">
-                <a:ln w="10541" cmpd="sng">
-                  <a:noFill/>
-                  <a:prstDash val="solid"/>
-                </a:ln>
                 <a:solidFill>
                   <a:srgbClr val="FFC000"/>
                 </a:solidFill>
                 <a:effectLst>
-                  <a:outerShdw blurRad="50800" dist="38100" dir="2700000" algn="tl" rotWithShape="0">
-                    <a:prstClr val="black">
-                      <a:alpha val="40000"/>
-                    </a:prstClr>
+                  <a:outerShdw blurRad="38100" dist="38100" dir="2700000" algn="tl">
+                    <a:srgbClr val="000000">
+                      <a:alpha val="43137"/>
+                    </a:srgbClr>
                   </a:outerShdw>
                 </a:effectLst>
-                <a:latin typeface="+mn-lt"/>
               </a:rPr>
-              <a:t>Architettura </a:t>
-            </a:r>
-            <a:r>
-              <a:rPr lang="it-IT" sz="3600" dirty="0" err="1">
-                <a:ln w="10541" cmpd="sng">
-                  <a:noFill/>
-                  <a:prstDash val="solid"/>
-                </a:ln>
-                <a:solidFill>
-                  <a:srgbClr val="FFC000"/>
-                </a:solidFill>
-                <a:effectLst>
-                  <a:outerShdw blurRad="50800" dist="38100" dir="2700000" algn="tl" rotWithShape="0">
-                    <a:prstClr val="black">
-                      <a:alpha val="40000"/>
-                    </a:prstClr>
-                  </a:outerShdw>
-                </a:effectLst>
-                <a:latin typeface="+mn-lt"/>
-              </a:rPr>
-              <a:t>Wcf</a:t>
-            </a:r>
-            <a:endParaRPr lang="it-IT" sz="3600" dirty="0">
-              <a:ln w="10541" cmpd="sng">
-                <a:noFill/>
-                <a:prstDash val="solid"/>
-              </a:ln>
-              <a:solidFill>
-                <a:srgbClr val="FFC000"/>
-              </a:solidFill>
-              <a:effectLst>
-                <a:outerShdw blurRad="50800" dist="38100" dir="2700000" algn="tl" rotWithShape="0">
-                  <a:prstClr val="black">
-                    <a:alpha val="40000"/>
-                  </a:prstClr>
-                </a:outerShdw>
-              </a:effectLst>
-              <a:latin typeface="+mn-lt"/>
-            </a:endParaRPr>
-          </a:p>
-        </p:txBody>
-      </p:sp>
-      <p:pic>
-        <p:nvPicPr>
-          <p:cNvPr id="4" name="Immagine 3"/>
-          <p:cNvPicPr>
-            <a:picLocks noChangeAspect="1"/>
-          </p:cNvPicPr>
-          <p:nvPr/>
-        </p:nvPicPr>
-        <p:blipFill>
-          <a:blip r:embed="rId3"/>
-          <a:stretch>
-            <a:fillRect/>
-          </a:stretch>
-        </p:blipFill>
+              <a:t>Esempio Plugin Workflow V2 Link</a:t>
+            </a:r>
+          </a:p>
+        </p:txBody>
+      </p:sp>
+      <p:sp>
+        <p:nvSpPr>
+          <p:cNvPr id="3" name="Content Placeholder 2"/>
+          <p:cNvSpPr>
+            <a:spLocks noGrp="1"/>
+          </p:cNvSpPr>
+          <p:nvPr>
+            <p:ph idx="1"/>
+          </p:nvPr>
+        </p:nvSpPr>
         <p:spPr>
           <a:xfrm>
-            <a:off x="832331" y="915566"/>
-            <a:ext cx="5251837" cy="3856721"/>
+            <a:off x="323528" y="987575"/>
+            <a:ext cx="6696744" cy="3607048"/>
           </a:xfrm>
-          <a:prstGeom prst="rect">
-            <a:avLst/>
-          </a:prstGeom>
         </p:spPr>
-      </p:pic>
+        <p:txBody>
+          <a:bodyPr>
+            <a:noAutofit/>
+          </a:bodyPr>
+          <a:lstStyle/>
+          <a:p>
+            <a:r>
+              <a:rPr lang="it-IT" sz="2000" b="1" dirty="0"/>
+              <a:t>Lifecycle</a:t>
+            </a:r>
+          </a:p>
+          <a:p>
+            <a:pPr lvl="1"/>
+            <a:r>
+              <a:rPr lang="it-IT" sz="1400" b="1" dirty="0"/>
+              <a:t>Eventi: </a:t>
+            </a:r>
+            <a:r>
+              <a:rPr lang="it-IT" sz="1400" b="1" i="1" dirty="0" err="1">
+                <a:solidFill>
+                  <a:srgbClr val="00B0F0"/>
+                </a:solidFill>
+              </a:rPr>
+              <a:t>OnInitializeAsync</a:t>
+            </a:r>
+            <a:r>
+              <a:rPr lang="it-IT" sz="1400" b="1" dirty="0"/>
+              <a:t>, </a:t>
+            </a:r>
+            <a:r>
+              <a:rPr lang="it-IT" sz="1400" b="1" i="1" dirty="0" err="1">
+                <a:solidFill>
+                  <a:srgbClr val="00B0F0"/>
+                </a:solidFill>
+              </a:rPr>
+              <a:t>OnValidate</a:t>
+            </a:r>
+            <a:r>
+              <a:rPr lang="it-IT" sz="1400" b="1" dirty="0"/>
+              <a:t>, </a:t>
+            </a:r>
+            <a:r>
+              <a:rPr lang="it-IT" sz="1400" b="1" i="1" dirty="0" err="1">
+                <a:solidFill>
+                  <a:srgbClr val="00B0F0"/>
+                </a:solidFill>
+              </a:rPr>
+              <a:t>ExecuteAsync</a:t>
+            </a:r>
+            <a:r>
+              <a:rPr lang="it-IT" sz="1400" b="1" dirty="0"/>
+              <a:t>, </a:t>
+            </a:r>
+            <a:r>
+              <a:rPr lang="it-IT" sz="1400" b="1" i="1" dirty="0" err="1">
+                <a:solidFill>
+                  <a:srgbClr val="00B0F0"/>
+                </a:solidFill>
+              </a:rPr>
+              <a:t>OnDisposing</a:t>
+            </a:r>
+            <a:endParaRPr lang="it-IT" sz="1400" b="1" i="1" dirty="0">
+              <a:solidFill>
+                <a:srgbClr val="00B0F0"/>
+              </a:solidFill>
+            </a:endParaRPr>
+          </a:p>
+          <a:p>
+            <a:pPr lvl="1"/>
+            <a:r>
+              <a:rPr lang="it-IT" sz="1400" b="1" dirty="0"/>
+              <a:t>Configurazione avanzata</a:t>
+            </a:r>
+          </a:p>
+          <a:p>
+            <a:pPr lvl="2"/>
+            <a:r>
+              <a:rPr lang="it-IT" sz="1000" b="1" dirty="0" err="1"/>
+              <a:t>EnableAdvancedConfiguration</a:t>
+            </a:r>
+            <a:endParaRPr lang="it-IT" sz="1000" b="1" dirty="0"/>
+          </a:p>
+          <a:p>
+            <a:pPr lvl="2"/>
+            <a:r>
+              <a:rPr lang="it-IT" sz="1000" b="1" dirty="0" err="1"/>
+              <a:t>ExecuteAdvancedConfigurationAsync</a:t>
+            </a:r>
+            <a:endParaRPr lang="it-IT" sz="1000" b="1" dirty="0"/>
+          </a:p>
+          <a:p>
+            <a:r>
+              <a:rPr lang="it-IT" sz="2000" b="1" dirty="0"/>
+              <a:t>Deployment</a:t>
+            </a:r>
+          </a:p>
+          <a:p>
+            <a:pPr lvl="1"/>
+            <a:r>
+              <a:rPr lang="it-IT" sz="1400" b="1" dirty="0"/>
+              <a:t>Esempio: </a:t>
+            </a:r>
+            <a:r>
+              <a:rPr lang="it-IT" sz="1200" b="1" dirty="0">
+                <a:hlinkClick r:id="rId2"/>
+              </a:rPr>
+              <a:t>https://github.com/Arxivar/SamplePlugins/tree/master/LinkWorkflowV2</a:t>
+            </a:r>
+            <a:endParaRPr lang="it-IT" sz="1200" b="1" dirty="0"/>
+          </a:p>
+          <a:p>
+            <a:pPr lvl="1"/>
+            <a:r>
+              <a:rPr lang="en-US" sz="1200" b="1" dirty="0">
+                <a:latin typeface="ui-monospace"/>
+              </a:rPr>
+              <a:t>Tool per </a:t>
+            </a:r>
+            <a:r>
+              <a:rPr lang="en-US" sz="1200" b="1" dirty="0" err="1">
+                <a:latin typeface="ui-monospace"/>
+              </a:rPr>
+              <a:t>gestire</a:t>
+            </a:r>
+            <a:r>
+              <a:rPr lang="en-US" sz="1200" b="1" dirty="0">
+                <a:latin typeface="ui-monospace"/>
+              </a:rPr>
+              <a:t> </a:t>
+            </a:r>
+            <a:r>
+              <a:rPr lang="en-US" sz="1200" b="1" dirty="0" err="1">
+                <a:latin typeface="ui-monospace"/>
+              </a:rPr>
+              <a:t>l’amministrazione</a:t>
+            </a:r>
+            <a:r>
+              <a:rPr lang="en-US" sz="1200" b="1" dirty="0">
+                <a:latin typeface="ui-monospace"/>
+              </a:rPr>
+              <a:t> </a:t>
+            </a:r>
+            <a:r>
+              <a:rPr lang="en-US" sz="1200" b="1" dirty="0" err="1">
+                <a:latin typeface="ui-monospace"/>
+              </a:rPr>
+              <a:t>dei</a:t>
+            </a:r>
+            <a:r>
+              <a:rPr lang="en-US" sz="1200" b="1" dirty="0">
+                <a:latin typeface="ui-monospace"/>
+              </a:rPr>
+              <a:t> plugin: </a:t>
+            </a:r>
+            <a:r>
+              <a:rPr lang="en-US" sz="1200" b="1" i="0" dirty="0" err="1">
+                <a:solidFill>
+                  <a:srgbClr val="00B0F0"/>
+                </a:solidFill>
+                <a:effectLst/>
+                <a:latin typeface="ui-monospace"/>
+              </a:rPr>
+              <a:t>ARXivarNext</a:t>
+            </a:r>
+            <a:r>
+              <a:rPr lang="en-US" sz="1200" b="1" i="0" dirty="0">
+                <a:solidFill>
+                  <a:srgbClr val="00B0F0"/>
+                </a:solidFill>
+                <a:effectLst/>
+                <a:latin typeface="ui-monospace"/>
+              </a:rPr>
+              <a:t> Workflow Service\wf-plugin.exe </a:t>
+            </a:r>
+            <a:endParaRPr lang="it-IT" sz="1400" b="1" dirty="0">
+              <a:solidFill>
+                <a:srgbClr val="00B0F0"/>
+              </a:solidFill>
+            </a:endParaRPr>
+          </a:p>
+          <a:p>
+            <a:r>
+              <a:rPr lang="it-IT" sz="2000" b="1" dirty="0"/>
+              <a:t>Configurazione</a:t>
+            </a:r>
+          </a:p>
+          <a:p>
+            <a:pPr lvl="1"/>
+            <a:r>
+              <a:rPr lang="it-IT" sz="1400" b="1" dirty="0"/>
+              <a:t>Base </a:t>
+            </a:r>
+          </a:p>
+          <a:p>
+            <a:pPr lvl="1"/>
+            <a:r>
+              <a:rPr lang="it-IT" sz="1400" b="1" dirty="0"/>
+              <a:t>Avanzata</a:t>
+            </a:r>
+          </a:p>
+          <a:p>
+            <a:r>
+              <a:rPr lang="it-IT" sz="2000" b="1" dirty="0"/>
+              <a:t>Debug</a:t>
+            </a:r>
+          </a:p>
+          <a:p>
+            <a:pPr lvl="1"/>
+            <a:endParaRPr lang="it-IT" sz="1400" b="1" dirty="0"/>
+          </a:p>
+          <a:p>
+            <a:pPr marL="457200" lvl="1" indent="0">
+              <a:buNone/>
+            </a:pPr>
+            <a:endParaRPr lang="it-IT" sz="1400" b="1" dirty="0"/>
+          </a:p>
+        </p:txBody>
+      </p:sp>
     </p:spTree>
     <p:extLst>
       <p:ext uri="{BB962C8B-B14F-4D97-AF65-F5344CB8AC3E}">
-        <p14:creationId xmlns:p14="http://schemas.microsoft.com/office/powerpoint/2010/main" val="1630986727"/>
+        <p14:creationId xmlns:p14="http://schemas.microsoft.com/office/powerpoint/2010/main" val="3398027812"/>
       </p:ext>
     </p:extLst>
   </p:cSld>
@@ -5174,7 +5033,7 @@
                 </a:effectLst>
                 <a:latin typeface="+mn-lt"/>
               </a:rPr>
-              <a:t>Esempio flusso eventi plugin server</a:t>
+              <a:t>Esempio flusso eventi Plugin Server</a:t>
             </a:r>
           </a:p>
         </p:txBody>
@@ -5809,1369 +5668,6 @@
     <p:extLst>
       <p:ext uri="{BB962C8B-B14F-4D97-AF65-F5344CB8AC3E}">
         <p14:creationId xmlns:p14="http://schemas.microsoft.com/office/powerpoint/2010/main" val="3522730347"/>
-      </p:ext>
-    </p:extLst>
-  </p:cSld>
-  <p:clrMapOvr>
-    <a:masterClrMapping/>
-  </p:clrMapOvr>
-</p:sld>
-</file>
-
-<file path=ppt/slides/slide6.xml><?xml version="1.0" encoding="utf-8"?>
-<p:sld xmlns:a="http://schemas.openxmlformats.org/drawingml/2006/main" xmlns:r="http://schemas.openxmlformats.org/officeDocument/2006/relationships" xmlns:p="http://schemas.openxmlformats.org/presentationml/2006/main">
-  <p:cSld>
-    <p:spTree>
-      <p:nvGrpSpPr>
-        <p:cNvPr id="1" name=""/>
-        <p:cNvGrpSpPr/>
-        <p:nvPr/>
-      </p:nvGrpSpPr>
-      <p:grpSpPr>
-        <a:xfrm>
-          <a:off x="0" y="0"/>
-          <a:ext cx="0" cy="0"/>
-          <a:chOff x="0" y="0"/>
-          <a:chExt cx="0" cy="0"/>
-        </a:xfrm>
-      </p:grpSpPr>
-      <p:sp>
-        <p:nvSpPr>
-          <p:cNvPr id="2" name="Title 1"/>
-          <p:cNvSpPr>
-            <a:spLocks noGrp="1"/>
-          </p:cNvSpPr>
-          <p:nvPr>
-            <p:ph type="title"/>
-          </p:nvPr>
-        </p:nvSpPr>
-        <p:spPr>
-          <a:xfrm>
-            <a:off x="457200" y="205979"/>
-            <a:ext cx="6563072" cy="709587"/>
-          </a:xfrm>
-        </p:spPr>
-        <p:txBody>
-          <a:bodyPr>
-            <a:normAutofit fontScale="90000"/>
-          </a:bodyPr>
-          <a:lstStyle/>
-          <a:p>
-            <a:r>
-              <a:rPr lang="it-IT" sz="3200" dirty="0">
-                <a:solidFill>
-                  <a:srgbClr val="FFC000"/>
-                </a:solidFill>
-                <a:effectLst>
-                  <a:outerShdw blurRad="38100" dist="38100" dir="2700000" algn="tl">
-                    <a:srgbClr val="000000">
-                      <a:alpha val="43137"/>
-                    </a:srgbClr>
-                  </a:outerShdw>
-                </a:effectLst>
-              </a:rPr>
-              <a:t>Esempio: Logon Provider «</a:t>
-            </a:r>
-            <a:r>
-              <a:rPr lang="it-IT" sz="3200" dirty="0" err="1">
-                <a:solidFill>
-                  <a:srgbClr val="FFC000"/>
-                </a:solidFill>
-                <a:effectLst>
-                  <a:outerShdw blurRad="38100" dist="38100" dir="2700000" algn="tl">
-                    <a:srgbClr val="000000">
-                      <a:alpha val="43137"/>
-                    </a:srgbClr>
-                  </a:outerShdw>
-                </a:effectLst>
-              </a:rPr>
-              <a:t>Credentials</a:t>
-            </a:r>
-            <a:r>
-              <a:rPr lang="it-IT" sz="3200" dirty="0">
-                <a:solidFill>
-                  <a:srgbClr val="FFC000"/>
-                </a:solidFill>
-                <a:effectLst>
-                  <a:outerShdw blurRad="38100" dist="38100" dir="2700000" algn="tl">
-                    <a:srgbClr val="000000">
-                      <a:alpha val="43137"/>
-                    </a:srgbClr>
-                  </a:outerShdw>
-                </a:effectLst>
-              </a:rPr>
-              <a:t>»</a:t>
-            </a:r>
-          </a:p>
-        </p:txBody>
-      </p:sp>
-      <p:sp>
-        <p:nvSpPr>
-          <p:cNvPr id="3" name="Content Placeholder 2"/>
-          <p:cNvSpPr>
-            <a:spLocks noGrp="1"/>
-          </p:cNvSpPr>
-          <p:nvPr>
-            <p:ph idx="1"/>
-          </p:nvPr>
-        </p:nvSpPr>
-        <p:spPr>
-          <a:xfrm>
-            <a:off x="323528" y="987575"/>
-            <a:ext cx="6696744" cy="3607048"/>
-          </a:xfrm>
-        </p:spPr>
-        <p:txBody>
-          <a:bodyPr>
-            <a:noAutofit/>
-          </a:bodyPr>
-          <a:lstStyle/>
-          <a:p>
-            <a:pPr marL="457200" lvl="1" indent="0">
-              <a:buNone/>
-            </a:pPr>
-            <a:r>
-              <a:rPr lang="it-IT" sz="1400" b="1" dirty="0"/>
-              <a:t>Le credenziali fornite (username, password) vengono verificate da un Identity Server </a:t>
-            </a:r>
-            <a:r>
-              <a:rPr lang="it-IT" sz="900" b="1" dirty="0"/>
-              <a:t>(</a:t>
-            </a:r>
-            <a:r>
-              <a:rPr lang="it-IT" sz="900" b="1" dirty="0">
-                <a:hlinkClick r:id="rId2"/>
-              </a:rPr>
-              <a:t>https://github.com/identityserver/IdentityServer4</a:t>
-            </a:r>
-            <a:r>
-              <a:rPr lang="it-IT" sz="900" b="1" dirty="0"/>
-              <a:t>)</a:t>
-            </a:r>
-            <a:endParaRPr lang="it-IT" sz="1100" b="1" dirty="0"/>
-          </a:p>
-          <a:p>
-            <a:pPr marL="457200" lvl="1" indent="0">
-              <a:buNone/>
-            </a:pPr>
-            <a:r>
-              <a:rPr lang="it-IT" sz="1400" b="1" dirty="0"/>
-              <a:t>Flusso OAUTH2: </a:t>
-            </a:r>
-            <a:r>
-              <a:rPr lang="en-US" sz="1400" b="1" dirty="0"/>
-              <a:t>Resource Owner Password Credentials Grant</a:t>
-            </a:r>
-          </a:p>
-          <a:p>
-            <a:pPr lvl="1"/>
-            <a:r>
-              <a:rPr lang="it-IT" sz="900" b="1" dirty="0">
-                <a:hlinkClick r:id="rId3"/>
-              </a:rPr>
-              <a:t>https://datatracker.ietf.org/doc/html/rfc6749#section-4.3</a:t>
-            </a:r>
-            <a:endParaRPr lang="it-IT" sz="900" b="1" dirty="0"/>
-          </a:p>
-          <a:p>
-            <a:pPr lvl="1"/>
-            <a:r>
-              <a:rPr lang="it-IT" sz="900" b="1" dirty="0">
-                <a:hlinkClick r:id="rId4"/>
-              </a:rPr>
-              <a:t>http://www.bubblecode.net/en/2016/01/22/understanding-oauth2/#Resource_Owner_Password_Credentials_Grant</a:t>
-            </a:r>
-            <a:endParaRPr lang="it-IT" sz="900" b="1" dirty="0"/>
-          </a:p>
-          <a:p>
-            <a:pPr marL="457200" lvl="1" indent="0">
-              <a:buNone/>
-            </a:pPr>
-            <a:endParaRPr lang="it-IT" sz="1400" b="1" dirty="0"/>
-          </a:p>
-          <a:p>
-            <a:pPr marL="457200" lvl="1" indent="0">
-              <a:buNone/>
-            </a:pPr>
-            <a:endParaRPr lang="it-IT" sz="800" b="1" dirty="0"/>
-          </a:p>
-          <a:p>
-            <a:endParaRPr lang="it-IT" sz="1100" b="1" dirty="0"/>
-          </a:p>
-          <a:p>
-            <a:pPr marL="457200" lvl="1" indent="0">
-              <a:buNone/>
-            </a:pPr>
-            <a:endParaRPr lang="it-IT" sz="800" b="1" dirty="0"/>
-          </a:p>
-          <a:p>
-            <a:endParaRPr lang="it-IT" sz="1100" b="1" dirty="0"/>
-          </a:p>
-        </p:txBody>
-      </p:sp>
-      <p:pic>
-        <p:nvPicPr>
-          <p:cNvPr id="1032" name="Picture 8" descr="OAuth - Wikipedia">
-            <a:extLst>
-              <a:ext uri="{FF2B5EF4-FFF2-40B4-BE49-F238E27FC236}">
-                <a16:creationId xmlns:a16="http://schemas.microsoft.com/office/drawing/2014/main" id="{188DB98C-A08E-4E09-B36E-AD22862D4886}"/>
-              </a:ext>
-            </a:extLst>
-          </p:cNvPr>
-          <p:cNvPicPr>
-            <a:picLocks noChangeAspect="1" noChangeArrowheads="1"/>
-          </p:cNvPicPr>
-          <p:nvPr/>
-        </p:nvPicPr>
-        <p:blipFill>
-          <a:blip r:embed="rId5" cstate="print">
-            <a:extLst>
-              <a:ext uri="{28A0092B-C50C-407E-A947-70E740481C1C}">
-                <a14:useLocalDpi xmlns:a14="http://schemas.microsoft.com/office/drawing/2010/main" val="0"/>
-              </a:ext>
-            </a:extLst>
-          </a:blip>
-          <a:srcRect/>
-          <a:stretch>
-            <a:fillRect/>
-          </a:stretch>
-        </p:blipFill>
-        <p:spPr bwMode="auto">
-          <a:xfrm>
-            <a:off x="539552" y="1851670"/>
-            <a:ext cx="230426" cy="230426"/>
-          </a:xfrm>
-          <a:prstGeom prst="rect">
-            <a:avLst/>
-          </a:prstGeom>
-          <a:noFill/>
-          <a:extLst>
-            <a:ext uri="{909E8E84-426E-40DD-AFC4-6F175D3DCCD1}">
-              <a14:hiddenFill xmlns:a14="http://schemas.microsoft.com/office/drawing/2010/main">
-                <a:solidFill>
-                  <a:srgbClr val="FFFFFF"/>
-                </a:solidFill>
-              </a14:hiddenFill>
-            </a:ext>
-          </a:extLst>
-        </p:spPr>
-      </p:pic>
-      <p:pic>
-        <p:nvPicPr>
-          <p:cNvPr id="2052" name="Picture 4" descr="Resource Owner Password Credentials Grant Flow">
-            <a:extLst>
-              <a:ext uri="{FF2B5EF4-FFF2-40B4-BE49-F238E27FC236}">
-                <a16:creationId xmlns:a16="http://schemas.microsoft.com/office/drawing/2014/main" id="{D6531B25-01FA-44C8-A616-2C2B4037D2BC}"/>
-              </a:ext>
-            </a:extLst>
-          </p:cNvPr>
-          <p:cNvPicPr>
-            <a:picLocks noChangeAspect="1" noChangeArrowheads="1"/>
-          </p:cNvPicPr>
-          <p:nvPr/>
-        </p:nvPicPr>
-        <p:blipFill>
-          <a:blip r:embed="rId6">
-            <a:extLst>
-              <a:ext uri="{28A0092B-C50C-407E-A947-70E740481C1C}">
-                <a14:useLocalDpi xmlns:a14="http://schemas.microsoft.com/office/drawing/2010/main" val="0"/>
-              </a:ext>
-            </a:extLst>
-          </a:blip>
-          <a:srcRect/>
-          <a:stretch>
-            <a:fillRect/>
-          </a:stretch>
-        </p:blipFill>
-        <p:spPr bwMode="auto">
-          <a:xfrm>
-            <a:off x="1021546" y="2082096"/>
-            <a:ext cx="4846598" cy="2654738"/>
-          </a:xfrm>
-          <a:prstGeom prst="rect">
-            <a:avLst/>
-          </a:prstGeom>
-          <a:noFill/>
-          <a:extLst>
-            <a:ext uri="{909E8E84-426E-40DD-AFC4-6F175D3DCCD1}">
-              <a14:hiddenFill xmlns:a14="http://schemas.microsoft.com/office/drawing/2010/main">
-                <a:solidFill>
-                  <a:srgbClr val="FFFFFF"/>
-                </a:solidFill>
-              </a14:hiddenFill>
-            </a:ext>
-          </a:extLst>
-        </p:spPr>
-      </p:pic>
-    </p:spTree>
-    <p:extLst>
-      <p:ext uri="{BB962C8B-B14F-4D97-AF65-F5344CB8AC3E}">
-        <p14:creationId xmlns:p14="http://schemas.microsoft.com/office/powerpoint/2010/main" val="1994167255"/>
-      </p:ext>
-    </p:extLst>
-  </p:cSld>
-  <p:clrMapOvr>
-    <a:masterClrMapping/>
-  </p:clrMapOvr>
-</p:sld>
-</file>
-
-<file path=ppt/slides/slide7.xml><?xml version="1.0" encoding="utf-8"?>
-<p:sld xmlns:a="http://schemas.openxmlformats.org/drawingml/2006/main" xmlns:r="http://schemas.openxmlformats.org/officeDocument/2006/relationships" xmlns:p="http://schemas.openxmlformats.org/presentationml/2006/main">
-  <p:cSld>
-    <p:spTree>
-      <p:nvGrpSpPr>
-        <p:cNvPr id="1" name=""/>
-        <p:cNvGrpSpPr/>
-        <p:nvPr/>
-      </p:nvGrpSpPr>
-      <p:grpSpPr>
-        <a:xfrm>
-          <a:off x="0" y="0"/>
-          <a:ext cx="0" cy="0"/>
-          <a:chOff x="0" y="0"/>
-          <a:chExt cx="0" cy="0"/>
-        </a:xfrm>
-      </p:grpSpPr>
-      <p:sp>
-        <p:nvSpPr>
-          <p:cNvPr id="2" name="Title 1"/>
-          <p:cNvSpPr>
-            <a:spLocks noGrp="1"/>
-          </p:cNvSpPr>
-          <p:nvPr>
-            <p:ph type="title"/>
-          </p:nvPr>
-        </p:nvSpPr>
-        <p:spPr>
-          <a:xfrm>
-            <a:off x="457200" y="205979"/>
-            <a:ext cx="6563072" cy="709587"/>
-          </a:xfrm>
-        </p:spPr>
-        <p:txBody>
-          <a:bodyPr>
-            <a:normAutofit fontScale="90000"/>
-          </a:bodyPr>
-          <a:lstStyle/>
-          <a:p>
-            <a:r>
-              <a:rPr lang="it-IT" sz="3200" dirty="0">
-                <a:solidFill>
-                  <a:srgbClr val="FFC000"/>
-                </a:solidFill>
-                <a:effectLst>
-                  <a:outerShdw blurRad="38100" dist="38100" dir="2700000" algn="tl">
-                    <a:srgbClr val="000000">
-                      <a:alpha val="43137"/>
-                    </a:srgbClr>
-                  </a:outerShdw>
-                </a:effectLst>
-              </a:rPr>
-              <a:t>Esempio: Logon Provider Single </a:t>
-            </a:r>
-            <a:r>
-              <a:rPr lang="it-IT" sz="3200" dirty="0" err="1">
-                <a:solidFill>
-                  <a:srgbClr val="FFC000"/>
-                </a:solidFill>
-                <a:effectLst>
-                  <a:outerShdw blurRad="38100" dist="38100" dir="2700000" algn="tl">
-                    <a:srgbClr val="000000">
-                      <a:alpha val="43137"/>
-                    </a:srgbClr>
-                  </a:outerShdw>
-                </a:effectLst>
-              </a:rPr>
-              <a:t>Sign</a:t>
-            </a:r>
-            <a:r>
-              <a:rPr lang="it-IT" sz="3200" dirty="0">
-                <a:solidFill>
-                  <a:srgbClr val="FFC000"/>
-                </a:solidFill>
-                <a:effectLst>
-                  <a:outerShdw blurRad="38100" dist="38100" dir="2700000" algn="tl">
-                    <a:srgbClr val="000000">
-                      <a:alpha val="43137"/>
-                    </a:srgbClr>
-                  </a:outerShdw>
-                </a:effectLst>
-              </a:rPr>
-              <a:t>-On</a:t>
-            </a:r>
-          </a:p>
-        </p:txBody>
-      </p:sp>
-      <p:sp>
-        <p:nvSpPr>
-          <p:cNvPr id="3" name="Content Placeholder 2"/>
-          <p:cNvSpPr>
-            <a:spLocks noGrp="1"/>
-          </p:cNvSpPr>
-          <p:nvPr>
-            <p:ph idx="1"/>
-          </p:nvPr>
-        </p:nvSpPr>
-        <p:spPr>
-          <a:xfrm>
-            <a:off x="323528" y="931492"/>
-            <a:ext cx="6696744" cy="3872506"/>
-          </a:xfrm>
-        </p:spPr>
-        <p:txBody>
-          <a:bodyPr>
-            <a:noAutofit/>
-          </a:bodyPr>
-          <a:lstStyle/>
-          <a:p>
-            <a:r>
-              <a:rPr lang="it-IT" sz="1400" b="1" dirty="0"/>
-              <a:t>Autenticazione è demandata a Identity Server.</a:t>
-            </a:r>
-            <a:br>
-              <a:rPr lang="it-IT" sz="1400" b="1" dirty="0"/>
-            </a:br>
-            <a:r>
-              <a:rPr lang="it-IT" sz="1400" b="1" dirty="0"/>
-              <a:t>L’utente acconsente al rilascio di alcune autorizzazioni per l’applicazione a cui si sta loggando (</a:t>
-            </a:r>
-            <a:r>
-              <a:rPr lang="it-IT" sz="1400" b="1" dirty="0" err="1"/>
-              <a:t>ClientId</a:t>
-            </a:r>
-            <a:r>
-              <a:rPr lang="it-IT" sz="1400" b="1" dirty="0"/>
-              <a:t>: </a:t>
-            </a:r>
-            <a:r>
-              <a:rPr lang="it-IT" sz="1400" b="1" dirty="0" err="1">
-                <a:solidFill>
-                  <a:schemeClr val="accent1"/>
-                </a:solidFill>
-              </a:rPr>
-              <a:t>ARX</a:t>
-            </a:r>
-            <a:r>
-              <a:rPr lang="it-IT" sz="1400" b="1" dirty="0" err="1"/>
-              <a:t>ivar</a:t>
-            </a:r>
-            <a:r>
-              <a:rPr lang="it-IT" sz="1400" b="1" dirty="0"/>
-              <a:t>)</a:t>
-            </a:r>
-          </a:p>
-          <a:p>
-            <a:pPr marL="457200" lvl="1" indent="0">
-              <a:buNone/>
-            </a:pPr>
-            <a:endParaRPr lang="it-IT" sz="1400" b="1" dirty="0"/>
-          </a:p>
-          <a:p>
-            <a:r>
-              <a:rPr lang="it-IT" sz="1400" b="1" dirty="0"/>
-              <a:t>Il flusso autorizzativo continua redirigendo l’utente verso il servizio Authentication di </a:t>
-            </a:r>
-            <a:r>
-              <a:rPr lang="it-IT" sz="1400" b="1" dirty="0" err="1">
-                <a:solidFill>
-                  <a:schemeClr val="accent1"/>
-                </a:solidFill>
-              </a:rPr>
-              <a:t>ARX</a:t>
-            </a:r>
-            <a:r>
-              <a:rPr lang="it-IT" sz="1400" b="1" dirty="0" err="1"/>
-              <a:t>ivar</a:t>
-            </a:r>
-            <a:r>
-              <a:rPr lang="it-IT" sz="1400" b="1" dirty="0"/>
-              <a:t> con </a:t>
-            </a:r>
-            <a:r>
-              <a:rPr lang="it-IT" sz="1400" b="1" i="1" dirty="0">
-                <a:solidFill>
-                  <a:schemeClr val="bg1">
-                    <a:lumMod val="50000"/>
-                  </a:schemeClr>
-                </a:solidFill>
-              </a:rPr>
-              <a:t>code + </a:t>
-            </a:r>
-            <a:r>
-              <a:rPr lang="it-IT" sz="1400" b="1" i="1" dirty="0" err="1">
-                <a:solidFill>
-                  <a:schemeClr val="bg1">
-                    <a:lumMod val="50000"/>
-                  </a:schemeClr>
-                </a:solidFill>
-              </a:rPr>
-              <a:t>token_id</a:t>
-            </a:r>
-            <a:r>
-              <a:rPr lang="it-IT" sz="1600" b="1" i="1" dirty="0">
-                <a:solidFill>
-                  <a:schemeClr val="bg1">
-                    <a:lumMod val="50000"/>
-                  </a:schemeClr>
-                </a:solidFill>
-              </a:rPr>
-              <a:t> </a:t>
-            </a:r>
-            <a:r>
-              <a:rPr lang="it-IT" sz="900" b="1" i="1" dirty="0"/>
-              <a:t>(</a:t>
-            </a:r>
-            <a:r>
-              <a:rPr lang="it-IT" sz="900" b="1" i="1" dirty="0">
-                <a:solidFill>
-                  <a:schemeClr val="bg1">
-                    <a:lumMod val="50000"/>
-                  </a:schemeClr>
-                </a:solidFill>
-                <a:hlinkClick r:id="rId2"/>
-              </a:rPr>
-              <a:t>https://openid.net/specs/openid-connect-core-1_0.html#code-id_tokenExample</a:t>
-            </a:r>
-            <a:r>
-              <a:rPr lang="it-IT" sz="900" b="1" i="1" dirty="0">
-                <a:solidFill>
-                  <a:schemeClr val="bg1">
-                    <a:lumMod val="50000"/>
-                  </a:schemeClr>
-                </a:solidFill>
-              </a:rPr>
-              <a:t>, </a:t>
-            </a:r>
-            <a:r>
-              <a:rPr lang="it-IT" sz="900" b="1" i="1" dirty="0">
-                <a:solidFill>
-                  <a:schemeClr val="bg1">
-                    <a:lumMod val="50000"/>
-                  </a:schemeClr>
-                </a:solidFill>
-                <a:hlinkClick r:id="rId3"/>
-              </a:rPr>
-              <a:t>http://www.bubblecode.net/en/2016/01/22/understanding-oauth2/#Authorization_Code_Grant</a:t>
-            </a:r>
-            <a:r>
-              <a:rPr lang="it-IT" sz="900" b="1" i="1" dirty="0"/>
-              <a:t>)</a:t>
-            </a:r>
-          </a:p>
-          <a:p>
-            <a:pPr marL="457200" lvl="1" indent="0">
-              <a:buNone/>
-            </a:pPr>
-            <a:endParaRPr lang="it-IT" sz="700" b="1" dirty="0"/>
-          </a:p>
-          <a:p>
-            <a:pPr lvl="1"/>
-            <a:r>
-              <a:rPr lang="it-IT" sz="1200" b="1" dirty="0"/>
-              <a:t>Il code è un «buono» che può essere utilizzato per richiedere un </a:t>
-            </a:r>
-            <a:r>
-              <a:rPr lang="it-IT" sz="1200" b="1" dirty="0" err="1"/>
-              <a:t>bearer</a:t>
-            </a:r>
-            <a:r>
-              <a:rPr lang="it-IT" sz="1200" b="1" dirty="0"/>
-              <a:t> token che contiene le autorizzazioni approvate dall’utente </a:t>
-            </a:r>
-            <a:r>
-              <a:rPr lang="it-IT" sz="1000" b="1" dirty="0"/>
-              <a:t>(</a:t>
-            </a:r>
-            <a:r>
-              <a:rPr lang="it-IT" sz="1000" b="1" dirty="0">
-                <a:hlinkClick r:id="rId4"/>
-              </a:rPr>
-              <a:t>https://www.oauth.com/oauth2-servers/access-tokens/authorization-code-request/</a:t>
-            </a:r>
-            <a:r>
-              <a:rPr lang="it-IT" sz="1000" b="1" dirty="0"/>
-              <a:t>)</a:t>
-            </a:r>
-            <a:endParaRPr lang="it-IT" sz="1200" b="1" dirty="0"/>
-          </a:p>
-          <a:p>
-            <a:pPr lvl="1"/>
-            <a:r>
-              <a:rPr lang="it-IT" sz="1200" b="1" dirty="0"/>
-              <a:t>Il </a:t>
-            </a:r>
-            <a:r>
-              <a:rPr lang="it-IT" sz="1200" b="1" dirty="0" err="1"/>
-              <a:t>token_id</a:t>
-            </a:r>
-            <a:r>
-              <a:rPr lang="it-IT" sz="1200" b="1" dirty="0"/>
-              <a:t> è un token JWT che contiene l’identità dell’utente </a:t>
-            </a:r>
-            <a:r>
-              <a:rPr lang="it-IT" sz="900" b="1" dirty="0"/>
-              <a:t>(</a:t>
-            </a:r>
-            <a:r>
-              <a:rPr lang="it-IT" sz="900" b="1" dirty="0">
-                <a:hlinkClick r:id="rId5"/>
-              </a:rPr>
-              <a:t>https://en.wikipedia.org/wiki/JSON_Web_Token</a:t>
-            </a:r>
-            <a:r>
-              <a:rPr lang="it-IT" sz="900" b="1" dirty="0"/>
-              <a:t>, </a:t>
-            </a:r>
-            <a:r>
-              <a:rPr lang="it-IT" sz="900" b="1" dirty="0">
-                <a:hlinkClick r:id="rId6"/>
-              </a:rPr>
-              <a:t>https://jwt.io/</a:t>
-            </a:r>
-            <a:r>
-              <a:rPr lang="it-IT" sz="900" b="1" dirty="0"/>
-              <a:t>)</a:t>
-            </a:r>
-            <a:endParaRPr lang="it-IT" sz="1200" b="1" dirty="0"/>
-          </a:p>
-          <a:p>
-            <a:pPr marL="457200" lvl="1" indent="0">
-              <a:buNone/>
-            </a:pPr>
-            <a:endParaRPr lang="it-IT" sz="700" b="1" dirty="0"/>
-          </a:p>
-          <a:p>
-            <a:pPr indent="-285750"/>
-            <a:r>
-              <a:rPr lang="it-IT" sz="1400" b="1" dirty="0"/>
-              <a:t>Sulla base di </a:t>
-            </a:r>
-            <a:r>
-              <a:rPr lang="it-IT" sz="1400" b="1" dirty="0">
-                <a:solidFill>
-                  <a:schemeClr val="bg1">
-                    <a:lumMod val="50000"/>
-                  </a:schemeClr>
-                </a:solidFill>
-              </a:rPr>
-              <a:t>code + </a:t>
-            </a:r>
-            <a:r>
-              <a:rPr lang="it-IT" sz="1400" b="1" dirty="0" err="1">
-                <a:solidFill>
-                  <a:schemeClr val="bg1">
-                    <a:lumMod val="50000"/>
-                  </a:schemeClr>
-                </a:solidFill>
-              </a:rPr>
-              <a:t>token_id</a:t>
-            </a:r>
-            <a:r>
-              <a:rPr lang="it-IT" sz="1400" b="1" dirty="0"/>
-              <a:t> il logon provider determina l’utente che deve essere autorizzato.</a:t>
-            </a:r>
-          </a:p>
-          <a:p>
-            <a:pPr indent="-285750"/>
-            <a:r>
-              <a:rPr lang="it-IT" sz="1400" b="1" dirty="0"/>
-              <a:t>Il processo di autorizzazione termina sul Web Portal con il </a:t>
-            </a:r>
-            <a:r>
-              <a:rPr lang="it-IT" sz="1400" b="1" dirty="0" err="1"/>
-              <a:t>bearer</a:t>
-            </a:r>
-            <a:r>
-              <a:rPr lang="it-IT" sz="1400" b="1" dirty="0"/>
-              <a:t> token di </a:t>
-            </a:r>
-            <a:r>
-              <a:rPr lang="it-IT" sz="1400" b="1" dirty="0" err="1">
-                <a:solidFill>
-                  <a:schemeClr val="accent1"/>
-                </a:solidFill>
-              </a:rPr>
-              <a:t>ARX</a:t>
-            </a:r>
-            <a:r>
-              <a:rPr lang="it-IT" sz="1400" b="1" dirty="0" err="1"/>
-              <a:t>ivar</a:t>
-            </a:r>
-            <a:r>
-              <a:rPr lang="it-IT" sz="1400" b="1" dirty="0"/>
-              <a:t>.</a:t>
-            </a:r>
-          </a:p>
-        </p:txBody>
-      </p:sp>
-      <p:pic>
-        <p:nvPicPr>
-          <p:cNvPr id="7" name="Picture 6" descr="Back Home">
-            <a:extLst>
-              <a:ext uri="{FF2B5EF4-FFF2-40B4-BE49-F238E27FC236}">
-                <a16:creationId xmlns:a16="http://schemas.microsoft.com/office/drawing/2014/main" id="{28C957C0-DF06-4D20-A7EF-4DF7D8C4F7DF}"/>
-              </a:ext>
-            </a:extLst>
-          </p:cNvPr>
-          <p:cNvPicPr>
-            <a:picLocks noChangeAspect="1" noChangeArrowheads="1"/>
-          </p:cNvPicPr>
-          <p:nvPr/>
-        </p:nvPicPr>
-        <p:blipFill>
-          <a:blip r:embed="rId7" cstate="print">
-            <a:extLst>
-              <a:ext uri="{28A0092B-C50C-407E-A947-70E740481C1C}">
-                <a14:useLocalDpi xmlns:a14="http://schemas.microsoft.com/office/drawing/2010/main" val="0"/>
-              </a:ext>
-            </a:extLst>
-          </a:blip>
-          <a:srcRect/>
-          <a:stretch>
-            <a:fillRect/>
-          </a:stretch>
-        </p:blipFill>
-        <p:spPr bwMode="auto">
-          <a:xfrm>
-            <a:off x="683568" y="1707654"/>
-            <a:ext cx="576064" cy="230426"/>
-          </a:xfrm>
-          <a:prstGeom prst="rect">
-            <a:avLst/>
-          </a:prstGeom>
-          <a:noFill/>
-          <a:extLst>
-            <a:ext uri="{909E8E84-426E-40DD-AFC4-6F175D3DCCD1}">
-              <a14:hiddenFill xmlns:a14="http://schemas.microsoft.com/office/drawing/2010/main">
-                <a:solidFill>
-                  <a:srgbClr val="FFFFFF"/>
-                </a:solidFill>
-              </a14:hiddenFill>
-            </a:ext>
-          </a:extLst>
-        </p:spPr>
-      </p:pic>
-    </p:spTree>
-    <p:extLst>
-      <p:ext uri="{BB962C8B-B14F-4D97-AF65-F5344CB8AC3E}">
-        <p14:creationId xmlns:p14="http://schemas.microsoft.com/office/powerpoint/2010/main" val="3830133614"/>
-      </p:ext>
-    </p:extLst>
-  </p:cSld>
-  <p:clrMapOvr>
-    <a:masterClrMapping/>
-  </p:clrMapOvr>
-</p:sld>
-</file>
-
-<file path=ppt/slides/slide8.xml><?xml version="1.0" encoding="utf-8"?>
-<p:sld xmlns:a="http://schemas.openxmlformats.org/drawingml/2006/main" xmlns:r="http://schemas.openxmlformats.org/officeDocument/2006/relationships" xmlns:p="http://schemas.openxmlformats.org/presentationml/2006/main">
-  <p:cSld>
-    <p:spTree>
-      <p:nvGrpSpPr>
-        <p:cNvPr id="1" name=""/>
-        <p:cNvGrpSpPr/>
-        <p:nvPr/>
-      </p:nvGrpSpPr>
-      <p:grpSpPr>
-        <a:xfrm>
-          <a:off x="0" y="0"/>
-          <a:ext cx="0" cy="0"/>
-          <a:chOff x="0" y="0"/>
-          <a:chExt cx="0" cy="0"/>
-        </a:xfrm>
-      </p:grpSpPr>
-      <p:sp>
-        <p:nvSpPr>
-          <p:cNvPr id="2" name="Title 1"/>
-          <p:cNvSpPr>
-            <a:spLocks noGrp="1"/>
-          </p:cNvSpPr>
-          <p:nvPr>
-            <p:ph type="title"/>
-          </p:nvPr>
-        </p:nvSpPr>
-        <p:spPr>
-          <a:xfrm>
-            <a:off x="457200" y="205979"/>
-            <a:ext cx="6563072" cy="709587"/>
-          </a:xfrm>
-        </p:spPr>
-        <p:txBody>
-          <a:bodyPr>
-            <a:normAutofit/>
-          </a:bodyPr>
-          <a:lstStyle/>
-          <a:p>
-            <a:r>
-              <a:rPr lang="it-IT" sz="3200" dirty="0" err="1">
-                <a:solidFill>
-                  <a:srgbClr val="FFC000"/>
-                </a:solidFill>
-                <a:effectLst>
-                  <a:outerShdw blurRad="38100" dist="38100" dir="2700000" algn="tl">
-                    <a:srgbClr val="000000">
-                      <a:alpha val="43137"/>
-                    </a:srgbClr>
-                  </a:outerShdw>
-                </a:effectLst>
-              </a:rPr>
-              <a:t>Tip</a:t>
-            </a:r>
-            <a:r>
-              <a:rPr lang="it-IT" sz="3200" dirty="0">
-                <a:solidFill>
-                  <a:srgbClr val="FFC000"/>
-                </a:solidFill>
-                <a:effectLst>
-                  <a:outerShdw blurRad="38100" dist="38100" dir="2700000" algn="tl">
-                    <a:srgbClr val="000000">
-                      <a:alpha val="43137"/>
-                    </a:srgbClr>
-                  </a:outerShdw>
-                </a:effectLst>
-              </a:rPr>
-              <a:t> &amp; </a:t>
-            </a:r>
-            <a:r>
-              <a:rPr lang="it-IT" sz="3200" dirty="0" err="1">
-                <a:solidFill>
-                  <a:srgbClr val="FFC000"/>
-                </a:solidFill>
-                <a:effectLst>
-                  <a:outerShdw blurRad="38100" dist="38100" dir="2700000" algn="tl">
-                    <a:srgbClr val="000000">
-                      <a:alpha val="43137"/>
-                    </a:srgbClr>
-                  </a:outerShdw>
-                </a:effectLst>
-              </a:rPr>
-              <a:t>Tricks</a:t>
-            </a:r>
-            <a:endParaRPr lang="it-IT" sz="3200" dirty="0">
-              <a:solidFill>
-                <a:srgbClr val="FFC000"/>
-              </a:solidFill>
-              <a:effectLst>
-                <a:outerShdw blurRad="38100" dist="38100" dir="2700000" algn="tl">
-                  <a:srgbClr val="000000">
-                    <a:alpha val="43137"/>
-                  </a:srgbClr>
-                </a:outerShdw>
-              </a:effectLst>
-            </a:endParaRPr>
-          </a:p>
-        </p:txBody>
-      </p:sp>
-      <p:sp>
-        <p:nvSpPr>
-          <p:cNvPr id="3" name="Content Placeholder 2"/>
-          <p:cNvSpPr>
-            <a:spLocks noGrp="1"/>
-          </p:cNvSpPr>
-          <p:nvPr>
-            <p:ph idx="1"/>
-          </p:nvPr>
-        </p:nvSpPr>
-        <p:spPr>
-          <a:xfrm>
-            <a:off x="323528" y="931492"/>
-            <a:ext cx="6696744" cy="3607048"/>
-          </a:xfrm>
-        </p:spPr>
-        <p:txBody>
-          <a:bodyPr>
-            <a:noAutofit/>
-          </a:bodyPr>
-          <a:lstStyle/>
-          <a:p>
-            <a:r>
-              <a:rPr lang="it-IT" sz="1400" b="1" dirty="0"/>
-              <a:t>I logon provider di tipo </a:t>
-            </a:r>
-            <a:r>
-              <a:rPr lang="it-IT" sz="1400" b="1" dirty="0">
-                <a:solidFill>
-                  <a:schemeClr val="tx1">
-                    <a:lumMod val="50000"/>
-                    <a:lumOff val="50000"/>
-                  </a:schemeClr>
-                </a:solidFill>
-              </a:rPr>
-              <a:t>S</a:t>
-            </a:r>
-            <a:r>
-              <a:rPr lang="it-IT" sz="1400" b="1" dirty="0"/>
-              <a:t>ingle </a:t>
-            </a:r>
-            <a:r>
-              <a:rPr lang="it-IT" sz="1400" b="1" dirty="0" err="1">
-                <a:solidFill>
-                  <a:schemeClr val="tx1">
-                    <a:lumMod val="50000"/>
-                    <a:lumOff val="50000"/>
-                  </a:schemeClr>
-                </a:solidFill>
-              </a:rPr>
-              <a:t>S</a:t>
-            </a:r>
-            <a:r>
-              <a:rPr lang="it-IT" sz="1400" b="1" dirty="0" err="1"/>
-              <a:t>ign</a:t>
-            </a:r>
-            <a:r>
-              <a:rPr lang="it-IT" sz="1400" b="1" dirty="0"/>
-              <a:t>-</a:t>
-            </a:r>
-            <a:r>
-              <a:rPr lang="it-IT" sz="1400" b="1" dirty="0">
-                <a:solidFill>
-                  <a:schemeClr val="tx1">
-                    <a:lumMod val="50000"/>
-                    <a:lumOff val="50000"/>
-                  </a:schemeClr>
-                </a:solidFill>
-              </a:rPr>
-              <a:t>O</a:t>
-            </a:r>
-            <a:r>
-              <a:rPr lang="it-IT" sz="1400" b="1" dirty="0"/>
-              <a:t>n richiedono che tutto il flusso delle chiamate Web sia in </a:t>
-            </a:r>
-            <a:r>
-              <a:rPr lang="it-IT" sz="1400" b="1" i="1" dirty="0">
-                <a:solidFill>
-                  <a:schemeClr val="tx1">
-                    <a:lumMod val="50000"/>
-                    <a:lumOff val="50000"/>
-                  </a:schemeClr>
-                </a:solidFill>
-              </a:rPr>
-              <a:t>HTTPS</a:t>
-            </a:r>
-            <a:r>
-              <a:rPr lang="it-IT" sz="1400" b="1" dirty="0"/>
-              <a:t>. Gli attori web di </a:t>
-            </a:r>
-            <a:r>
-              <a:rPr lang="it-IT" sz="1400" b="1" dirty="0" err="1">
-                <a:solidFill>
-                  <a:srgbClr val="F18D2C"/>
-                </a:solidFill>
-              </a:rPr>
-              <a:t>ARX</a:t>
-            </a:r>
-            <a:r>
-              <a:rPr lang="it-IT" sz="1400" b="1" dirty="0" err="1"/>
-              <a:t>ivar</a:t>
-            </a:r>
-            <a:r>
-              <a:rPr lang="it-IT" sz="1400" b="1" dirty="0"/>
-              <a:t>: </a:t>
-            </a:r>
-            <a:r>
-              <a:rPr lang="it-IT" sz="1400" b="1" dirty="0" err="1"/>
-              <a:t>WebPortal</a:t>
-            </a:r>
-            <a:r>
-              <a:rPr lang="it-IT" sz="1400" b="1" dirty="0"/>
-              <a:t>, </a:t>
-            </a:r>
-            <a:r>
-              <a:rPr lang="it-IT" sz="1400" b="1" dirty="0" err="1"/>
-              <a:t>WebApi</a:t>
-            </a:r>
-            <a:r>
-              <a:rPr lang="it-IT" sz="1400" b="1" dirty="0"/>
-              <a:t>, Authentication devono avere i riferimenti in </a:t>
-            </a:r>
-            <a:r>
-              <a:rPr lang="it-IT" sz="1400" b="1" i="1" dirty="0">
-                <a:solidFill>
-                  <a:schemeClr val="tx1">
-                    <a:lumMod val="50000"/>
-                    <a:lumOff val="50000"/>
-                  </a:schemeClr>
-                </a:solidFill>
-              </a:rPr>
-              <a:t>HTTPS</a:t>
-            </a:r>
-            <a:r>
-              <a:rPr lang="it-IT" sz="1400" b="1" dirty="0"/>
-              <a:t>.</a:t>
-            </a:r>
-          </a:p>
-          <a:p>
-            <a:pPr marL="400050" lvl="1" indent="0">
-              <a:buNone/>
-            </a:pPr>
-            <a:endParaRPr lang="it-IT" sz="600" b="1" dirty="0"/>
-          </a:p>
-          <a:p>
-            <a:pPr marL="400050" lvl="1" indent="0">
-              <a:buNone/>
-            </a:pPr>
-            <a:r>
-              <a:rPr lang="it-IT" sz="1100" b="1" dirty="0"/>
-              <a:t>Per creare un contesto valido e </a:t>
-            </a:r>
-            <a:r>
-              <a:rPr lang="it-IT" sz="1100" b="1" dirty="0" err="1"/>
-              <a:t>trusted</a:t>
-            </a:r>
-            <a:r>
-              <a:rPr lang="it-IT" sz="1100" b="1" dirty="0"/>
-              <a:t> (!</a:t>
-            </a:r>
-            <a:r>
-              <a:rPr lang="it-IT" sz="1100" b="1" u="sng" dirty="0">
-                <a:solidFill>
-                  <a:srgbClr val="C00000"/>
-                </a:solidFill>
-              </a:rPr>
-              <a:t>solo eventualmente in ambiente di sviluppo</a:t>
-            </a:r>
-            <a:r>
-              <a:rPr lang="it-IT" sz="1100" b="1" u="sng" dirty="0"/>
-              <a:t>!</a:t>
-            </a:r>
-            <a:r>
-              <a:rPr lang="it-IT" sz="1100" b="1" dirty="0"/>
-              <a:t>)</a:t>
-            </a:r>
-          </a:p>
-          <a:p>
-            <a:pPr marL="400050" lvl="1" indent="0">
-              <a:buNone/>
-            </a:pPr>
-            <a:r>
-              <a:rPr lang="it-IT" sz="1100" b="1" dirty="0"/>
-              <a:t>Tool installato con IIS Express: C:\Program Files\IIS Express</a:t>
-            </a:r>
-          </a:p>
-          <a:p>
-            <a:pPr marL="400050" lvl="1" indent="0">
-              <a:buNone/>
-            </a:pPr>
-            <a:r>
-              <a:rPr lang="it-IT" sz="1100" b="1" i="1" dirty="0" err="1">
-                <a:solidFill>
-                  <a:schemeClr val="tx1">
-                    <a:lumMod val="50000"/>
-                    <a:lumOff val="50000"/>
-                  </a:schemeClr>
-                </a:solidFill>
-              </a:rPr>
-              <a:t>dotnet</a:t>
-            </a:r>
-            <a:r>
-              <a:rPr lang="it-IT" sz="1100" b="1" i="1" dirty="0">
-                <a:solidFill>
-                  <a:schemeClr val="tx1">
-                    <a:lumMod val="50000"/>
-                    <a:lumOff val="50000"/>
-                  </a:schemeClr>
-                </a:solidFill>
-              </a:rPr>
-              <a:t> </a:t>
-            </a:r>
-            <a:r>
-              <a:rPr lang="it-IT" sz="1100" b="1" i="1" dirty="0" err="1">
-                <a:solidFill>
-                  <a:schemeClr val="tx1">
-                    <a:lumMod val="50000"/>
-                    <a:lumOff val="50000"/>
-                  </a:schemeClr>
-                </a:solidFill>
-              </a:rPr>
-              <a:t>dev-certs</a:t>
-            </a:r>
-            <a:r>
-              <a:rPr lang="it-IT" sz="1100" b="1" i="1" dirty="0">
-                <a:solidFill>
-                  <a:schemeClr val="tx1">
-                    <a:lumMod val="50000"/>
-                    <a:lumOff val="50000"/>
-                  </a:schemeClr>
-                </a:solidFill>
-              </a:rPr>
-              <a:t> </a:t>
-            </a:r>
-            <a:r>
-              <a:rPr lang="it-IT" sz="1100" b="1" i="1" dirty="0" err="1">
-                <a:solidFill>
-                  <a:schemeClr val="tx1">
-                    <a:lumMod val="50000"/>
-                    <a:lumOff val="50000"/>
-                  </a:schemeClr>
-                </a:solidFill>
-              </a:rPr>
-              <a:t>https</a:t>
-            </a:r>
-            <a:r>
-              <a:rPr lang="it-IT" sz="1100" b="1" i="1" dirty="0">
-                <a:solidFill>
-                  <a:schemeClr val="tx1">
-                    <a:lumMod val="50000"/>
-                    <a:lumOff val="50000"/>
-                  </a:schemeClr>
-                </a:solidFill>
-              </a:rPr>
-              <a:t> --trust</a:t>
-            </a:r>
-          </a:p>
-          <a:p>
-            <a:pPr marL="400050" lvl="1" indent="0">
-              <a:buNone/>
-            </a:pPr>
-            <a:endParaRPr lang="it-IT" sz="1100" b="1" dirty="0"/>
-          </a:p>
-          <a:p>
-            <a:pPr marL="400050" lvl="1" indent="0">
-              <a:buNone/>
-            </a:pPr>
-            <a:r>
-              <a:rPr lang="it-IT" sz="1100" b="1" dirty="0"/>
-              <a:t>Assicurarsi che il certificato generato per </a:t>
-            </a:r>
-            <a:r>
-              <a:rPr lang="it-IT" sz="1100" b="1" dirty="0" err="1"/>
-              <a:t>localhost</a:t>
-            </a:r>
-            <a:r>
-              <a:rPr lang="it-IT" sz="1100" b="1" dirty="0"/>
-              <a:t> sia posizionato in:</a:t>
-            </a:r>
-          </a:p>
-          <a:p>
-            <a:pPr marL="400050" lvl="1" indent="0">
-              <a:buNone/>
-            </a:pPr>
-            <a:r>
-              <a:rPr lang="it-IT" sz="1100" b="1" dirty="0"/>
-              <a:t>personal + </a:t>
-            </a:r>
-            <a:r>
-              <a:rPr lang="it-IT" sz="1100" b="1" dirty="0" err="1"/>
-              <a:t>trusted</a:t>
-            </a:r>
-            <a:r>
-              <a:rPr lang="it-IT" sz="1100" b="1" dirty="0"/>
-              <a:t> root  di </a:t>
-            </a:r>
-            <a:r>
-              <a:rPr lang="it-IT" sz="1100" b="1" dirty="0" err="1"/>
-              <a:t>local</a:t>
-            </a:r>
-            <a:r>
-              <a:rPr lang="it-IT" sz="1100" b="1" dirty="0"/>
-              <a:t> user  (</a:t>
-            </a:r>
-            <a:r>
-              <a:rPr lang="it-IT" sz="1100" b="1" dirty="0" err="1"/>
-              <a:t>IdentityServer</a:t>
-            </a:r>
-            <a:r>
-              <a:rPr lang="it-IT" sz="1100" b="1" dirty="0"/>
-              <a:t>)</a:t>
-            </a:r>
-          </a:p>
-          <a:p>
-            <a:pPr marL="400050" lvl="1" indent="0">
-              <a:buNone/>
-            </a:pPr>
-            <a:r>
-              <a:rPr lang="it-IT" sz="1100" b="1" dirty="0"/>
-              <a:t>personal + </a:t>
-            </a:r>
-            <a:r>
-              <a:rPr lang="it-IT" sz="1100" b="1" dirty="0" err="1"/>
-              <a:t>trusted</a:t>
-            </a:r>
-            <a:r>
-              <a:rPr lang="it-IT" sz="1100" b="1" dirty="0"/>
-              <a:t> root  di </a:t>
-            </a:r>
-            <a:r>
-              <a:rPr lang="it-IT" sz="1100" b="1" dirty="0" err="1"/>
-              <a:t>local</a:t>
-            </a:r>
-            <a:r>
-              <a:rPr lang="it-IT" sz="1100" b="1" dirty="0"/>
-              <a:t> machine  (IIS)</a:t>
-            </a:r>
-          </a:p>
-          <a:p>
-            <a:pPr marL="0" indent="0">
-              <a:buNone/>
-            </a:pPr>
-            <a:endParaRPr lang="it-IT" sz="1400" b="1" dirty="0"/>
-          </a:p>
-          <a:p>
-            <a:r>
-              <a:rPr lang="it-IT" sz="1400" b="1" dirty="0"/>
-              <a:t>Logon automatico con un logon provider di tipo </a:t>
-            </a:r>
-            <a:r>
-              <a:rPr lang="it-IT" sz="1400" b="1" dirty="0">
-                <a:solidFill>
-                  <a:schemeClr val="tx1">
-                    <a:lumMod val="50000"/>
-                    <a:lumOff val="50000"/>
-                  </a:schemeClr>
-                </a:solidFill>
-              </a:rPr>
-              <a:t>S</a:t>
-            </a:r>
-            <a:r>
-              <a:rPr lang="it-IT" sz="1400" b="1" dirty="0"/>
-              <a:t>ingle </a:t>
-            </a:r>
-            <a:r>
-              <a:rPr lang="it-IT" sz="1400" b="1" dirty="0" err="1">
-                <a:solidFill>
-                  <a:schemeClr val="tx1">
-                    <a:lumMod val="50000"/>
-                    <a:lumOff val="50000"/>
-                  </a:schemeClr>
-                </a:solidFill>
-              </a:rPr>
-              <a:t>S</a:t>
-            </a:r>
-            <a:r>
-              <a:rPr lang="it-IT" sz="1400" b="1" dirty="0" err="1"/>
-              <a:t>ign</a:t>
-            </a:r>
-            <a:r>
-              <a:rPr lang="it-IT" sz="1400" b="1" dirty="0"/>
-              <a:t>-</a:t>
-            </a:r>
-            <a:r>
-              <a:rPr lang="it-IT" sz="1400" b="1" dirty="0">
-                <a:solidFill>
-                  <a:schemeClr val="tx1">
-                    <a:lumMod val="50000"/>
-                    <a:lumOff val="50000"/>
-                  </a:schemeClr>
-                </a:solidFill>
-              </a:rPr>
-              <a:t>O</a:t>
-            </a:r>
-            <a:r>
-              <a:rPr lang="it-IT" sz="1400" b="1" dirty="0"/>
-              <a:t>n in </a:t>
-            </a:r>
-            <a:r>
-              <a:rPr lang="it-IT" sz="1400" b="1" dirty="0" err="1">
-                <a:solidFill>
-                  <a:srgbClr val="F18D2C"/>
-                </a:solidFill>
-              </a:rPr>
-              <a:t>ARX</a:t>
-            </a:r>
-            <a:r>
-              <a:rPr lang="it-IT" sz="1400" b="1" dirty="0" err="1"/>
-              <a:t>ivar</a:t>
-            </a:r>
-            <a:r>
-              <a:rPr lang="it-IT" sz="1400" b="1" dirty="0"/>
-              <a:t> Web Portal. </a:t>
-            </a:r>
-          </a:p>
-          <a:p>
-            <a:pPr marL="457200" lvl="1" indent="0">
-              <a:buNone/>
-            </a:pPr>
-            <a:r>
-              <a:rPr lang="it-IT" sz="1000" b="1" dirty="0"/>
-              <a:t> </a:t>
-            </a:r>
-            <a:r>
-              <a:rPr lang="it-IT" sz="1000" b="1" dirty="0" err="1"/>
-              <a:t>Web.config</a:t>
-            </a:r>
-            <a:r>
-              <a:rPr lang="it-IT" sz="1000" b="1" dirty="0"/>
-              <a:t>:</a:t>
-            </a:r>
-          </a:p>
-          <a:p>
-            <a:pPr marL="0" indent="0">
-              <a:buNone/>
-            </a:pPr>
-            <a:r>
-              <a:rPr lang="it-IT" sz="1100" b="1" dirty="0"/>
-              <a:t>	&lt;</a:t>
-            </a:r>
-            <a:r>
-              <a:rPr lang="it-IT" sz="1100" b="1" dirty="0" err="1"/>
-              <a:t>add</a:t>
-            </a:r>
-            <a:r>
-              <a:rPr lang="it-IT" sz="1100" b="1" dirty="0"/>
-              <a:t> key="</a:t>
-            </a:r>
-            <a:r>
-              <a:rPr lang="it-IT" sz="1100" b="1" dirty="0" err="1"/>
-              <a:t>LogonProviderId</a:t>
-            </a:r>
-            <a:r>
-              <a:rPr lang="it-IT" sz="1100" b="1" dirty="0"/>
-              <a:t>" </a:t>
-            </a:r>
-            <a:r>
-              <a:rPr lang="it-IT" sz="1100" b="1" dirty="0" err="1"/>
-              <a:t>value</a:t>
-            </a:r>
-            <a:r>
-              <a:rPr lang="it-IT" sz="1100" b="1" dirty="0"/>
-              <a:t>="</a:t>
-            </a:r>
-            <a:r>
-              <a:rPr lang="it-IT" sz="1100" b="1" i="1" dirty="0">
-                <a:solidFill>
-                  <a:schemeClr val="tx1">
-                    <a:lumMod val="50000"/>
-                    <a:lumOff val="50000"/>
-                  </a:schemeClr>
-                </a:solidFill>
-              </a:rPr>
-              <a:t>&lt;</a:t>
-            </a:r>
-            <a:r>
-              <a:rPr lang="it-IT" sz="1100" b="1" i="1" dirty="0" err="1">
-                <a:solidFill>
-                  <a:schemeClr val="tx1">
-                    <a:lumMod val="50000"/>
-                    <a:lumOff val="50000"/>
-                  </a:schemeClr>
-                </a:solidFill>
-              </a:rPr>
-              <a:t>LogonProviderId</a:t>
-            </a:r>
-            <a:r>
-              <a:rPr lang="it-IT" sz="1100" b="1" i="1" dirty="0">
-                <a:solidFill>
-                  <a:schemeClr val="tx1">
-                    <a:lumMod val="50000"/>
-                    <a:lumOff val="50000"/>
-                  </a:schemeClr>
-                </a:solidFill>
-              </a:rPr>
-              <a:t>&gt;</a:t>
-            </a:r>
-            <a:r>
-              <a:rPr lang="it-IT" sz="1100" b="1" dirty="0"/>
-              <a:t>"/&gt;</a:t>
-            </a:r>
-          </a:p>
-        </p:txBody>
-      </p:sp>
-    </p:spTree>
-    <p:extLst>
-      <p:ext uri="{BB962C8B-B14F-4D97-AF65-F5344CB8AC3E}">
-        <p14:creationId xmlns:p14="http://schemas.microsoft.com/office/powerpoint/2010/main" val="3633445696"/>
       </p:ext>
     </p:extLst>
   </p:cSld>

</xml_diff>